<commit_message>
Moved block logic to Unity UI framework
</commit_message>
<xml_diff>
--- a/HMSWebTest-Pen/Assets/Images/hmsgraphics.pptx
+++ b/HMSWebTest-Pen/Assets/Images/hmsgraphics.pptx
@@ -5,7 +5,7 @@
     <p:sldMasterId id="2147483648" r:id="rId1"/>
   </p:sldMasterIdLst>
   <p:notesMasterIdLst>
-    <p:notesMasterId r:id="rId18"/>
+    <p:notesMasterId r:id="rId19"/>
   </p:notesMasterIdLst>
   <p:sldIdLst>
     <p:sldId id="256" r:id="rId2"/>
@@ -24,6 +24,7 @@
     <p:sldId id="266" r:id="rId15"/>
     <p:sldId id="268" r:id="rId16"/>
     <p:sldId id="269" r:id="rId17"/>
+    <p:sldId id="272" r:id="rId18"/>
   </p:sldIdLst>
   <p:sldSz cx="9144000" cy="6858000" type="screen4x3"/>
   <p:notesSz cx="6858000" cy="9144000"/>
@@ -208,7 +209,7 @@
             <a:fld id="{6153BB3E-9447-4512-867E-C40997E12B5B}" type="datetimeFigureOut">
               <a:rPr lang="en-US" smtClean="0"/>
               <a:pPr/>
-              <a:t>3/22/2017</a:t>
+              <a:t>4/21/2017</a:t>
             </a:fld>
             <a:endParaRPr lang="en-US"/>
           </a:p>
@@ -738,7 +739,7 @@
             <a:fld id="{090B515E-C25E-45EE-BA79-D334A31660AC}" type="datetimeFigureOut">
               <a:rPr lang="en-US" smtClean="0"/>
               <a:pPr/>
-              <a:t>3/22/2017</a:t>
+              <a:t>4/21/2017</a:t>
             </a:fld>
             <a:endParaRPr lang="en-US"/>
           </a:p>
@@ -905,7 +906,7 @@
             <a:fld id="{090B515E-C25E-45EE-BA79-D334A31660AC}" type="datetimeFigureOut">
               <a:rPr lang="en-US" smtClean="0"/>
               <a:pPr/>
-              <a:t>3/22/2017</a:t>
+              <a:t>4/21/2017</a:t>
             </a:fld>
             <a:endParaRPr lang="en-US"/>
           </a:p>
@@ -1082,7 +1083,7 @@
             <a:fld id="{090B515E-C25E-45EE-BA79-D334A31660AC}" type="datetimeFigureOut">
               <a:rPr lang="en-US" smtClean="0"/>
               <a:pPr/>
-              <a:t>3/22/2017</a:t>
+              <a:t>4/21/2017</a:t>
             </a:fld>
             <a:endParaRPr lang="en-US"/>
           </a:p>
@@ -1249,7 +1250,7 @@
             <a:fld id="{090B515E-C25E-45EE-BA79-D334A31660AC}" type="datetimeFigureOut">
               <a:rPr lang="en-US" smtClean="0"/>
               <a:pPr/>
-              <a:t>3/22/2017</a:t>
+              <a:t>4/21/2017</a:t>
             </a:fld>
             <a:endParaRPr lang="en-US"/>
           </a:p>
@@ -1492,7 +1493,7 @@
             <a:fld id="{090B515E-C25E-45EE-BA79-D334A31660AC}" type="datetimeFigureOut">
               <a:rPr lang="en-US" smtClean="0"/>
               <a:pPr/>
-              <a:t>3/22/2017</a:t>
+              <a:t>4/21/2017</a:t>
             </a:fld>
             <a:endParaRPr lang="en-US"/>
           </a:p>
@@ -1777,7 +1778,7 @@
             <a:fld id="{090B515E-C25E-45EE-BA79-D334A31660AC}" type="datetimeFigureOut">
               <a:rPr lang="en-US" smtClean="0"/>
               <a:pPr/>
-              <a:t>3/22/2017</a:t>
+              <a:t>4/21/2017</a:t>
             </a:fld>
             <a:endParaRPr lang="en-US"/>
           </a:p>
@@ -2196,7 +2197,7 @@
             <a:fld id="{090B515E-C25E-45EE-BA79-D334A31660AC}" type="datetimeFigureOut">
               <a:rPr lang="en-US" smtClean="0"/>
               <a:pPr/>
-              <a:t>3/22/2017</a:t>
+              <a:t>4/21/2017</a:t>
             </a:fld>
             <a:endParaRPr lang="en-US"/>
           </a:p>
@@ -2311,7 +2312,7 @@
             <a:fld id="{090B515E-C25E-45EE-BA79-D334A31660AC}" type="datetimeFigureOut">
               <a:rPr lang="en-US" smtClean="0"/>
               <a:pPr/>
-              <a:t>3/22/2017</a:t>
+              <a:t>4/21/2017</a:t>
             </a:fld>
             <a:endParaRPr lang="en-US"/>
           </a:p>
@@ -2403,7 +2404,7 @@
             <a:fld id="{090B515E-C25E-45EE-BA79-D334A31660AC}" type="datetimeFigureOut">
               <a:rPr lang="en-US" smtClean="0"/>
               <a:pPr/>
-              <a:t>3/22/2017</a:t>
+              <a:t>4/21/2017</a:t>
             </a:fld>
             <a:endParaRPr lang="en-US"/>
           </a:p>
@@ -2677,7 +2678,7 @@
             <a:fld id="{090B515E-C25E-45EE-BA79-D334A31660AC}" type="datetimeFigureOut">
               <a:rPr lang="en-US" smtClean="0"/>
               <a:pPr/>
-              <a:t>3/22/2017</a:t>
+              <a:t>4/21/2017</a:t>
             </a:fld>
             <a:endParaRPr lang="en-US"/>
           </a:p>
@@ -2927,7 +2928,7 @@
             <a:fld id="{090B515E-C25E-45EE-BA79-D334A31660AC}" type="datetimeFigureOut">
               <a:rPr lang="en-US" smtClean="0"/>
               <a:pPr/>
-              <a:t>3/22/2017</a:t>
+              <a:t>4/21/2017</a:t>
             </a:fld>
             <a:endParaRPr lang="en-US"/>
           </a:p>
@@ -3137,7 +3138,7 @@
             <a:fld id="{090B515E-C25E-45EE-BA79-D334A31660AC}" type="datetimeFigureOut">
               <a:rPr lang="en-US" smtClean="0"/>
               <a:pPr/>
-              <a:t>3/22/2017</a:t>
+              <a:t>4/21/2017</a:t>
             </a:fld>
             <a:endParaRPr lang="en-US"/>
           </a:p>
@@ -3975,7 +3976,7 @@
             <a:blip r:embed="rId2" cstate="print">
               <a:extLst>
                 <a:ext uri="{28A0092B-C50C-407E-A947-70E740481C1C}">
-                  <a14:useLocalDpi xmlns="" xmlns:a14="http://schemas.microsoft.com/office/drawing/2010/main" val="0"/>
+                  <a14:useLocalDpi xmlns:a14="http://schemas.microsoft.com/office/drawing/2010/main" xmlns="" val="0"/>
                 </a:ext>
               </a:extLst>
             </a:blip>
@@ -3995,7 +3996,7 @@
             <a:noFill/>
             <a:extLst>
               <a:ext uri="{909E8E84-426E-40DD-AFC4-6F175D3DCCD1}">
-                <a14:hiddenFill xmlns="" xmlns:a14="http://schemas.microsoft.com/office/drawing/2010/main">
+                <a14:hiddenFill xmlns:a14="http://schemas.microsoft.com/office/drawing/2010/main" xmlns="">
                   <a:solidFill>
                     <a:srgbClr val="FFFFFF"/>
                   </a:solidFill>
@@ -4078,7 +4079,7 @@
             <a:blip r:embed="rId3" cstate="print">
               <a:extLst>
                 <a:ext uri="{28A0092B-C50C-407E-A947-70E740481C1C}">
-                  <a14:useLocalDpi xmlns="" xmlns:a14="http://schemas.microsoft.com/office/drawing/2010/main" val="0"/>
+                  <a14:useLocalDpi xmlns:a14="http://schemas.microsoft.com/office/drawing/2010/main" xmlns="" val="0"/>
                 </a:ext>
               </a:extLst>
             </a:blip>
@@ -4098,7 +4099,7 @@
             <a:noFill/>
             <a:extLst>
               <a:ext uri="{909E8E84-426E-40DD-AFC4-6F175D3DCCD1}">
-                <a14:hiddenFill xmlns="" xmlns:a14="http://schemas.microsoft.com/office/drawing/2010/main">
+                <a14:hiddenFill xmlns:a14="http://schemas.microsoft.com/office/drawing/2010/main" xmlns="">
                   <a:solidFill>
                     <a:srgbClr val="FFFFFF"/>
                   </a:solidFill>
@@ -7081,7 +7082,7 @@
     </p:spTree>
     <p:extLst>
       <p:ext uri="{BB962C8B-B14F-4D97-AF65-F5344CB8AC3E}">
-        <p14:creationId xmlns="" xmlns:p14="http://schemas.microsoft.com/office/powerpoint/2010/main" val="1874106700"/>
+        <p14:creationId xmlns:p14="http://schemas.microsoft.com/office/powerpoint/2010/main" xmlns="" val="1874106700"/>
       </p:ext>
     </p:extLst>
   </p:cSld>
@@ -7754,7 +7755,7 @@
           <a:blip r:embed="rId2" cstate="print">
             <a:extLst>
               <a:ext uri="{28A0092B-C50C-407E-A947-70E740481C1C}">
-                <a14:useLocalDpi xmlns:a14="http://schemas.microsoft.com/office/drawing/2010/main" xmlns="" val="0"/>
+                <a14:useLocalDpi xmlns="" xmlns:a14="http://schemas.microsoft.com/office/drawing/2010/main" val="0"/>
               </a:ext>
             </a:extLst>
           </a:blip>
@@ -7783,14 +7784,14 @@
           </a:effectLst>
           <a:extLst>
             <a:ext uri="{909E8E84-426E-40DD-AFC4-6F175D3DCCD1}">
-              <a14:hiddenFill xmlns:a14="http://schemas.microsoft.com/office/drawing/2010/main" xmlns="">
+              <a14:hiddenFill xmlns="" xmlns:a14="http://schemas.microsoft.com/office/drawing/2010/main">
                 <a:solidFill>
                   <a:schemeClr val="accent1"/>
                 </a:solidFill>
               </a14:hiddenFill>
             </a:ext>
             <a:ext uri="{91240B29-F687-4F45-9708-019B960494DF}">
-              <a14:hiddenLine xmlns:a14="http://schemas.microsoft.com/office/drawing/2010/main" xmlns="" w="9525">
+              <a14:hiddenLine xmlns="" xmlns:a14="http://schemas.microsoft.com/office/drawing/2010/main" w="9525">
                 <a:solidFill>
                   <a:schemeClr val="tx1"/>
                 </a:solidFill>
@@ -7821,7 +7822,7 @@
             </a:duotone>
             <a:extLst>
               <a:ext uri="{28A0092B-C50C-407E-A947-70E740481C1C}">
-                <a14:useLocalDpi xmlns:a14="http://schemas.microsoft.com/office/drawing/2010/main" xmlns="" val="0"/>
+                <a14:useLocalDpi xmlns="" xmlns:a14="http://schemas.microsoft.com/office/drawing/2010/main" val="0"/>
               </a:ext>
             </a:extLst>
           </a:blip>
@@ -7850,14 +7851,14 @@
           </a:effectLst>
           <a:extLst>
             <a:ext uri="{909E8E84-426E-40DD-AFC4-6F175D3DCCD1}">
-              <a14:hiddenFill xmlns:a14="http://schemas.microsoft.com/office/drawing/2010/main" xmlns="">
+              <a14:hiddenFill xmlns="" xmlns:a14="http://schemas.microsoft.com/office/drawing/2010/main">
                 <a:solidFill>
                   <a:schemeClr val="accent1"/>
                 </a:solidFill>
               </a14:hiddenFill>
             </a:ext>
             <a:ext uri="{91240B29-F687-4F45-9708-019B960494DF}">
-              <a14:hiddenLine xmlns:a14="http://schemas.microsoft.com/office/drawing/2010/main" xmlns="" w="9525">
+              <a14:hiddenLine xmlns="" xmlns:a14="http://schemas.microsoft.com/office/drawing/2010/main" w="9525">
                 <a:solidFill>
                   <a:schemeClr val="tx1"/>
                 </a:solidFill>
@@ -11615,11 +11616,6 @@
               </a:rPr>
               <a:t>{}</a:t>
             </a:r>
-            <a:endParaRPr lang="en-US" sz="11500" dirty="0" smtClean="0">
-              <a:solidFill>
-                <a:schemeClr val="bg1"/>
-              </a:solidFill>
-            </a:endParaRPr>
           </a:p>
         </p:txBody>
       </p:sp>
@@ -11999,6 +11995,219 @@
           <a:p>
             <a:pPr algn="ctr"/>
             <a:endParaRPr lang="en-US"/>
+          </a:p>
+        </p:txBody>
+      </p:sp>
+    </p:spTree>
+  </p:cSld>
+  <p:clrMapOvr>
+    <a:masterClrMapping/>
+  </p:clrMapOvr>
+</p:sld>
+</file>
+
+<file path=ppt/slides/slide17.xml><?xml version="1.0" encoding="utf-8"?>
+<p:sld xmlns:a="http://schemas.openxmlformats.org/drawingml/2006/main" xmlns:r="http://schemas.openxmlformats.org/officeDocument/2006/relationships" xmlns:p="http://schemas.openxmlformats.org/presentationml/2006/main">
+  <p:cSld>
+    <p:spTree>
+      <p:nvGrpSpPr>
+        <p:cNvPr id="1" name=""/>
+        <p:cNvGrpSpPr/>
+        <p:nvPr/>
+      </p:nvGrpSpPr>
+      <p:grpSpPr>
+        <a:xfrm>
+          <a:off x="0" y="0"/>
+          <a:ext cx="0" cy="0"/>
+          <a:chOff x="0" y="0"/>
+          <a:chExt cx="0" cy="0"/>
+        </a:xfrm>
+      </p:grpSpPr>
+      <p:sp>
+        <p:nvSpPr>
+          <p:cNvPr id="4" name="Rectangle 3"/>
+          <p:cNvSpPr/>
+          <p:nvPr/>
+        </p:nvSpPr>
+        <p:spPr>
+          <a:xfrm>
+            <a:off x="2286000" y="3581400"/>
+            <a:ext cx="4343400" cy="762000"/>
+          </a:xfrm>
+          <a:prstGeom prst="rect">
+            <a:avLst/>
+          </a:prstGeom>
+          <a:solidFill>
+            <a:schemeClr val="accent1">
+              <a:lumMod val="75000"/>
+            </a:schemeClr>
+          </a:solidFill>
+          <a:ln>
+            <a:noFill/>
+          </a:ln>
+        </p:spPr>
+        <p:style>
+          <a:lnRef idx="2">
+            <a:schemeClr val="accent1">
+              <a:shade val="50000"/>
+            </a:schemeClr>
+          </a:lnRef>
+          <a:fillRef idx="1">
+            <a:schemeClr val="accent1"/>
+          </a:fillRef>
+          <a:effectRef idx="0">
+            <a:schemeClr val="accent1"/>
+          </a:effectRef>
+          <a:fontRef idx="minor">
+            <a:schemeClr val="lt1"/>
+          </a:fontRef>
+        </p:style>
+        <p:txBody>
+          <a:bodyPr rtlCol="0" anchor="ctr"/>
+          <a:lstStyle/>
+          <a:p>
+            <a:endParaRPr lang="en-US" dirty="0"/>
+          </a:p>
+        </p:txBody>
+      </p:sp>
+      <p:sp>
+        <p:nvSpPr>
+          <p:cNvPr id="5" name="Rectangle 4"/>
+          <p:cNvSpPr/>
+          <p:nvPr/>
+        </p:nvSpPr>
+        <p:spPr>
+          <a:xfrm>
+            <a:off x="2743200" y="4343400"/>
+            <a:ext cx="381000" cy="152400"/>
+          </a:xfrm>
+          <a:prstGeom prst="rect">
+            <a:avLst/>
+          </a:prstGeom>
+          <a:solidFill>
+            <a:schemeClr val="accent1">
+              <a:lumMod val="75000"/>
+            </a:schemeClr>
+          </a:solidFill>
+          <a:ln>
+            <a:noFill/>
+          </a:ln>
+        </p:spPr>
+        <p:style>
+          <a:lnRef idx="2">
+            <a:schemeClr val="accent1">
+              <a:shade val="50000"/>
+            </a:schemeClr>
+          </a:lnRef>
+          <a:fillRef idx="1">
+            <a:schemeClr val="accent1"/>
+          </a:fillRef>
+          <a:effectRef idx="0">
+            <a:schemeClr val="accent1"/>
+          </a:effectRef>
+          <a:fontRef idx="minor">
+            <a:schemeClr val="lt1"/>
+          </a:fontRef>
+        </p:style>
+        <p:txBody>
+          <a:bodyPr rtlCol="0" anchor="ctr"/>
+          <a:lstStyle/>
+          <a:p>
+            <a:endParaRPr lang="en-US" dirty="0"/>
+          </a:p>
+        </p:txBody>
+      </p:sp>
+      <p:sp>
+        <p:nvSpPr>
+          <p:cNvPr id="6" name="Rectangle 5"/>
+          <p:cNvSpPr/>
+          <p:nvPr/>
+        </p:nvSpPr>
+        <p:spPr>
+          <a:xfrm>
+            <a:off x="2286000" y="3429000"/>
+            <a:ext cx="457200" cy="152400"/>
+          </a:xfrm>
+          <a:prstGeom prst="rect">
+            <a:avLst/>
+          </a:prstGeom>
+          <a:solidFill>
+            <a:schemeClr val="accent1">
+              <a:lumMod val="75000"/>
+            </a:schemeClr>
+          </a:solidFill>
+          <a:ln>
+            <a:noFill/>
+          </a:ln>
+        </p:spPr>
+        <p:style>
+          <a:lnRef idx="2">
+            <a:schemeClr val="accent1">
+              <a:shade val="50000"/>
+            </a:schemeClr>
+          </a:lnRef>
+          <a:fillRef idx="1">
+            <a:schemeClr val="accent1"/>
+          </a:fillRef>
+          <a:effectRef idx="0">
+            <a:schemeClr val="accent1"/>
+          </a:effectRef>
+          <a:fontRef idx="minor">
+            <a:schemeClr val="lt1"/>
+          </a:fontRef>
+        </p:style>
+        <p:txBody>
+          <a:bodyPr rtlCol="0" anchor="ctr"/>
+          <a:lstStyle/>
+          <a:p>
+            <a:endParaRPr lang="en-US" dirty="0"/>
+          </a:p>
+        </p:txBody>
+      </p:sp>
+      <p:sp>
+        <p:nvSpPr>
+          <p:cNvPr id="7" name="Rectangle 6"/>
+          <p:cNvSpPr/>
+          <p:nvPr/>
+        </p:nvSpPr>
+        <p:spPr>
+          <a:xfrm>
+            <a:off x="3124200" y="3429000"/>
+            <a:ext cx="3505200" cy="152400"/>
+          </a:xfrm>
+          <a:prstGeom prst="rect">
+            <a:avLst/>
+          </a:prstGeom>
+          <a:solidFill>
+            <a:schemeClr val="accent1">
+              <a:lumMod val="75000"/>
+            </a:schemeClr>
+          </a:solidFill>
+          <a:ln>
+            <a:noFill/>
+          </a:ln>
+        </p:spPr>
+        <p:style>
+          <a:lnRef idx="2">
+            <a:schemeClr val="accent1">
+              <a:shade val="50000"/>
+            </a:schemeClr>
+          </a:lnRef>
+          <a:fillRef idx="1">
+            <a:schemeClr val="accent1"/>
+          </a:fillRef>
+          <a:effectRef idx="0">
+            <a:schemeClr val="accent1"/>
+          </a:effectRef>
+          <a:fontRef idx="minor">
+            <a:schemeClr val="lt1"/>
+          </a:fontRef>
+        </p:style>
+        <p:txBody>
+          <a:bodyPr rtlCol="0" anchor="ctr"/>
+          <a:lstStyle/>
+          <a:p>
+            <a:endParaRPr lang="en-US" dirty="0"/>
           </a:p>
         </p:txBody>
       </p:sp>
@@ -13294,7 +13503,7 @@
             <a:blip r:embed="rId4" cstate="print">
               <a:extLst>
                 <a:ext uri="{28A0092B-C50C-407E-A947-70E740481C1C}">
-                  <a14:useLocalDpi xmlns="" xmlns:a14="http://schemas.microsoft.com/office/drawing/2010/main" val="0"/>
+                  <a14:useLocalDpi xmlns:a14="http://schemas.microsoft.com/office/drawing/2010/main" xmlns="" val="0"/>
                 </a:ext>
               </a:extLst>
             </a:blip>
@@ -13314,7 +13523,7 @@
             <a:noFill/>
             <a:extLst>
               <a:ext uri="{909E8E84-426E-40DD-AFC4-6F175D3DCCD1}">
-                <a14:hiddenFill xmlns="" xmlns:a14="http://schemas.microsoft.com/office/drawing/2010/main">
+                <a14:hiddenFill xmlns:a14="http://schemas.microsoft.com/office/drawing/2010/main" xmlns="">
                   <a:solidFill>
                     <a:srgbClr val="FFFFFF"/>
                   </a:solidFill>
@@ -13761,7 +13970,7 @@
             <a:blip r:embed="rId6" cstate="print">
               <a:extLst>
                 <a:ext uri="{28A0092B-C50C-407E-A947-70E740481C1C}">
-                  <a14:useLocalDpi xmlns="" xmlns:a14="http://schemas.microsoft.com/office/drawing/2010/main" val="0"/>
+                  <a14:useLocalDpi xmlns:a14="http://schemas.microsoft.com/office/drawing/2010/main" xmlns="" val="0"/>
                 </a:ext>
               </a:extLst>
             </a:blip>
@@ -13781,7 +13990,7 @@
             <a:noFill/>
             <a:extLst>
               <a:ext uri="{909E8E84-426E-40DD-AFC4-6F175D3DCCD1}">
-                <a14:hiddenFill xmlns="" xmlns:a14="http://schemas.microsoft.com/office/drawing/2010/main">
+                <a14:hiddenFill xmlns:a14="http://schemas.microsoft.com/office/drawing/2010/main" xmlns="">
                   <a:solidFill>
                     <a:srgbClr val="FFFFFF"/>
                   </a:solidFill>
@@ -15985,7 +16194,7 @@
               <a:blip r:embed="rId6" cstate="print">
                 <a:extLst>
                   <a:ext uri="{28A0092B-C50C-407E-A947-70E740481C1C}">
-                    <a14:useLocalDpi xmlns="" xmlns:a14="http://schemas.microsoft.com/office/drawing/2010/main" val="0"/>
+                    <a14:useLocalDpi xmlns:a14="http://schemas.microsoft.com/office/drawing/2010/main" xmlns="" val="0"/>
                   </a:ext>
                 </a:extLst>
               </a:blip>
@@ -16005,7 +16214,7 @@
               <a:noFill/>
               <a:extLst>
                 <a:ext uri="{909E8E84-426E-40DD-AFC4-6F175D3DCCD1}">
-                  <a14:hiddenFill xmlns="" xmlns:a14="http://schemas.microsoft.com/office/drawing/2010/main">
+                  <a14:hiddenFill xmlns:a14="http://schemas.microsoft.com/office/drawing/2010/main" xmlns="">
                     <a:solidFill>
                       <a:srgbClr val="FFFFFF"/>
                     </a:solidFill>
@@ -23205,7 +23414,7 @@
               <a:blip r:embed="rId8" cstate="print">
                 <a:extLst>
                   <a:ext uri="{28A0092B-C50C-407E-A947-70E740481C1C}">
-                    <a14:useLocalDpi xmlns="" xmlns:a14="http://schemas.microsoft.com/office/drawing/2010/main" val="0"/>
+                    <a14:useLocalDpi xmlns:a14="http://schemas.microsoft.com/office/drawing/2010/main" xmlns="" val="0"/>
                   </a:ext>
                 </a:extLst>
               </a:blip>
@@ -23225,7 +23434,7 @@
               <a:noFill/>
               <a:extLst>
                 <a:ext uri="{909E8E84-426E-40DD-AFC4-6F175D3DCCD1}">
-                  <a14:hiddenFill xmlns="" xmlns:a14="http://schemas.microsoft.com/office/drawing/2010/main">
+                  <a14:hiddenFill xmlns:a14="http://schemas.microsoft.com/office/drawing/2010/main" xmlns="">
                     <a:solidFill>
                       <a:srgbClr val="FFFFFF"/>
                     </a:solidFill>
@@ -23693,7 +23902,7 @@
             <a:blip r:embed="rId8" cstate="print">
               <a:extLst>
                 <a:ext uri="{28A0092B-C50C-407E-A947-70E740481C1C}">
-                  <a14:useLocalDpi xmlns="" xmlns:a14="http://schemas.microsoft.com/office/drawing/2010/main" val="0"/>
+                  <a14:useLocalDpi xmlns:a14="http://schemas.microsoft.com/office/drawing/2010/main" xmlns="" val="0"/>
                 </a:ext>
               </a:extLst>
             </a:blip>
@@ -23713,7 +23922,7 @@
             <a:noFill/>
             <a:extLst>
               <a:ext uri="{909E8E84-426E-40DD-AFC4-6F175D3DCCD1}">
-                <a14:hiddenFill xmlns="" xmlns:a14="http://schemas.microsoft.com/office/drawing/2010/main">
+                <a14:hiddenFill xmlns:a14="http://schemas.microsoft.com/office/drawing/2010/main" xmlns="">
                   <a:solidFill>
                     <a:srgbClr val="FFFFFF"/>
                   </a:solidFill>
@@ -28276,7 +28485,7 @@
           <a:blip r:embed="rId2" cstate="print">
             <a:extLst>
               <a:ext uri="{28A0092B-C50C-407E-A947-70E740481C1C}">
-                <a14:useLocalDpi xmlns:a14="http://schemas.microsoft.com/office/drawing/2010/main" xmlns="" val="0"/>
+                <a14:useLocalDpi xmlns="" xmlns:a14="http://schemas.microsoft.com/office/drawing/2010/main" val="0"/>
               </a:ext>
             </a:extLst>
           </a:blip>
@@ -28305,14 +28514,14 @@
           </a:effectLst>
           <a:extLst>
             <a:ext uri="{909E8E84-426E-40DD-AFC4-6F175D3DCCD1}">
-              <a14:hiddenFill xmlns:a14="http://schemas.microsoft.com/office/drawing/2010/main" xmlns="">
+              <a14:hiddenFill xmlns="" xmlns:a14="http://schemas.microsoft.com/office/drawing/2010/main">
                 <a:solidFill>
                   <a:schemeClr val="accent1"/>
                 </a:solidFill>
               </a14:hiddenFill>
             </a:ext>
             <a:ext uri="{91240B29-F687-4F45-9708-019B960494DF}">
-              <a14:hiddenLine xmlns:a14="http://schemas.microsoft.com/office/drawing/2010/main" xmlns="" w="9525">
+              <a14:hiddenLine xmlns="" xmlns:a14="http://schemas.microsoft.com/office/drawing/2010/main" w="9525">
                 <a:solidFill>
                   <a:schemeClr val="tx1"/>
                 </a:solidFill>

</xml_diff>

<commit_message>
Integrated new visual code into HMS main scene
</commit_message>
<xml_diff>
--- a/HMSWebTest-Pen/Assets/Images/hmsgraphics.pptx
+++ b/HMSWebTest-Pen/Assets/Images/hmsgraphics.pptx
@@ -209,7 +209,7 @@
             <a:fld id="{6153BB3E-9447-4512-867E-C40997E12B5B}" type="datetimeFigureOut">
               <a:rPr lang="en-US" smtClean="0"/>
               <a:pPr/>
-              <a:t>4/21/2017</a:t>
+              <a:t>4/22/2017</a:t>
             </a:fld>
             <a:endParaRPr lang="en-US"/>
           </a:p>
@@ -739,7 +739,7 @@
             <a:fld id="{090B515E-C25E-45EE-BA79-D334A31660AC}" type="datetimeFigureOut">
               <a:rPr lang="en-US" smtClean="0"/>
               <a:pPr/>
-              <a:t>4/21/2017</a:t>
+              <a:t>4/22/2017</a:t>
             </a:fld>
             <a:endParaRPr lang="en-US"/>
           </a:p>
@@ -906,7 +906,7 @@
             <a:fld id="{090B515E-C25E-45EE-BA79-D334A31660AC}" type="datetimeFigureOut">
               <a:rPr lang="en-US" smtClean="0"/>
               <a:pPr/>
-              <a:t>4/21/2017</a:t>
+              <a:t>4/22/2017</a:t>
             </a:fld>
             <a:endParaRPr lang="en-US"/>
           </a:p>
@@ -1083,7 +1083,7 @@
             <a:fld id="{090B515E-C25E-45EE-BA79-D334A31660AC}" type="datetimeFigureOut">
               <a:rPr lang="en-US" smtClean="0"/>
               <a:pPr/>
-              <a:t>4/21/2017</a:t>
+              <a:t>4/22/2017</a:t>
             </a:fld>
             <a:endParaRPr lang="en-US"/>
           </a:p>
@@ -1250,7 +1250,7 @@
             <a:fld id="{090B515E-C25E-45EE-BA79-D334A31660AC}" type="datetimeFigureOut">
               <a:rPr lang="en-US" smtClean="0"/>
               <a:pPr/>
-              <a:t>4/21/2017</a:t>
+              <a:t>4/22/2017</a:t>
             </a:fld>
             <a:endParaRPr lang="en-US"/>
           </a:p>
@@ -1493,7 +1493,7 @@
             <a:fld id="{090B515E-C25E-45EE-BA79-D334A31660AC}" type="datetimeFigureOut">
               <a:rPr lang="en-US" smtClean="0"/>
               <a:pPr/>
-              <a:t>4/21/2017</a:t>
+              <a:t>4/22/2017</a:t>
             </a:fld>
             <a:endParaRPr lang="en-US"/>
           </a:p>
@@ -1778,7 +1778,7 @@
             <a:fld id="{090B515E-C25E-45EE-BA79-D334A31660AC}" type="datetimeFigureOut">
               <a:rPr lang="en-US" smtClean="0"/>
               <a:pPr/>
-              <a:t>4/21/2017</a:t>
+              <a:t>4/22/2017</a:t>
             </a:fld>
             <a:endParaRPr lang="en-US"/>
           </a:p>
@@ -2197,7 +2197,7 @@
             <a:fld id="{090B515E-C25E-45EE-BA79-D334A31660AC}" type="datetimeFigureOut">
               <a:rPr lang="en-US" smtClean="0"/>
               <a:pPr/>
-              <a:t>4/21/2017</a:t>
+              <a:t>4/22/2017</a:t>
             </a:fld>
             <a:endParaRPr lang="en-US"/>
           </a:p>
@@ -2312,7 +2312,7 @@
             <a:fld id="{090B515E-C25E-45EE-BA79-D334A31660AC}" type="datetimeFigureOut">
               <a:rPr lang="en-US" smtClean="0"/>
               <a:pPr/>
-              <a:t>4/21/2017</a:t>
+              <a:t>4/22/2017</a:t>
             </a:fld>
             <a:endParaRPr lang="en-US"/>
           </a:p>
@@ -2404,7 +2404,7 @@
             <a:fld id="{090B515E-C25E-45EE-BA79-D334A31660AC}" type="datetimeFigureOut">
               <a:rPr lang="en-US" smtClean="0"/>
               <a:pPr/>
-              <a:t>4/21/2017</a:t>
+              <a:t>4/22/2017</a:t>
             </a:fld>
             <a:endParaRPr lang="en-US"/>
           </a:p>
@@ -2678,7 +2678,7 @@
             <a:fld id="{090B515E-C25E-45EE-BA79-D334A31660AC}" type="datetimeFigureOut">
               <a:rPr lang="en-US" smtClean="0"/>
               <a:pPr/>
-              <a:t>4/21/2017</a:t>
+              <a:t>4/22/2017</a:t>
             </a:fld>
             <a:endParaRPr lang="en-US"/>
           </a:p>
@@ -2928,7 +2928,7 @@
             <a:fld id="{090B515E-C25E-45EE-BA79-D334A31660AC}" type="datetimeFigureOut">
               <a:rPr lang="en-US" smtClean="0"/>
               <a:pPr/>
-              <a:t>4/21/2017</a:t>
+              <a:t>4/22/2017</a:t>
             </a:fld>
             <a:endParaRPr lang="en-US"/>
           </a:p>
@@ -3138,7 +3138,7 @@
             <a:fld id="{090B515E-C25E-45EE-BA79-D334A31660AC}" type="datetimeFigureOut">
               <a:rPr lang="en-US" smtClean="0"/>
               <a:pPr/>
-              <a:t>4/21/2017</a:t>
+              <a:t>4/22/2017</a:t>
             </a:fld>
             <a:endParaRPr lang="en-US"/>
           </a:p>
@@ -12078,8 +12078,8 @@
         </p:nvSpPr>
         <p:spPr>
           <a:xfrm>
-            <a:off x="2743200" y="4343400"/>
-            <a:ext cx="381000" cy="152400"/>
+            <a:off x="2778125" y="4343400"/>
+            <a:ext cx="307976" cy="152400"/>
           </a:xfrm>
           <a:prstGeom prst="rect">
             <a:avLst/>
@@ -12182,6 +12182,462 @@
             <a:schemeClr val="accent1">
               <a:lumMod val="75000"/>
             </a:schemeClr>
+          </a:solidFill>
+          <a:ln>
+            <a:noFill/>
+          </a:ln>
+        </p:spPr>
+        <p:style>
+          <a:lnRef idx="2">
+            <a:schemeClr val="accent1">
+              <a:shade val="50000"/>
+            </a:schemeClr>
+          </a:lnRef>
+          <a:fillRef idx="1">
+            <a:schemeClr val="accent1"/>
+          </a:fillRef>
+          <a:effectRef idx="0">
+            <a:schemeClr val="accent1"/>
+          </a:effectRef>
+          <a:fontRef idx="minor">
+            <a:schemeClr val="lt1"/>
+          </a:fontRef>
+        </p:style>
+        <p:txBody>
+          <a:bodyPr rtlCol="0" anchor="ctr"/>
+          <a:lstStyle/>
+          <a:p>
+            <a:endParaRPr lang="en-US" dirty="0"/>
+          </a:p>
+        </p:txBody>
+      </p:sp>
+      <p:sp>
+        <p:nvSpPr>
+          <p:cNvPr id="8" name="Rectangle 7"/>
+          <p:cNvSpPr/>
+          <p:nvPr/>
+        </p:nvSpPr>
+        <p:spPr>
+          <a:xfrm>
+            <a:off x="2209800" y="1600200"/>
+            <a:ext cx="4343400" cy="914400"/>
+          </a:xfrm>
+          <a:prstGeom prst="rect">
+            <a:avLst/>
+          </a:prstGeom>
+          <a:solidFill>
+            <a:srgbClr val="CF8D2B"/>
+          </a:solidFill>
+          <a:ln>
+            <a:noFill/>
+          </a:ln>
+        </p:spPr>
+        <p:style>
+          <a:lnRef idx="2">
+            <a:schemeClr val="accent1">
+              <a:shade val="50000"/>
+            </a:schemeClr>
+          </a:lnRef>
+          <a:fillRef idx="1">
+            <a:schemeClr val="accent1"/>
+          </a:fillRef>
+          <a:effectRef idx="0">
+            <a:schemeClr val="accent1"/>
+          </a:effectRef>
+          <a:fontRef idx="minor">
+            <a:schemeClr val="lt1"/>
+          </a:fontRef>
+        </p:style>
+        <p:txBody>
+          <a:bodyPr rtlCol="0" anchor="ctr"/>
+          <a:lstStyle/>
+          <a:p>
+            <a:endParaRPr lang="en-US" dirty="0"/>
+          </a:p>
+        </p:txBody>
+      </p:sp>
+      <p:sp>
+        <p:nvSpPr>
+          <p:cNvPr id="9" name="Rectangle 8"/>
+          <p:cNvSpPr/>
+          <p:nvPr/>
+        </p:nvSpPr>
+        <p:spPr>
+          <a:xfrm>
+            <a:off x="2701925" y="2514600"/>
+            <a:ext cx="307976" cy="152400"/>
+          </a:xfrm>
+          <a:prstGeom prst="rect">
+            <a:avLst/>
+          </a:prstGeom>
+          <a:solidFill>
+            <a:srgbClr val="CF8D2B"/>
+          </a:solidFill>
+          <a:ln>
+            <a:noFill/>
+          </a:ln>
+        </p:spPr>
+        <p:style>
+          <a:lnRef idx="2">
+            <a:schemeClr val="accent1">
+              <a:shade val="50000"/>
+            </a:schemeClr>
+          </a:lnRef>
+          <a:fillRef idx="1">
+            <a:schemeClr val="accent1"/>
+          </a:fillRef>
+          <a:effectRef idx="0">
+            <a:schemeClr val="accent1"/>
+          </a:effectRef>
+          <a:fontRef idx="minor">
+            <a:schemeClr val="lt1"/>
+          </a:fontRef>
+        </p:style>
+        <p:txBody>
+          <a:bodyPr rtlCol="0" anchor="ctr"/>
+          <a:lstStyle/>
+          <a:p>
+            <a:endParaRPr lang="en-US" dirty="0"/>
+          </a:p>
+        </p:txBody>
+      </p:sp>
+      <p:sp>
+        <p:nvSpPr>
+          <p:cNvPr id="10" name="Rectangle 9"/>
+          <p:cNvSpPr/>
+          <p:nvPr/>
+        </p:nvSpPr>
+        <p:spPr>
+          <a:xfrm>
+            <a:off x="1219200" y="1066800"/>
+            <a:ext cx="457200" cy="152400"/>
+          </a:xfrm>
+          <a:prstGeom prst="rect">
+            <a:avLst/>
+          </a:prstGeom>
+          <a:solidFill>
+            <a:schemeClr val="accent1">
+              <a:lumMod val="75000"/>
+            </a:schemeClr>
+          </a:solidFill>
+          <a:ln>
+            <a:noFill/>
+          </a:ln>
+        </p:spPr>
+        <p:style>
+          <a:lnRef idx="2">
+            <a:schemeClr val="accent1">
+              <a:shade val="50000"/>
+            </a:schemeClr>
+          </a:lnRef>
+          <a:fillRef idx="1">
+            <a:schemeClr val="accent1"/>
+          </a:fillRef>
+          <a:effectRef idx="0">
+            <a:schemeClr val="accent1"/>
+          </a:effectRef>
+          <a:fontRef idx="minor">
+            <a:schemeClr val="lt1"/>
+          </a:fontRef>
+        </p:style>
+        <p:txBody>
+          <a:bodyPr rtlCol="0" anchor="ctr"/>
+          <a:lstStyle/>
+          <a:p>
+            <a:endParaRPr lang="en-US" dirty="0"/>
+          </a:p>
+        </p:txBody>
+      </p:sp>
+      <p:sp>
+        <p:nvSpPr>
+          <p:cNvPr id="11" name="Rectangle 10"/>
+          <p:cNvSpPr/>
+          <p:nvPr/>
+        </p:nvSpPr>
+        <p:spPr>
+          <a:xfrm>
+            <a:off x="2347912" y="1371600"/>
+            <a:ext cx="1690688" cy="228600"/>
+          </a:xfrm>
+          <a:prstGeom prst="rect">
+            <a:avLst/>
+          </a:prstGeom>
+          <a:solidFill>
+            <a:srgbClr val="CF8D2B"/>
+          </a:solidFill>
+          <a:ln>
+            <a:noFill/>
+          </a:ln>
+        </p:spPr>
+        <p:style>
+          <a:lnRef idx="2">
+            <a:schemeClr val="accent1">
+              <a:shade val="50000"/>
+            </a:schemeClr>
+          </a:lnRef>
+          <a:fillRef idx="1">
+            <a:schemeClr val="accent1"/>
+          </a:fillRef>
+          <a:effectRef idx="0">
+            <a:schemeClr val="accent1"/>
+          </a:effectRef>
+          <a:fontRef idx="minor">
+            <a:schemeClr val="lt1"/>
+          </a:fontRef>
+        </p:style>
+        <p:txBody>
+          <a:bodyPr rtlCol="0" anchor="ctr"/>
+          <a:lstStyle/>
+          <a:p>
+            <a:endParaRPr lang="en-US" dirty="0"/>
+          </a:p>
+        </p:txBody>
+      </p:sp>
+      <p:sp>
+        <p:nvSpPr>
+          <p:cNvPr id="12" name="Isosceles Triangle 11"/>
+          <p:cNvSpPr/>
+          <p:nvPr/>
+        </p:nvSpPr>
+        <p:spPr>
+          <a:xfrm>
+            <a:off x="2209800" y="1371600"/>
+            <a:ext cx="1066800" cy="228600"/>
+          </a:xfrm>
+          <a:prstGeom prst="triangle">
+            <a:avLst>
+              <a:gd name="adj" fmla="val 12500"/>
+            </a:avLst>
+          </a:prstGeom>
+          <a:solidFill>
+            <a:srgbClr val="CF8D2B"/>
+          </a:solidFill>
+          <a:ln>
+            <a:noFill/>
+          </a:ln>
+        </p:spPr>
+        <p:style>
+          <a:lnRef idx="2">
+            <a:schemeClr val="accent1">
+              <a:shade val="50000"/>
+            </a:schemeClr>
+          </a:lnRef>
+          <a:fillRef idx="1">
+            <a:schemeClr val="accent1"/>
+          </a:fillRef>
+          <a:effectRef idx="0">
+            <a:schemeClr val="accent1"/>
+          </a:effectRef>
+          <a:fontRef idx="minor">
+            <a:schemeClr val="lt1"/>
+          </a:fontRef>
+        </p:style>
+        <p:txBody>
+          <a:bodyPr rtlCol="0" anchor="ctr"/>
+          <a:lstStyle/>
+          <a:p>
+            <a:endParaRPr lang="en-US" dirty="0"/>
+          </a:p>
+        </p:txBody>
+      </p:sp>
+      <p:sp>
+        <p:nvSpPr>
+          <p:cNvPr id="13" name="Isosceles Triangle 12"/>
+          <p:cNvSpPr/>
+          <p:nvPr/>
+        </p:nvSpPr>
+        <p:spPr>
+          <a:xfrm>
+            <a:off x="3810000" y="1371600"/>
+            <a:ext cx="914400" cy="228600"/>
+          </a:xfrm>
+          <a:prstGeom prst="triangle">
+            <a:avLst>
+              <a:gd name="adj" fmla="val 24643"/>
+            </a:avLst>
+          </a:prstGeom>
+          <a:solidFill>
+            <a:srgbClr val="CF8D2B"/>
+          </a:solidFill>
+          <a:ln>
+            <a:noFill/>
+          </a:ln>
+        </p:spPr>
+        <p:style>
+          <a:lnRef idx="2">
+            <a:schemeClr val="accent1">
+              <a:shade val="50000"/>
+            </a:schemeClr>
+          </a:lnRef>
+          <a:fillRef idx="1">
+            <a:schemeClr val="accent1"/>
+          </a:fillRef>
+          <a:effectRef idx="0">
+            <a:schemeClr val="accent1"/>
+          </a:effectRef>
+          <a:fontRef idx="minor">
+            <a:schemeClr val="lt1"/>
+          </a:fontRef>
+        </p:style>
+        <p:txBody>
+          <a:bodyPr rtlCol="0" anchor="ctr"/>
+          <a:lstStyle/>
+          <a:p>
+            <a:endParaRPr lang="en-US" dirty="0"/>
+          </a:p>
+        </p:txBody>
+      </p:sp>
+      <p:sp>
+        <p:nvSpPr>
+          <p:cNvPr id="14" name="Rectangle 13"/>
+          <p:cNvSpPr/>
+          <p:nvPr/>
+        </p:nvSpPr>
+        <p:spPr>
+          <a:xfrm>
+            <a:off x="2286000" y="5410200"/>
+            <a:ext cx="4343400" cy="762000"/>
+          </a:xfrm>
+          <a:prstGeom prst="rect">
+            <a:avLst/>
+          </a:prstGeom>
+          <a:solidFill>
+            <a:srgbClr val="8AAC46"/>
+          </a:solidFill>
+          <a:ln>
+            <a:noFill/>
+          </a:ln>
+        </p:spPr>
+        <p:style>
+          <a:lnRef idx="2">
+            <a:schemeClr val="accent1">
+              <a:shade val="50000"/>
+            </a:schemeClr>
+          </a:lnRef>
+          <a:fillRef idx="1">
+            <a:schemeClr val="accent1"/>
+          </a:fillRef>
+          <a:effectRef idx="0">
+            <a:schemeClr val="accent1"/>
+          </a:effectRef>
+          <a:fontRef idx="minor">
+            <a:schemeClr val="lt1"/>
+          </a:fontRef>
+        </p:style>
+        <p:txBody>
+          <a:bodyPr rtlCol="0" anchor="ctr"/>
+          <a:lstStyle/>
+          <a:p>
+            <a:endParaRPr lang="en-US" dirty="0"/>
+          </a:p>
+        </p:txBody>
+      </p:sp>
+      <p:sp>
+        <p:nvSpPr>
+          <p:cNvPr id="15" name="Rectangle 14"/>
+          <p:cNvSpPr/>
+          <p:nvPr/>
+        </p:nvSpPr>
+        <p:spPr>
+          <a:xfrm>
+            <a:off x="2778125" y="6172200"/>
+            <a:ext cx="307976" cy="152400"/>
+          </a:xfrm>
+          <a:prstGeom prst="rect">
+            <a:avLst/>
+          </a:prstGeom>
+          <a:solidFill>
+            <a:srgbClr val="8AAC46"/>
+          </a:solidFill>
+          <a:ln>
+            <a:noFill/>
+          </a:ln>
+        </p:spPr>
+        <p:style>
+          <a:lnRef idx="2">
+            <a:schemeClr val="accent1">
+              <a:shade val="50000"/>
+            </a:schemeClr>
+          </a:lnRef>
+          <a:fillRef idx="1">
+            <a:schemeClr val="accent1"/>
+          </a:fillRef>
+          <a:effectRef idx="0">
+            <a:schemeClr val="accent1"/>
+          </a:effectRef>
+          <a:fontRef idx="minor">
+            <a:schemeClr val="lt1"/>
+          </a:fontRef>
+        </p:style>
+        <p:txBody>
+          <a:bodyPr rtlCol="0" anchor="ctr"/>
+          <a:lstStyle/>
+          <a:p>
+            <a:endParaRPr lang="en-US" dirty="0"/>
+          </a:p>
+        </p:txBody>
+      </p:sp>
+      <p:sp>
+        <p:nvSpPr>
+          <p:cNvPr id="16" name="Rectangle 15"/>
+          <p:cNvSpPr/>
+          <p:nvPr/>
+        </p:nvSpPr>
+        <p:spPr>
+          <a:xfrm>
+            <a:off x="2286000" y="5257800"/>
+            <a:ext cx="457200" cy="152400"/>
+          </a:xfrm>
+          <a:prstGeom prst="rect">
+            <a:avLst/>
+          </a:prstGeom>
+          <a:solidFill>
+            <a:srgbClr val="8AAC46"/>
+          </a:solidFill>
+          <a:ln>
+            <a:noFill/>
+          </a:ln>
+        </p:spPr>
+        <p:style>
+          <a:lnRef idx="2">
+            <a:schemeClr val="accent1">
+              <a:shade val="50000"/>
+            </a:schemeClr>
+          </a:lnRef>
+          <a:fillRef idx="1">
+            <a:schemeClr val="accent1"/>
+          </a:fillRef>
+          <a:effectRef idx="0">
+            <a:schemeClr val="accent1"/>
+          </a:effectRef>
+          <a:fontRef idx="minor">
+            <a:schemeClr val="lt1"/>
+          </a:fontRef>
+        </p:style>
+        <p:txBody>
+          <a:bodyPr rtlCol="0" anchor="ctr"/>
+          <a:lstStyle/>
+          <a:p>
+            <a:endParaRPr lang="en-US" dirty="0"/>
+          </a:p>
+        </p:txBody>
+      </p:sp>
+      <p:sp>
+        <p:nvSpPr>
+          <p:cNvPr id="17" name="Rectangle 16"/>
+          <p:cNvSpPr/>
+          <p:nvPr/>
+        </p:nvSpPr>
+        <p:spPr>
+          <a:xfrm>
+            <a:off x="3124200" y="5257800"/>
+            <a:ext cx="3505200" cy="152400"/>
+          </a:xfrm>
+          <a:prstGeom prst="rect">
+            <a:avLst/>
+          </a:prstGeom>
+          <a:solidFill>
+            <a:srgbClr val="8AAC46"/>
           </a:solidFill>
           <a:ln>
             <a:noFill/>

</xml_diff>

<commit_message>
Inserting block groups above and in between other blocks and showing insertion point (empty block)
</commit_message>
<xml_diff>
--- a/HMSWebTest-Pen/Assets/Images/hmsgraphics.pptx
+++ b/HMSWebTest-Pen/Assets/Images/hmsgraphics.pptx
@@ -209,7 +209,7 @@
             <a:fld id="{6153BB3E-9447-4512-867E-C40997E12B5B}" type="datetimeFigureOut">
               <a:rPr lang="en-US" smtClean="0"/>
               <a:pPr/>
-              <a:t>4/22/2017</a:t>
+              <a:t>4/27/2017</a:t>
             </a:fld>
             <a:endParaRPr lang="en-US"/>
           </a:p>
@@ -739,7 +739,7 @@
             <a:fld id="{090B515E-C25E-45EE-BA79-D334A31660AC}" type="datetimeFigureOut">
               <a:rPr lang="en-US" smtClean="0"/>
               <a:pPr/>
-              <a:t>4/22/2017</a:t>
+              <a:t>4/27/2017</a:t>
             </a:fld>
             <a:endParaRPr lang="en-US"/>
           </a:p>
@@ -906,7 +906,7 @@
             <a:fld id="{090B515E-C25E-45EE-BA79-D334A31660AC}" type="datetimeFigureOut">
               <a:rPr lang="en-US" smtClean="0"/>
               <a:pPr/>
-              <a:t>4/22/2017</a:t>
+              <a:t>4/27/2017</a:t>
             </a:fld>
             <a:endParaRPr lang="en-US"/>
           </a:p>
@@ -1083,7 +1083,7 @@
             <a:fld id="{090B515E-C25E-45EE-BA79-D334A31660AC}" type="datetimeFigureOut">
               <a:rPr lang="en-US" smtClean="0"/>
               <a:pPr/>
-              <a:t>4/22/2017</a:t>
+              <a:t>4/27/2017</a:t>
             </a:fld>
             <a:endParaRPr lang="en-US"/>
           </a:p>
@@ -1250,7 +1250,7 @@
             <a:fld id="{090B515E-C25E-45EE-BA79-D334A31660AC}" type="datetimeFigureOut">
               <a:rPr lang="en-US" smtClean="0"/>
               <a:pPr/>
-              <a:t>4/22/2017</a:t>
+              <a:t>4/27/2017</a:t>
             </a:fld>
             <a:endParaRPr lang="en-US"/>
           </a:p>
@@ -1493,7 +1493,7 @@
             <a:fld id="{090B515E-C25E-45EE-BA79-D334A31660AC}" type="datetimeFigureOut">
               <a:rPr lang="en-US" smtClean="0"/>
               <a:pPr/>
-              <a:t>4/22/2017</a:t>
+              <a:t>4/27/2017</a:t>
             </a:fld>
             <a:endParaRPr lang="en-US"/>
           </a:p>
@@ -1778,7 +1778,7 @@
             <a:fld id="{090B515E-C25E-45EE-BA79-D334A31660AC}" type="datetimeFigureOut">
               <a:rPr lang="en-US" smtClean="0"/>
               <a:pPr/>
-              <a:t>4/22/2017</a:t>
+              <a:t>4/27/2017</a:t>
             </a:fld>
             <a:endParaRPr lang="en-US"/>
           </a:p>
@@ -2197,7 +2197,7 @@
             <a:fld id="{090B515E-C25E-45EE-BA79-D334A31660AC}" type="datetimeFigureOut">
               <a:rPr lang="en-US" smtClean="0"/>
               <a:pPr/>
-              <a:t>4/22/2017</a:t>
+              <a:t>4/27/2017</a:t>
             </a:fld>
             <a:endParaRPr lang="en-US"/>
           </a:p>
@@ -2312,7 +2312,7 @@
             <a:fld id="{090B515E-C25E-45EE-BA79-D334A31660AC}" type="datetimeFigureOut">
               <a:rPr lang="en-US" smtClean="0"/>
               <a:pPr/>
-              <a:t>4/22/2017</a:t>
+              <a:t>4/27/2017</a:t>
             </a:fld>
             <a:endParaRPr lang="en-US"/>
           </a:p>
@@ -2404,7 +2404,7 @@
             <a:fld id="{090B515E-C25E-45EE-BA79-D334A31660AC}" type="datetimeFigureOut">
               <a:rPr lang="en-US" smtClean="0"/>
               <a:pPr/>
-              <a:t>4/22/2017</a:t>
+              <a:t>4/27/2017</a:t>
             </a:fld>
             <a:endParaRPr lang="en-US"/>
           </a:p>
@@ -2678,7 +2678,7 @@
             <a:fld id="{090B515E-C25E-45EE-BA79-D334A31660AC}" type="datetimeFigureOut">
               <a:rPr lang="en-US" smtClean="0"/>
               <a:pPr/>
-              <a:t>4/22/2017</a:t>
+              <a:t>4/27/2017</a:t>
             </a:fld>
             <a:endParaRPr lang="en-US"/>
           </a:p>
@@ -2928,7 +2928,7 @@
             <a:fld id="{090B515E-C25E-45EE-BA79-D334A31660AC}" type="datetimeFigureOut">
               <a:rPr lang="en-US" smtClean="0"/>
               <a:pPr/>
-              <a:t>4/22/2017</a:t>
+              <a:t>4/27/2017</a:t>
             </a:fld>
             <a:endParaRPr lang="en-US"/>
           </a:p>
@@ -3138,7 +3138,7 @@
             <a:fld id="{090B515E-C25E-45EE-BA79-D334A31660AC}" type="datetimeFigureOut">
               <a:rPr lang="en-US" smtClean="0"/>
               <a:pPr/>
-              <a:t>4/22/2017</a:t>
+              <a:t>4/27/2017</a:t>
             </a:fld>
             <a:endParaRPr lang="en-US"/>
           </a:p>
@@ -12023,194 +12023,209 @@
           <a:chExt cx="0" cy="0"/>
         </a:xfrm>
       </p:grpSpPr>
-      <p:sp>
-        <p:nvSpPr>
-          <p:cNvPr id="4" name="Rectangle 3"/>
-          <p:cNvSpPr/>
+      <p:grpSp>
+        <p:nvGrpSpPr>
+          <p:cNvPr id="18" name="Group 17"/>
+          <p:cNvGrpSpPr/>
           <p:nvPr/>
-        </p:nvSpPr>
-        <p:spPr>
+        </p:nvGrpSpPr>
+        <p:grpSpPr>
           <a:xfrm>
-            <a:off x="2286000" y="3581400"/>
-            <a:ext cx="4343400" cy="762000"/>
-          </a:xfrm>
-          <a:prstGeom prst="rect">
-            <a:avLst/>
-          </a:prstGeom>
-          <a:solidFill>
-            <a:schemeClr val="accent1">
-              <a:lumMod val="75000"/>
-            </a:schemeClr>
-          </a:solidFill>
-          <a:ln>
-            <a:noFill/>
-          </a:ln>
-        </p:spPr>
-        <p:style>
-          <a:lnRef idx="2">
-            <a:schemeClr val="accent1">
-              <a:shade val="50000"/>
-            </a:schemeClr>
-          </a:lnRef>
-          <a:fillRef idx="1">
-            <a:schemeClr val="accent1"/>
-          </a:fillRef>
-          <a:effectRef idx="0">
-            <a:schemeClr val="accent1"/>
-          </a:effectRef>
-          <a:fontRef idx="minor">
-            <a:schemeClr val="lt1"/>
-          </a:fontRef>
-        </p:style>
-        <p:txBody>
-          <a:bodyPr rtlCol="0" anchor="ctr"/>
-          <a:lstStyle/>
-          <a:p>
-            <a:endParaRPr lang="en-US" dirty="0"/>
-          </a:p>
-        </p:txBody>
-      </p:sp>
-      <p:sp>
-        <p:nvSpPr>
-          <p:cNvPr id="5" name="Rectangle 4"/>
-          <p:cNvSpPr/>
-          <p:nvPr/>
-        </p:nvSpPr>
-        <p:spPr>
-          <a:xfrm>
-            <a:off x="2778125" y="4343400"/>
-            <a:ext cx="307976" cy="152400"/>
-          </a:xfrm>
-          <a:prstGeom prst="rect">
-            <a:avLst/>
-          </a:prstGeom>
-          <a:solidFill>
-            <a:schemeClr val="accent1">
-              <a:lumMod val="75000"/>
-            </a:schemeClr>
-          </a:solidFill>
-          <a:ln>
-            <a:noFill/>
-          </a:ln>
-        </p:spPr>
-        <p:style>
-          <a:lnRef idx="2">
-            <a:schemeClr val="accent1">
-              <a:shade val="50000"/>
-            </a:schemeClr>
-          </a:lnRef>
-          <a:fillRef idx="1">
-            <a:schemeClr val="accent1"/>
-          </a:fillRef>
-          <a:effectRef idx="0">
-            <a:schemeClr val="accent1"/>
-          </a:effectRef>
-          <a:fontRef idx="minor">
-            <a:schemeClr val="lt1"/>
-          </a:fontRef>
-        </p:style>
-        <p:txBody>
-          <a:bodyPr rtlCol="0" anchor="ctr"/>
-          <a:lstStyle/>
-          <a:p>
-            <a:endParaRPr lang="en-US" dirty="0"/>
-          </a:p>
-        </p:txBody>
-      </p:sp>
-      <p:sp>
-        <p:nvSpPr>
-          <p:cNvPr id="6" name="Rectangle 5"/>
-          <p:cNvSpPr/>
-          <p:nvPr/>
-        </p:nvSpPr>
-        <p:spPr>
-          <a:xfrm>
-            <a:off x="2286000" y="3429000"/>
-            <a:ext cx="457200" cy="152400"/>
-          </a:xfrm>
-          <a:prstGeom prst="rect">
-            <a:avLst/>
-          </a:prstGeom>
-          <a:solidFill>
-            <a:schemeClr val="accent1">
-              <a:lumMod val="75000"/>
-            </a:schemeClr>
-          </a:solidFill>
-          <a:ln>
-            <a:noFill/>
-          </a:ln>
-        </p:spPr>
-        <p:style>
-          <a:lnRef idx="2">
-            <a:schemeClr val="accent1">
-              <a:shade val="50000"/>
-            </a:schemeClr>
-          </a:lnRef>
-          <a:fillRef idx="1">
-            <a:schemeClr val="accent1"/>
-          </a:fillRef>
-          <a:effectRef idx="0">
-            <a:schemeClr val="accent1"/>
-          </a:effectRef>
-          <a:fontRef idx="minor">
-            <a:schemeClr val="lt1"/>
-          </a:fontRef>
-        </p:style>
-        <p:txBody>
-          <a:bodyPr rtlCol="0" anchor="ctr"/>
-          <a:lstStyle/>
-          <a:p>
-            <a:endParaRPr lang="en-US" dirty="0"/>
-          </a:p>
-        </p:txBody>
-      </p:sp>
-      <p:sp>
-        <p:nvSpPr>
-          <p:cNvPr id="7" name="Rectangle 6"/>
-          <p:cNvSpPr/>
-          <p:nvPr/>
-        </p:nvSpPr>
-        <p:spPr>
-          <a:xfrm>
-            <a:off x="3124200" y="3429000"/>
-            <a:ext cx="3505200" cy="152400"/>
-          </a:xfrm>
-          <a:prstGeom prst="rect">
-            <a:avLst/>
-          </a:prstGeom>
-          <a:solidFill>
-            <a:schemeClr val="accent1">
-              <a:lumMod val="75000"/>
-            </a:schemeClr>
-          </a:solidFill>
-          <a:ln>
-            <a:noFill/>
-          </a:ln>
-        </p:spPr>
-        <p:style>
-          <a:lnRef idx="2">
-            <a:schemeClr val="accent1">
-              <a:shade val="50000"/>
-            </a:schemeClr>
-          </a:lnRef>
-          <a:fillRef idx="1">
-            <a:schemeClr val="accent1"/>
-          </a:fillRef>
-          <a:effectRef idx="0">
-            <a:schemeClr val="accent1"/>
-          </a:effectRef>
-          <a:fontRef idx="minor">
-            <a:schemeClr val="lt1"/>
-          </a:fontRef>
-        </p:style>
-        <p:txBody>
-          <a:bodyPr rtlCol="0" anchor="ctr"/>
-          <a:lstStyle/>
-          <a:p>
-            <a:endParaRPr lang="en-US" dirty="0"/>
-          </a:p>
-        </p:txBody>
-      </p:sp>
+            <a:off x="5943600" y="2590800"/>
+            <a:ext cx="4343400" cy="1066800"/>
+            <a:chOff x="2286000" y="3429000"/>
+            <a:chExt cx="4343400" cy="1066800"/>
+          </a:xfrm>
+        </p:grpSpPr>
+        <p:sp>
+          <p:nvSpPr>
+            <p:cNvPr id="4" name="Rectangle 3"/>
+            <p:cNvSpPr/>
+            <p:nvPr/>
+          </p:nvSpPr>
+          <p:spPr>
+            <a:xfrm>
+              <a:off x="2286000" y="3581400"/>
+              <a:ext cx="4343400" cy="762000"/>
+            </a:xfrm>
+            <a:prstGeom prst="rect">
+              <a:avLst/>
+            </a:prstGeom>
+            <a:solidFill>
+              <a:schemeClr val="accent1">
+                <a:lumMod val="75000"/>
+              </a:schemeClr>
+            </a:solidFill>
+            <a:ln>
+              <a:noFill/>
+            </a:ln>
+          </p:spPr>
+          <p:style>
+            <a:lnRef idx="2">
+              <a:schemeClr val="accent1">
+                <a:shade val="50000"/>
+              </a:schemeClr>
+            </a:lnRef>
+            <a:fillRef idx="1">
+              <a:schemeClr val="accent1"/>
+            </a:fillRef>
+            <a:effectRef idx="0">
+              <a:schemeClr val="accent1"/>
+            </a:effectRef>
+            <a:fontRef idx="minor">
+              <a:schemeClr val="lt1"/>
+            </a:fontRef>
+          </p:style>
+          <p:txBody>
+            <a:bodyPr rtlCol="0" anchor="ctr"/>
+            <a:lstStyle/>
+            <a:p>
+              <a:endParaRPr lang="en-US" dirty="0"/>
+            </a:p>
+          </p:txBody>
+        </p:sp>
+        <p:sp>
+          <p:nvSpPr>
+            <p:cNvPr id="5" name="Rectangle 4"/>
+            <p:cNvSpPr/>
+            <p:nvPr/>
+          </p:nvSpPr>
+          <p:spPr>
+            <a:xfrm>
+              <a:off x="2778125" y="4343400"/>
+              <a:ext cx="307976" cy="152400"/>
+            </a:xfrm>
+            <a:prstGeom prst="rect">
+              <a:avLst/>
+            </a:prstGeom>
+            <a:solidFill>
+              <a:schemeClr val="accent1">
+                <a:lumMod val="75000"/>
+              </a:schemeClr>
+            </a:solidFill>
+            <a:ln>
+              <a:noFill/>
+            </a:ln>
+          </p:spPr>
+          <p:style>
+            <a:lnRef idx="2">
+              <a:schemeClr val="accent1">
+                <a:shade val="50000"/>
+              </a:schemeClr>
+            </a:lnRef>
+            <a:fillRef idx="1">
+              <a:schemeClr val="accent1"/>
+            </a:fillRef>
+            <a:effectRef idx="0">
+              <a:schemeClr val="accent1"/>
+            </a:effectRef>
+            <a:fontRef idx="minor">
+              <a:schemeClr val="lt1"/>
+            </a:fontRef>
+          </p:style>
+          <p:txBody>
+            <a:bodyPr rtlCol="0" anchor="ctr"/>
+            <a:lstStyle/>
+            <a:p>
+              <a:endParaRPr lang="en-US" dirty="0"/>
+            </a:p>
+          </p:txBody>
+        </p:sp>
+        <p:sp>
+          <p:nvSpPr>
+            <p:cNvPr id="6" name="Rectangle 5"/>
+            <p:cNvSpPr/>
+            <p:nvPr/>
+          </p:nvSpPr>
+          <p:spPr>
+            <a:xfrm>
+              <a:off x="2286000" y="3429000"/>
+              <a:ext cx="457200" cy="152400"/>
+            </a:xfrm>
+            <a:prstGeom prst="rect">
+              <a:avLst/>
+            </a:prstGeom>
+            <a:solidFill>
+              <a:schemeClr val="accent1">
+                <a:lumMod val="75000"/>
+              </a:schemeClr>
+            </a:solidFill>
+            <a:ln>
+              <a:noFill/>
+            </a:ln>
+          </p:spPr>
+          <p:style>
+            <a:lnRef idx="2">
+              <a:schemeClr val="accent1">
+                <a:shade val="50000"/>
+              </a:schemeClr>
+            </a:lnRef>
+            <a:fillRef idx="1">
+              <a:schemeClr val="accent1"/>
+            </a:fillRef>
+            <a:effectRef idx="0">
+              <a:schemeClr val="accent1"/>
+            </a:effectRef>
+            <a:fontRef idx="minor">
+              <a:schemeClr val="lt1"/>
+            </a:fontRef>
+          </p:style>
+          <p:txBody>
+            <a:bodyPr rtlCol="0" anchor="ctr"/>
+            <a:lstStyle/>
+            <a:p>
+              <a:endParaRPr lang="en-US" dirty="0"/>
+            </a:p>
+          </p:txBody>
+        </p:sp>
+        <p:sp>
+          <p:nvSpPr>
+            <p:cNvPr id="7" name="Rectangle 6"/>
+            <p:cNvSpPr/>
+            <p:nvPr/>
+          </p:nvSpPr>
+          <p:spPr>
+            <a:xfrm>
+              <a:off x="3124200" y="3429000"/>
+              <a:ext cx="3505200" cy="152400"/>
+            </a:xfrm>
+            <a:prstGeom prst="rect">
+              <a:avLst/>
+            </a:prstGeom>
+            <a:solidFill>
+              <a:schemeClr val="accent1">
+                <a:lumMod val="75000"/>
+              </a:schemeClr>
+            </a:solidFill>
+            <a:ln>
+              <a:noFill/>
+            </a:ln>
+          </p:spPr>
+          <p:style>
+            <a:lnRef idx="2">
+              <a:schemeClr val="accent1">
+                <a:shade val="50000"/>
+              </a:schemeClr>
+            </a:lnRef>
+            <a:fillRef idx="1">
+              <a:schemeClr val="accent1"/>
+            </a:fillRef>
+            <a:effectRef idx="0">
+              <a:schemeClr val="accent1"/>
+            </a:effectRef>
+            <a:fontRef idx="minor">
+              <a:schemeClr val="lt1"/>
+            </a:fontRef>
+          </p:style>
+          <p:txBody>
+            <a:bodyPr rtlCol="0" anchor="ctr"/>
+            <a:lstStyle/>
+            <a:p>
+              <a:endParaRPr lang="en-US" dirty="0"/>
+            </a:p>
+          </p:txBody>
+        </p:sp>
+      </p:grpSp>
       <p:sp>
         <p:nvSpPr>
           <p:cNvPr id="8" name="Rectangle 7"/>
@@ -12219,7 +12234,7 @@
         </p:nvSpPr>
         <p:spPr>
           <a:xfrm>
-            <a:off x="2209800" y="1600200"/>
+            <a:off x="1219200" y="685800"/>
             <a:ext cx="4343400" cy="914400"/>
           </a:xfrm>
           <a:prstGeom prst="rect">
@@ -12264,7 +12279,7 @@
         </p:nvSpPr>
         <p:spPr>
           <a:xfrm>
-            <a:off x="2701925" y="2514600"/>
+            <a:off x="1711325" y="1600200"/>
             <a:ext cx="307976" cy="152400"/>
           </a:xfrm>
           <a:prstGeom prst="rect">
@@ -12309,7 +12324,7 @@
         </p:nvSpPr>
         <p:spPr>
           <a:xfrm>
-            <a:off x="1219200" y="1066800"/>
+            <a:off x="228600" y="152400"/>
             <a:ext cx="457200" cy="152400"/>
           </a:xfrm>
           <a:prstGeom prst="rect">
@@ -12356,7 +12371,7 @@
         </p:nvSpPr>
         <p:spPr>
           <a:xfrm>
-            <a:off x="2347912" y="1371600"/>
+            <a:off x="1357312" y="457200"/>
             <a:ext cx="1690688" cy="228600"/>
           </a:xfrm>
           <a:prstGeom prst="rect">
@@ -12401,7 +12416,7 @@
         </p:nvSpPr>
         <p:spPr>
           <a:xfrm>
-            <a:off x="2209800" y="1371600"/>
+            <a:off x="1219200" y="457200"/>
             <a:ext cx="1066800" cy="228600"/>
           </a:xfrm>
           <a:prstGeom prst="triangle">
@@ -12448,7 +12463,7 @@
         </p:nvSpPr>
         <p:spPr>
           <a:xfrm>
-            <a:off x="3810000" y="1371600"/>
+            <a:off x="2819400" y="457200"/>
             <a:ext cx="914400" cy="228600"/>
           </a:xfrm>
           <a:prstGeom prst="triangle">
@@ -12495,7 +12510,7 @@
         </p:nvSpPr>
         <p:spPr>
           <a:xfrm>
-            <a:off x="2286000" y="5410200"/>
+            <a:off x="1295400" y="4495800"/>
             <a:ext cx="4343400" cy="762000"/>
           </a:xfrm>
           <a:prstGeom prst="rect">
@@ -12540,7 +12555,7 @@
         </p:nvSpPr>
         <p:spPr>
           <a:xfrm>
-            <a:off x="2778125" y="6172200"/>
+            <a:off x="1787525" y="5257800"/>
             <a:ext cx="307976" cy="152400"/>
           </a:xfrm>
           <a:prstGeom prst="rect">
@@ -12585,7 +12600,7 @@
         </p:nvSpPr>
         <p:spPr>
           <a:xfrm>
-            <a:off x="2286000" y="5257800"/>
+            <a:off x="1295400" y="4343400"/>
             <a:ext cx="457200" cy="152400"/>
           </a:xfrm>
           <a:prstGeom prst="rect">
@@ -12630,7 +12645,7 @@
         </p:nvSpPr>
         <p:spPr>
           <a:xfrm>
-            <a:off x="3124200" y="5257800"/>
+            <a:off x="2133600" y="4343400"/>
             <a:ext cx="3505200" cy="152400"/>
           </a:xfrm>
           <a:prstGeom prst="rect">
@@ -12638,6 +12653,540 @@
           </a:prstGeom>
           <a:solidFill>
             <a:srgbClr val="8AAC46"/>
+          </a:solidFill>
+          <a:ln>
+            <a:noFill/>
+          </a:ln>
+        </p:spPr>
+        <p:style>
+          <a:lnRef idx="2">
+            <a:schemeClr val="accent1">
+              <a:shade val="50000"/>
+            </a:schemeClr>
+          </a:lnRef>
+          <a:fillRef idx="1">
+            <a:schemeClr val="accent1"/>
+          </a:fillRef>
+          <a:effectRef idx="0">
+            <a:schemeClr val="accent1"/>
+          </a:effectRef>
+          <a:fontRef idx="minor">
+            <a:schemeClr val="lt1"/>
+          </a:fontRef>
+        </p:style>
+        <p:txBody>
+          <a:bodyPr rtlCol="0" anchor="ctr"/>
+          <a:lstStyle/>
+          <a:p>
+            <a:endParaRPr lang="en-US" dirty="0"/>
+          </a:p>
+        </p:txBody>
+      </p:sp>
+      <p:grpSp>
+        <p:nvGrpSpPr>
+          <p:cNvPr id="24" name="Group 23"/>
+          <p:cNvGrpSpPr/>
+          <p:nvPr/>
+        </p:nvGrpSpPr>
+        <p:grpSpPr>
+          <a:xfrm>
+            <a:off x="1905000" y="762000"/>
+            <a:ext cx="4343400" cy="228600"/>
+            <a:chOff x="3048000" y="1981200"/>
+            <a:chExt cx="4343400" cy="533400"/>
+          </a:xfrm>
+        </p:grpSpPr>
+        <p:sp>
+          <p:nvSpPr>
+            <p:cNvPr id="20" name="Rectangle 19"/>
+            <p:cNvSpPr/>
+            <p:nvPr/>
+          </p:nvSpPr>
+          <p:spPr>
+            <a:xfrm>
+              <a:off x="3048000" y="2133600"/>
+              <a:ext cx="4343400" cy="228600"/>
+            </a:xfrm>
+            <a:prstGeom prst="rect">
+              <a:avLst/>
+            </a:prstGeom>
+            <a:solidFill>
+              <a:schemeClr val="bg1"/>
+            </a:solidFill>
+            <a:ln>
+              <a:noFill/>
+            </a:ln>
+          </p:spPr>
+          <p:style>
+            <a:lnRef idx="2">
+              <a:schemeClr val="accent1">
+                <a:shade val="50000"/>
+              </a:schemeClr>
+            </a:lnRef>
+            <a:fillRef idx="1">
+              <a:schemeClr val="accent1"/>
+            </a:fillRef>
+            <a:effectRef idx="0">
+              <a:schemeClr val="accent1"/>
+            </a:effectRef>
+            <a:fontRef idx="minor">
+              <a:schemeClr val="lt1"/>
+            </a:fontRef>
+          </p:style>
+          <p:txBody>
+            <a:bodyPr rtlCol="0" anchor="ctr"/>
+            <a:lstStyle/>
+            <a:p>
+              <a:endParaRPr lang="en-US" dirty="0"/>
+            </a:p>
+          </p:txBody>
+        </p:sp>
+        <p:sp>
+          <p:nvSpPr>
+            <p:cNvPr id="21" name="Rectangle 20"/>
+            <p:cNvSpPr/>
+            <p:nvPr/>
+          </p:nvSpPr>
+          <p:spPr>
+            <a:xfrm>
+              <a:off x="3540125" y="2362200"/>
+              <a:ext cx="307976" cy="152400"/>
+            </a:xfrm>
+            <a:prstGeom prst="rect">
+              <a:avLst/>
+            </a:prstGeom>
+            <a:solidFill>
+              <a:schemeClr val="bg1"/>
+            </a:solidFill>
+            <a:ln>
+              <a:noFill/>
+            </a:ln>
+          </p:spPr>
+          <p:style>
+            <a:lnRef idx="2">
+              <a:schemeClr val="accent1">
+                <a:shade val="50000"/>
+              </a:schemeClr>
+            </a:lnRef>
+            <a:fillRef idx="1">
+              <a:schemeClr val="accent1"/>
+            </a:fillRef>
+            <a:effectRef idx="0">
+              <a:schemeClr val="accent1"/>
+            </a:effectRef>
+            <a:fontRef idx="minor">
+              <a:schemeClr val="lt1"/>
+            </a:fontRef>
+          </p:style>
+          <p:txBody>
+            <a:bodyPr rtlCol="0" anchor="ctr"/>
+            <a:lstStyle/>
+            <a:p>
+              <a:endParaRPr lang="en-US" dirty="0"/>
+            </a:p>
+          </p:txBody>
+        </p:sp>
+        <p:sp>
+          <p:nvSpPr>
+            <p:cNvPr id="22" name="Rectangle 21"/>
+            <p:cNvSpPr/>
+            <p:nvPr/>
+          </p:nvSpPr>
+          <p:spPr>
+            <a:xfrm>
+              <a:off x="3048000" y="1981200"/>
+              <a:ext cx="457200" cy="152400"/>
+            </a:xfrm>
+            <a:prstGeom prst="rect">
+              <a:avLst/>
+            </a:prstGeom>
+            <a:solidFill>
+              <a:schemeClr val="bg1"/>
+            </a:solidFill>
+            <a:ln>
+              <a:noFill/>
+            </a:ln>
+          </p:spPr>
+          <p:style>
+            <a:lnRef idx="2">
+              <a:schemeClr val="accent1">
+                <a:shade val="50000"/>
+              </a:schemeClr>
+            </a:lnRef>
+            <a:fillRef idx="1">
+              <a:schemeClr val="accent1"/>
+            </a:fillRef>
+            <a:effectRef idx="0">
+              <a:schemeClr val="accent1"/>
+            </a:effectRef>
+            <a:fontRef idx="minor">
+              <a:schemeClr val="lt1"/>
+            </a:fontRef>
+          </p:style>
+          <p:txBody>
+            <a:bodyPr rtlCol="0" anchor="ctr"/>
+            <a:lstStyle/>
+            <a:p>
+              <a:endParaRPr lang="en-US" dirty="0"/>
+            </a:p>
+          </p:txBody>
+        </p:sp>
+        <p:sp>
+          <p:nvSpPr>
+            <p:cNvPr id="23" name="Rectangle 22"/>
+            <p:cNvSpPr/>
+            <p:nvPr/>
+          </p:nvSpPr>
+          <p:spPr>
+            <a:xfrm>
+              <a:off x="3886200" y="1981200"/>
+              <a:ext cx="3505200" cy="152400"/>
+            </a:xfrm>
+            <a:prstGeom prst="rect">
+              <a:avLst/>
+            </a:prstGeom>
+            <a:solidFill>
+              <a:schemeClr val="bg1"/>
+            </a:solidFill>
+            <a:ln>
+              <a:noFill/>
+            </a:ln>
+          </p:spPr>
+          <p:style>
+            <a:lnRef idx="2">
+              <a:schemeClr val="accent1">
+                <a:shade val="50000"/>
+              </a:schemeClr>
+            </a:lnRef>
+            <a:fillRef idx="1">
+              <a:schemeClr val="accent1"/>
+            </a:fillRef>
+            <a:effectRef idx="0">
+              <a:schemeClr val="accent1"/>
+            </a:effectRef>
+            <a:fontRef idx="minor">
+              <a:schemeClr val="lt1"/>
+            </a:fontRef>
+          </p:style>
+          <p:txBody>
+            <a:bodyPr rtlCol="0" anchor="ctr"/>
+            <a:lstStyle/>
+            <a:p>
+              <a:endParaRPr lang="en-US" dirty="0"/>
+            </a:p>
+          </p:txBody>
+        </p:sp>
+      </p:grpSp>
+      <p:grpSp>
+        <p:nvGrpSpPr>
+          <p:cNvPr id="34" name="Group 33"/>
+          <p:cNvGrpSpPr/>
+          <p:nvPr/>
+        </p:nvGrpSpPr>
+        <p:grpSpPr>
+          <a:xfrm>
+            <a:off x="5448300" y="1638300"/>
+            <a:ext cx="4343400" cy="1066800"/>
+            <a:chOff x="6172200" y="3200400"/>
+            <a:chExt cx="4343400" cy="1066800"/>
+          </a:xfrm>
+          <a:solidFill>
+            <a:srgbClr val="CC3300"/>
+          </a:solidFill>
+        </p:grpSpPr>
+        <p:sp>
+          <p:nvSpPr>
+            <p:cNvPr id="26" name="Rectangle 25"/>
+            <p:cNvSpPr/>
+            <p:nvPr/>
+          </p:nvSpPr>
+          <p:spPr>
+            <a:xfrm>
+              <a:off x="7162800" y="4114800"/>
+              <a:ext cx="307976" cy="152400"/>
+            </a:xfrm>
+            <a:prstGeom prst="rect">
+              <a:avLst/>
+            </a:prstGeom>
+            <a:grpFill/>
+            <a:ln>
+              <a:noFill/>
+            </a:ln>
+          </p:spPr>
+          <p:style>
+            <a:lnRef idx="2">
+              <a:schemeClr val="accent1">
+                <a:shade val="50000"/>
+              </a:schemeClr>
+            </a:lnRef>
+            <a:fillRef idx="1">
+              <a:schemeClr val="accent1"/>
+            </a:fillRef>
+            <a:effectRef idx="0">
+              <a:schemeClr val="accent1"/>
+            </a:effectRef>
+            <a:fontRef idx="minor">
+              <a:schemeClr val="lt1"/>
+            </a:fontRef>
+          </p:style>
+          <p:txBody>
+            <a:bodyPr rtlCol="0" anchor="ctr"/>
+            <a:lstStyle/>
+            <a:p>
+              <a:endParaRPr lang="en-US" dirty="0"/>
+            </a:p>
+          </p:txBody>
+        </p:sp>
+        <p:sp>
+          <p:nvSpPr>
+            <p:cNvPr id="25" name="Rectangle 24"/>
+            <p:cNvSpPr/>
+            <p:nvPr/>
+          </p:nvSpPr>
+          <p:spPr>
+            <a:xfrm>
+              <a:off x="6172200" y="3352800"/>
+              <a:ext cx="4343400" cy="762000"/>
+            </a:xfrm>
+            <a:prstGeom prst="rect">
+              <a:avLst/>
+            </a:prstGeom>
+            <a:grpFill/>
+            <a:ln>
+              <a:noFill/>
+            </a:ln>
+          </p:spPr>
+          <p:style>
+            <a:lnRef idx="2">
+              <a:schemeClr val="accent1">
+                <a:shade val="50000"/>
+              </a:schemeClr>
+            </a:lnRef>
+            <a:fillRef idx="1">
+              <a:schemeClr val="accent1"/>
+            </a:fillRef>
+            <a:effectRef idx="0">
+              <a:schemeClr val="accent1"/>
+            </a:effectRef>
+            <a:fontRef idx="minor">
+              <a:schemeClr val="lt1"/>
+            </a:fontRef>
+          </p:style>
+          <p:txBody>
+            <a:bodyPr rtlCol="0" anchor="ctr"/>
+            <a:lstStyle/>
+            <a:p>
+              <a:endParaRPr lang="en-US" dirty="0"/>
+            </a:p>
+          </p:txBody>
+        </p:sp>
+        <p:sp>
+          <p:nvSpPr>
+            <p:cNvPr id="27" name="Rectangle 26"/>
+            <p:cNvSpPr/>
+            <p:nvPr/>
+          </p:nvSpPr>
+          <p:spPr>
+            <a:xfrm>
+              <a:off x="6172200" y="3200400"/>
+              <a:ext cx="457200" cy="152400"/>
+            </a:xfrm>
+            <a:prstGeom prst="rect">
+              <a:avLst/>
+            </a:prstGeom>
+            <a:grpFill/>
+            <a:ln>
+              <a:noFill/>
+            </a:ln>
+          </p:spPr>
+          <p:style>
+            <a:lnRef idx="2">
+              <a:schemeClr val="accent1">
+                <a:shade val="50000"/>
+              </a:schemeClr>
+            </a:lnRef>
+            <a:fillRef idx="1">
+              <a:schemeClr val="accent1"/>
+            </a:fillRef>
+            <a:effectRef idx="0">
+              <a:schemeClr val="accent1"/>
+            </a:effectRef>
+            <a:fontRef idx="minor">
+              <a:schemeClr val="lt1"/>
+            </a:fontRef>
+          </p:style>
+          <p:txBody>
+            <a:bodyPr rtlCol="0" anchor="ctr"/>
+            <a:lstStyle/>
+            <a:p>
+              <a:endParaRPr lang="en-US" dirty="0"/>
+            </a:p>
+          </p:txBody>
+        </p:sp>
+        <p:sp>
+          <p:nvSpPr>
+            <p:cNvPr id="28" name="Rectangle 27"/>
+            <p:cNvSpPr/>
+            <p:nvPr/>
+          </p:nvSpPr>
+          <p:spPr>
+            <a:xfrm>
+              <a:off x="7010400" y="3200400"/>
+              <a:ext cx="3505200" cy="152400"/>
+            </a:xfrm>
+            <a:prstGeom prst="rect">
+              <a:avLst/>
+            </a:prstGeom>
+            <a:grpFill/>
+            <a:ln>
+              <a:noFill/>
+            </a:ln>
+          </p:spPr>
+          <p:style>
+            <a:lnRef idx="2">
+              <a:schemeClr val="accent1">
+                <a:shade val="50000"/>
+              </a:schemeClr>
+            </a:lnRef>
+            <a:fillRef idx="1">
+              <a:schemeClr val="accent1"/>
+            </a:fillRef>
+            <a:effectRef idx="0">
+              <a:schemeClr val="accent1"/>
+            </a:effectRef>
+            <a:fontRef idx="minor">
+              <a:schemeClr val="lt1"/>
+            </a:fontRef>
+          </p:style>
+          <p:txBody>
+            <a:bodyPr rtlCol="0" anchor="ctr"/>
+            <a:lstStyle/>
+            <a:p>
+              <a:endParaRPr lang="en-US" dirty="0"/>
+            </a:p>
+          </p:txBody>
+        </p:sp>
+      </p:grpSp>
+      <p:grpSp>
+        <p:nvGrpSpPr>
+          <p:cNvPr id="32" name="Group 31"/>
+          <p:cNvGrpSpPr/>
+          <p:nvPr/>
+        </p:nvGrpSpPr>
+        <p:grpSpPr>
+          <a:xfrm>
+            <a:off x="5448300" y="3695700"/>
+            <a:ext cx="4343400" cy="914400"/>
+            <a:chOff x="6172200" y="5334000"/>
+            <a:chExt cx="4343400" cy="914400"/>
+          </a:xfrm>
+          <a:solidFill>
+            <a:srgbClr val="CC3300"/>
+          </a:solidFill>
+        </p:grpSpPr>
+        <p:sp>
+          <p:nvSpPr>
+            <p:cNvPr id="29" name="Rectangle 28"/>
+            <p:cNvSpPr/>
+            <p:nvPr/>
+          </p:nvSpPr>
+          <p:spPr>
+            <a:xfrm>
+              <a:off x="6172200" y="5334000"/>
+              <a:ext cx="4343400" cy="762000"/>
+            </a:xfrm>
+            <a:prstGeom prst="rect">
+              <a:avLst/>
+            </a:prstGeom>
+            <a:grpFill/>
+            <a:ln>
+              <a:noFill/>
+            </a:ln>
+          </p:spPr>
+          <p:style>
+            <a:lnRef idx="2">
+              <a:schemeClr val="accent1">
+                <a:shade val="50000"/>
+              </a:schemeClr>
+            </a:lnRef>
+            <a:fillRef idx="1">
+              <a:schemeClr val="accent1"/>
+            </a:fillRef>
+            <a:effectRef idx="0">
+              <a:schemeClr val="accent1"/>
+            </a:effectRef>
+            <a:fontRef idx="minor">
+              <a:schemeClr val="lt1"/>
+            </a:fontRef>
+          </p:style>
+          <p:txBody>
+            <a:bodyPr rtlCol="0" anchor="ctr"/>
+            <a:lstStyle/>
+            <a:p>
+              <a:endParaRPr lang="en-US" dirty="0"/>
+            </a:p>
+          </p:txBody>
+        </p:sp>
+        <p:sp>
+          <p:nvSpPr>
+            <p:cNvPr id="30" name="Rectangle 29"/>
+            <p:cNvSpPr/>
+            <p:nvPr/>
+          </p:nvSpPr>
+          <p:spPr>
+            <a:xfrm>
+              <a:off x="7159624" y="6096000"/>
+              <a:ext cx="307976" cy="152400"/>
+            </a:xfrm>
+            <a:prstGeom prst="rect">
+              <a:avLst/>
+            </a:prstGeom>
+            <a:grpFill/>
+            <a:ln>
+              <a:noFill/>
+            </a:ln>
+          </p:spPr>
+          <p:style>
+            <a:lnRef idx="2">
+              <a:schemeClr val="accent1">
+                <a:shade val="50000"/>
+              </a:schemeClr>
+            </a:lnRef>
+            <a:fillRef idx="1">
+              <a:schemeClr val="accent1"/>
+            </a:fillRef>
+            <a:effectRef idx="0">
+              <a:schemeClr val="accent1"/>
+            </a:effectRef>
+            <a:fontRef idx="minor">
+              <a:schemeClr val="lt1"/>
+            </a:fontRef>
+          </p:style>
+          <p:txBody>
+            <a:bodyPr rtlCol="0" anchor="ctr"/>
+            <a:lstStyle/>
+            <a:p>
+              <a:endParaRPr lang="en-US" dirty="0"/>
+            </a:p>
+          </p:txBody>
+        </p:sp>
+      </p:grpSp>
+      <p:sp>
+        <p:nvSpPr>
+          <p:cNvPr id="31" name="Rectangle 30"/>
+          <p:cNvSpPr/>
+          <p:nvPr/>
+        </p:nvSpPr>
+        <p:spPr>
+          <a:xfrm>
+            <a:off x="5448300" y="2552700"/>
+            <a:ext cx="457200" cy="1143000"/>
+          </a:xfrm>
+          <a:prstGeom prst="rect">
+            <a:avLst/>
+          </a:prstGeom>
+          <a:solidFill>
+            <a:srgbClr val="CC3300"/>
           </a:solidFill>
           <a:ln>
             <a:noFill/>

</xml_diff>

<commit_message>
Loop block shrinks and expands depending on height of child blocks
</commit_message>
<xml_diff>
--- a/HMSWebTest-Pen/Assets/Images/hmsgraphics.pptx
+++ b/HMSWebTest-Pen/Assets/Images/hmsgraphics.pptx
@@ -209,7 +209,7 @@
             <a:fld id="{6153BB3E-9447-4512-867E-C40997E12B5B}" type="datetimeFigureOut">
               <a:rPr lang="en-US" smtClean="0"/>
               <a:pPr/>
-              <a:t>5/2/2017</a:t>
+              <a:t>5/5/2017</a:t>
             </a:fld>
             <a:endParaRPr lang="en-US"/>
           </a:p>
@@ -739,7 +739,7 @@
             <a:fld id="{090B515E-C25E-45EE-BA79-D334A31660AC}" type="datetimeFigureOut">
               <a:rPr lang="en-US" smtClean="0"/>
               <a:pPr/>
-              <a:t>5/2/2017</a:t>
+              <a:t>5/5/2017</a:t>
             </a:fld>
             <a:endParaRPr lang="en-US"/>
           </a:p>
@@ -906,7 +906,7 @@
             <a:fld id="{090B515E-C25E-45EE-BA79-D334A31660AC}" type="datetimeFigureOut">
               <a:rPr lang="en-US" smtClean="0"/>
               <a:pPr/>
-              <a:t>5/2/2017</a:t>
+              <a:t>5/5/2017</a:t>
             </a:fld>
             <a:endParaRPr lang="en-US"/>
           </a:p>
@@ -1083,7 +1083,7 @@
             <a:fld id="{090B515E-C25E-45EE-BA79-D334A31660AC}" type="datetimeFigureOut">
               <a:rPr lang="en-US" smtClean="0"/>
               <a:pPr/>
-              <a:t>5/2/2017</a:t>
+              <a:t>5/5/2017</a:t>
             </a:fld>
             <a:endParaRPr lang="en-US"/>
           </a:p>
@@ -1250,7 +1250,7 @@
             <a:fld id="{090B515E-C25E-45EE-BA79-D334A31660AC}" type="datetimeFigureOut">
               <a:rPr lang="en-US" smtClean="0"/>
               <a:pPr/>
-              <a:t>5/2/2017</a:t>
+              <a:t>5/5/2017</a:t>
             </a:fld>
             <a:endParaRPr lang="en-US"/>
           </a:p>
@@ -1493,7 +1493,7 @@
             <a:fld id="{090B515E-C25E-45EE-BA79-D334A31660AC}" type="datetimeFigureOut">
               <a:rPr lang="en-US" smtClean="0"/>
               <a:pPr/>
-              <a:t>5/2/2017</a:t>
+              <a:t>5/5/2017</a:t>
             </a:fld>
             <a:endParaRPr lang="en-US"/>
           </a:p>
@@ -1778,7 +1778,7 @@
             <a:fld id="{090B515E-C25E-45EE-BA79-D334A31660AC}" type="datetimeFigureOut">
               <a:rPr lang="en-US" smtClean="0"/>
               <a:pPr/>
-              <a:t>5/2/2017</a:t>
+              <a:t>5/5/2017</a:t>
             </a:fld>
             <a:endParaRPr lang="en-US"/>
           </a:p>
@@ -2197,7 +2197,7 @@
             <a:fld id="{090B515E-C25E-45EE-BA79-D334A31660AC}" type="datetimeFigureOut">
               <a:rPr lang="en-US" smtClean="0"/>
               <a:pPr/>
-              <a:t>5/2/2017</a:t>
+              <a:t>5/5/2017</a:t>
             </a:fld>
             <a:endParaRPr lang="en-US"/>
           </a:p>
@@ -2312,7 +2312,7 @@
             <a:fld id="{090B515E-C25E-45EE-BA79-D334A31660AC}" type="datetimeFigureOut">
               <a:rPr lang="en-US" smtClean="0"/>
               <a:pPr/>
-              <a:t>5/2/2017</a:t>
+              <a:t>5/5/2017</a:t>
             </a:fld>
             <a:endParaRPr lang="en-US"/>
           </a:p>
@@ -2404,7 +2404,7 @@
             <a:fld id="{090B515E-C25E-45EE-BA79-D334A31660AC}" type="datetimeFigureOut">
               <a:rPr lang="en-US" smtClean="0"/>
               <a:pPr/>
-              <a:t>5/2/2017</a:t>
+              <a:t>5/5/2017</a:t>
             </a:fld>
             <a:endParaRPr lang="en-US"/>
           </a:p>
@@ -2678,7 +2678,7 @@
             <a:fld id="{090B515E-C25E-45EE-BA79-D334A31660AC}" type="datetimeFigureOut">
               <a:rPr lang="en-US" smtClean="0"/>
               <a:pPr/>
-              <a:t>5/2/2017</a:t>
+              <a:t>5/5/2017</a:t>
             </a:fld>
             <a:endParaRPr lang="en-US"/>
           </a:p>
@@ -2928,7 +2928,7 @@
             <a:fld id="{090B515E-C25E-45EE-BA79-D334A31660AC}" type="datetimeFigureOut">
               <a:rPr lang="en-US" smtClean="0"/>
               <a:pPr/>
-              <a:t>5/2/2017</a:t>
+              <a:t>5/5/2017</a:t>
             </a:fld>
             <a:endParaRPr lang="en-US"/>
           </a:p>
@@ -3138,7 +3138,7 @@
             <a:fld id="{090B515E-C25E-45EE-BA79-D334A31660AC}" type="datetimeFigureOut">
               <a:rPr lang="en-US" smtClean="0"/>
               <a:pPr/>
-              <a:t>5/2/2017</a:t>
+              <a:t>5/5/2017</a:t>
             </a:fld>
             <a:endParaRPr lang="en-US"/>
           </a:p>
@@ -12031,7 +12031,7 @@
         </p:nvGrpSpPr>
         <p:grpSpPr>
           <a:xfrm>
-            <a:off x="5943600" y="2590800"/>
+            <a:off x="5105400" y="3962400"/>
             <a:ext cx="4343400" cy="1066800"/>
             <a:chOff x="2286000" y="3429000"/>
             <a:chExt cx="4343400" cy="1066800"/>
@@ -12234,7 +12234,7 @@
         </p:nvSpPr>
         <p:spPr>
           <a:xfrm>
-            <a:off x="1219200" y="685800"/>
+            <a:off x="228600" y="685800"/>
             <a:ext cx="4343400" cy="914400"/>
           </a:xfrm>
           <a:prstGeom prst="rect">
@@ -12279,7 +12279,7 @@
         </p:nvSpPr>
         <p:spPr>
           <a:xfrm>
-            <a:off x="1711325" y="1600200"/>
+            <a:off x="720725" y="1600200"/>
             <a:ext cx="307976" cy="152400"/>
           </a:xfrm>
           <a:prstGeom prst="rect">
@@ -12371,7 +12371,7 @@
         </p:nvSpPr>
         <p:spPr>
           <a:xfrm>
-            <a:off x="1357312" y="457200"/>
+            <a:off x="366712" y="457200"/>
             <a:ext cx="1690688" cy="228600"/>
           </a:xfrm>
           <a:prstGeom prst="rect">
@@ -12416,7 +12416,7 @@
         </p:nvSpPr>
         <p:spPr>
           <a:xfrm>
-            <a:off x="1219200" y="457200"/>
+            <a:off x="228600" y="457200"/>
             <a:ext cx="1066800" cy="228600"/>
           </a:xfrm>
           <a:prstGeom prst="triangle">
@@ -12463,7 +12463,7 @@
         </p:nvSpPr>
         <p:spPr>
           <a:xfrm>
-            <a:off x="2819400" y="457200"/>
+            <a:off x="1828800" y="457200"/>
             <a:ext cx="914400" cy="228600"/>
           </a:xfrm>
           <a:prstGeom prst="triangle">
@@ -12502,186 +12502,201 @@
           </a:p>
         </p:txBody>
       </p:sp>
-      <p:sp>
-        <p:nvSpPr>
-          <p:cNvPr id="14" name="Rectangle 13"/>
-          <p:cNvSpPr/>
+      <p:grpSp>
+        <p:nvGrpSpPr>
+          <p:cNvPr id="33" name="Group 32"/>
+          <p:cNvGrpSpPr/>
           <p:nvPr/>
-        </p:nvSpPr>
-        <p:spPr>
+        </p:nvGrpSpPr>
+        <p:grpSpPr>
           <a:xfrm>
-            <a:off x="1295400" y="4495800"/>
-            <a:ext cx="4343400" cy="762000"/>
-          </a:xfrm>
-          <a:prstGeom prst="rect">
-            <a:avLst/>
-          </a:prstGeom>
-          <a:solidFill>
-            <a:srgbClr val="8AAC46"/>
-          </a:solidFill>
-          <a:ln>
-            <a:noFill/>
-          </a:ln>
-        </p:spPr>
-        <p:style>
-          <a:lnRef idx="2">
-            <a:schemeClr val="accent1">
-              <a:shade val="50000"/>
-            </a:schemeClr>
-          </a:lnRef>
-          <a:fillRef idx="1">
-            <a:schemeClr val="accent1"/>
-          </a:fillRef>
-          <a:effectRef idx="0">
-            <a:schemeClr val="accent1"/>
-          </a:effectRef>
-          <a:fontRef idx="minor">
-            <a:schemeClr val="lt1"/>
-          </a:fontRef>
-        </p:style>
-        <p:txBody>
-          <a:bodyPr rtlCol="0" anchor="ctr"/>
-          <a:lstStyle/>
-          <a:p>
-            <a:endParaRPr lang="en-US" dirty="0"/>
-          </a:p>
-        </p:txBody>
-      </p:sp>
-      <p:sp>
-        <p:nvSpPr>
-          <p:cNvPr id="15" name="Rectangle 14"/>
-          <p:cNvSpPr/>
-          <p:nvPr/>
-        </p:nvSpPr>
-        <p:spPr>
-          <a:xfrm>
-            <a:off x="1787525" y="5257800"/>
-            <a:ext cx="307976" cy="152400"/>
-          </a:xfrm>
-          <a:prstGeom prst="rect">
-            <a:avLst/>
-          </a:prstGeom>
-          <a:solidFill>
-            <a:srgbClr val="8AAC46"/>
-          </a:solidFill>
-          <a:ln>
-            <a:noFill/>
-          </a:ln>
-        </p:spPr>
-        <p:style>
-          <a:lnRef idx="2">
-            <a:schemeClr val="accent1">
-              <a:shade val="50000"/>
-            </a:schemeClr>
-          </a:lnRef>
-          <a:fillRef idx="1">
-            <a:schemeClr val="accent1"/>
-          </a:fillRef>
-          <a:effectRef idx="0">
-            <a:schemeClr val="accent1"/>
-          </a:effectRef>
-          <a:fontRef idx="minor">
-            <a:schemeClr val="lt1"/>
-          </a:fontRef>
-        </p:style>
-        <p:txBody>
-          <a:bodyPr rtlCol="0" anchor="ctr"/>
-          <a:lstStyle/>
-          <a:p>
-            <a:endParaRPr lang="en-US" dirty="0"/>
-          </a:p>
-        </p:txBody>
-      </p:sp>
-      <p:sp>
-        <p:nvSpPr>
-          <p:cNvPr id="16" name="Rectangle 15"/>
-          <p:cNvSpPr/>
-          <p:nvPr/>
-        </p:nvSpPr>
-        <p:spPr>
-          <a:xfrm>
-            <a:off x="1295400" y="4343400"/>
-            <a:ext cx="457200" cy="152400"/>
-          </a:xfrm>
-          <a:prstGeom prst="rect">
-            <a:avLst/>
-          </a:prstGeom>
-          <a:solidFill>
-            <a:srgbClr val="8AAC46"/>
-          </a:solidFill>
-          <a:ln>
-            <a:noFill/>
-          </a:ln>
-        </p:spPr>
-        <p:style>
-          <a:lnRef idx="2">
-            <a:schemeClr val="accent1">
-              <a:shade val="50000"/>
-            </a:schemeClr>
-          </a:lnRef>
-          <a:fillRef idx="1">
-            <a:schemeClr val="accent1"/>
-          </a:fillRef>
-          <a:effectRef idx="0">
-            <a:schemeClr val="accent1"/>
-          </a:effectRef>
-          <a:fontRef idx="minor">
-            <a:schemeClr val="lt1"/>
-          </a:fontRef>
-        </p:style>
-        <p:txBody>
-          <a:bodyPr rtlCol="0" anchor="ctr"/>
-          <a:lstStyle/>
-          <a:p>
-            <a:endParaRPr lang="en-US" dirty="0"/>
-          </a:p>
-        </p:txBody>
-      </p:sp>
-      <p:sp>
-        <p:nvSpPr>
-          <p:cNvPr id="17" name="Rectangle 16"/>
-          <p:cNvSpPr/>
-          <p:nvPr/>
-        </p:nvSpPr>
-        <p:spPr>
-          <a:xfrm>
-            <a:off x="2133600" y="4343400"/>
-            <a:ext cx="3505200" cy="152400"/>
-          </a:xfrm>
-          <a:prstGeom prst="rect">
-            <a:avLst/>
-          </a:prstGeom>
-          <a:solidFill>
-            <a:srgbClr val="8AAC46"/>
-          </a:solidFill>
-          <a:ln>
-            <a:noFill/>
-          </a:ln>
-        </p:spPr>
-        <p:style>
-          <a:lnRef idx="2">
-            <a:schemeClr val="accent1">
-              <a:shade val="50000"/>
-            </a:schemeClr>
-          </a:lnRef>
-          <a:fillRef idx="1">
-            <a:schemeClr val="accent1"/>
-          </a:fillRef>
-          <a:effectRef idx="0">
-            <a:schemeClr val="accent1"/>
-          </a:effectRef>
-          <a:fontRef idx="minor">
-            <a:schemeClr val="lt1"/>
-          </a:fontRef>
-        </p:style>
-        <p:txBody>
-          <a:bodyPr rtlCol="0" anchor="ctr"/>
-          <a:lstStyle/>
-          <a:p>
-            <a:endParaRPr lang="en-US" dirty="0"/>
-          </a:p>
-        </p:txBody>
-      </p:sp>
+            <a:off x="228600" y="5562600"/>
+            <a:ext cx="4343400" cy="1066800"/>
+            <a:chOff x="1295400" y="4343400"/>
+            <a:chExt cx="4343400" cy="1066800"/>
+          </a:xfrm>
+        </p:grpSpPr>
+        <p:sp>
+          <p:nvSpPr>
+            <p:cNvPr id="14" name="Rectangle 13"/>
+            <p:cNvSpPr/>
+            <p:nvPr/>
+          </p:nvSpPr>
+          <p:spPr>
+            <a:xfrm>
+              <a:off x="1295400" y="4495800"/>
+              <a:ext cx="4343400" cy="762000"/>
+            </a:xfrm>
+            <a:prstGeom prst="rect">
+              <a:avLst/>
+            </a:prstGeom>
+            <a:solidFill>
+              <a:srgbClr val="8AAC46"/>
+            </a:solidFill>
+            <a:ln>
+              <a:noFill/>
+            </a:ln>
+          </p:spPr>
+          <p:style>
+            <a:lnRef idx="2">
+              <a:schemeClr val="accent1">
+                <a:shade val="50000"/>
+              </a:schemeClr>
+            </a:lnRef>
+            <a:fillRef idx="1">
+              <a:schemeClr val="accent1"/>
+            </a:fillRef>
+            <a:effectRef idx="0">
+              <a:schemeClr val="accent1"/>
+            </a:effectRef>
+            <a:fontRef idx="minor">
+              <a:schemeClr val="lt1"/>
+            </a:fontRef>
+          </p:style>
+          <p:txBody>
+            <a:bodyPr rtlCol="0" anchor="ctr"/>
+            <a:lstStyle/>
+            <a:p>
+              <a:endParaRPr lang="en-US" dirty="0"/>
+            </a:p>
+          </p:txBody>
+        </p:sp>
+        <p:sp>
+          <p:nvSpPr>
+            <p:cNvPr id="15" name="Rectangle 14"/>
+            <p:cNvSpPr/>
+            <p:nvPr/>
+          </p:nvSpPr>
+          <p:spPr>
+            <a:xfrm>
+              <a:off x="1787525" y="5257800"/>
+              <a:ext cx="307976" cy="152400"/>
+            </a:xfrm>
+            <a:prstGeom prst="rect">
+              <a:avLst/>
+            </a:prstGeom>
+            <a:solidFill>
+              <a:srgbClr val="8AAC46"/>
+            </a:solidFill>
+            <a:ln>
+              <a:noFill/>
+            </a:ln>
+          </p:spPr>
+          <p:style>
+            <a:lnRef idx="2">
+              <a:schemeClr val="accent1">
+                <a:shade val="50000"/>
+              </a:schemeClr>
+            </a:lnRef>
+            <a:fillRef idx="1">
+              <a:schemeClr val="accent1"/>
+            </a:fillRef>
+            <a:effectRef idx="0">
+              <a:schemeClr val="accent1"/>
+            </a:effectRef>
+            <a:fontRef idx="minor">
+              <a:schemeClr val="lt1"/>
+            </a:fontRef>
+          </p:style>
+          <p:txBody>
+            <a:bodyPr rtlCol="0" anchor="ctr"/>
+            <a:lstStyle/>
+            <a:p>
+              <a:endParaRPr lang="en-US" dirty="0"/>
+            </a:p>
+          </p:txBody>
+        </p:sp>
+        <p:sp>
+          <p:nvSpPr>
+            <p:cNvPr id="16" name="Rectangle 15"/>
+            <p:cNvSpPr/>
+            <p:nvPr/>
+          </p:nvSpPr>
+          <p:spPr>
+            <a:xfrm>
+              <a:off x="1295400" y="4343400"/>
+              <a:ext cx="457200" cy="152400"/>
+            </a:xfrm>
+            <a:prstGeom prst="rect">
+              <a:avLst/>
+            </a:prstGeom>
+            <a:solidFill>
+              <a:srgbClr val="8AAC46"/>
+            </a:solidFill>
+            <a:ln>
+              <a:noFill/>
+            </a:ln>
+          </p:spPr>
+          <p:style>
+            <a:lnRef idx="2">
+              <a:schemeClr val="accent1">
+                <a:shade val="50000"/>
+              </a:schemeClr>
+            </a:lnRef>
+            <a:fillRef idx="1">
+              <a:schemeClr val="accent1"/>
+            </a:fillRef>
+            <a:effectRef idx="0">
+              <a:schemeClr val="accent1"/>
+            </a:effectRef>
+            <a:fontRef idx="minor">
+              <a:schemeClr val="lt1"/>
+            </a:fontRef>
+          </p:style>
+          <p:txBody>
+            <a:bodyPr rtlCol="0" anchor="ctr"/>
+            <a:lstStyle/>
+            <a:p>
+              <a:endParaRPr lang="en-US" dirty="0"/>
+            </a:p>
+          </p:txBody>
+        </p:sp>
+        <p:sp>
+          <p:nvSpPr>
+            <p:cNvPr id="17" name="Rectangle 16"/>
+            <p:cNvSpPr/>
+            <p:nvPr/>
+          </p:nvSpPr>
+          <p:spPr>
+            <a:xfrm>
+              <a:off x="2133600" y="4343400"/>
+              <a:ext cx="3505200" cy="152400"/>
+            </a:xfrm>
+            <a:prstGeom prst="rect">
+              <a:avLst/>
+            </a:prstGeom>
+            <a:solidFill>
+              <a:srgbClr val="8AAC46"/>
+            </a:solidFill>
+            <a:ln>
+              <a:noFill/>
+            </a:ln>
+          </p:spPr>
+          <p:style>
+            <a:lnRef idx="2">
+              <a:schemeClr val="accent1">
+                <a:shade val="50000"/>
+              </a:schemeClr>
+            </a:lnRef>
+            <a:fillRef idx="1">
+              <a:schemeClr val="accent1"/>
+            </a:fillRef>
+            <a:effectRef idx="0">
+              <a:schemeClr val="accent1"/>
+            </a:effectRef>
+            <a:fontRef idx="minor">
+              <a:schemeClr val="lt1"/>
+            </a:fontRef>
+          </p:style>
+          <p:txBody>
+            <a:bodyPr rtlCol="0" anchor="ctr"/>
+            <a:lstStyle/>
+            <a:p>
+              <a:endParaRPr lang="en-US" dirty="0"/>
+            </a:p>
+          </p:txBody>
+        </p:sp>
+      </p:grpSp>
       <p:grpSp>
         <p:nvGrpSpPr>
           <p:cNvPr id="24" name="Group 23"/>
@@ -12690,7 +12705,7 @@
         </p:nvGrpSpPr>
         <p:grpSpPr>
           <a:xfrm>
-            <a:off x="1905000" y="762000"/>
+            <a:off x="0" y="762000"/>
             <a:ext cx="4343400" cy="228600"/>
             <a:chOff x="3048000" y="1981200"/>
             <a:chExt cx="4343400" cy="533400"/>
@@ -12885,7 +12900,7 @@
         </p:nvGrpSpPr>
         <p:grpSpPr>
           <a:xfrm>
-            <a:off x="5448300" y="1638300"/>
+            <a:off x="5105400" y="1600200"/>
             <a:ext cx="4343400" cy="1066800"/>
             <a:chOff x="6172200" y="3200400"/>
             <a:chExt cx="4343400" cy="1066800"/>
@@ -13069,20 +13084,17 @@
       </p:grpSp>
       <p:grpSp>
         <p:nvGrpSpPr>
-          <p:cNvPr id="32" name="Group 31"/>
+          <p:cNvPr id="35" name="Group 34"/>
           <p:cNvGrpSpPr/>
           <p:nvPr/>
         </p:nvGrpSpPr>
         <p:grpSpPr>
           <a:xfrm>
-            <a:off x="5448300" y="3733800"/>
+            <a:off x="5105400" y="2933700"/>
             <a:ext cx="4343400" cy="914400"/>
-            <a:chOff x="6172200" y="5334000"/>
+            <a:chOff x="5105400" y="2933700"/>
             <a:chExt cx="4343400" cy="914400"/>
           </a:xfrm>
-          <a:solidFill>
-            <a:srgbClr val="CC3300"/>
-          </a:solidFill>
         </p:grpSpPr>
         <p:sp>
           <p:nvSpPr>
@@ -13092,13 +13104,15 @@
           </p:nvSpPr>
           <p:spPr>
             <a:xfrm>
-              <a:off x="6172200" y="5334000"/>
+              <a:off x="5105400" y="2933700"/>
               <a:ext cx="4343400" cy="762000"/>
             </a:xfrm>
             <a:prstGeom prst="rect">
               <a:avLst/>
             </a:prstGeom>
-            <a:grpFill/>
+            <a:solidFill>
+              <a:srgbClr val="CC3300"/>
+            </a:solidFill>
             <a:ln>
               <a:noFill/>
             </a:ln>
@@ -13135,13 +13149,15 @@
           </p:nvSpPr>
           <p:spPr>
             <a:xfrm>
-              <a:off x="7159624" y="6096000"/>
+              <a:off x="5597524" y="3695700"/>
               <a:ext cx="307976" cy="152400"/>
             </a:xfrm>
             <a:prstGeom prst="rect">
               <a:avLst/>
             </a:prstGeom>
-            <a:grpFill/>
+            <a:solidFill>
+              <a:srgbClr val="CC3300"/>
+            </a:solidFill>
             <a:ln>
               <a:noFill/>
             </a:ln>
@@ -13179,8 +13195,8 @@
         </p:nvSpPr>
         <p:spPr>
           <a:xfrm>
-            <a:off x="5448300" y="2552700"/>
-            <a:ext cx="457200" cy="1181100"/>
+            <a:off x="5105400" y="2514600"/>
+            <a:ext cx="457200" cy="419100"/>
           </a:xfrm>
           <a:prstGeom prst="rect">
             <a:avLst/>

</xml_diff>

<commit_message>
Updgraded project to Unity 5.6. Added new logos to ppt.
</commit_message>
<xml_diff>
--- a/HMSWebTest-Pen/Assets/Images/hmsgraphics.pptx
+++ b/HMSWebTest-Pen/Assets/Images/hmsgraphics.pptx
@@ -5,7 +5,7 @@
     <p:sldMasterId id="2147483648" r:id="rId1"/>
   </p:sldMasterIdLst>
   <p:notesMasterIdLst>
-    <p:notesMasterId r:id="rId19"/>
+    <p:notesMasterId r:id="rId20"/>
   </p:notesMasterIdLst>
   <p:sldIdLst>
     <p:sldId id="256" r:id="rId2"/>
@@ -23,8 +23,9 @@
     <p:sldId id="265" r:id="rId14"/>
     <p:sldId id="266" r:id="rId15"/>
     <p:sldId id="268" r:id="rId16"/>
-    <p:sldId id="269" r:id="rId17"/>
-    <p:sldId id="272" r:id="rId18"/>
+    <p:sldId id="273" r:id="rId17"/>
+    <p:sldId id="269" r:id="rId18"/>
+    <p:sldId id="272" r:id="rId19"/>
   </p:sldIdLst>
   <p:sldSz cx="9144000" cy="6858000" type="screen4x3"/>
   <p:notesSz cx="6858000" cy="9144000"/>
@@ -209,7 +210,7 @@
             <a:fld id="{6153BB3E-9447-4512-867E-C40997E12B5B}" type="datetimeFigureOut">
               <a:rPr lang="en-US" smtClean="0"/>
               <a:pPr/>
-              <a:t>5/5/2017</a:t>
+              <a:t>5/24/2017</a:t>
             </a:fld>
             <a:endParaRPr lang="en-US"/>
           </a:p>
@@ -739,7 +740,7 @@
             <a:fld id="{090B515E-C25E-45EE-BA79-D334A31660AC}" type="datetimeFigureOut">
               <a:rPr lang="en-US" smtClean="0"/>
               <a:pPr/>
-              <a:t>5/5/2017</a:t>
+              <a:t>5/24/2017</a:t>
             </a:fld>
             <a:endParaRPr lang="en-US"/>
           </a:p>
@@ -906,7 +907,7 @@
             <a:fld id="{090B515E-C25E-45EE-BA79-D334A31660AC}" type="datetimeFigureOut">
               <a:rPr lang="en-US" smtClean="0"/>
               <a:pPr/>
-              <a:t>5/5/2017</a:t>
+              <a:t>5/24/2017</a:t>
             </a:fld>
             <a:endParaRPr lang="en-US"/>
           </a:p>
@@ -1083,7 +1084,7 @@
             <a:fld id="{090B515E-C25E-45EE-BA79-D334A31660AC}" type="datetimeFigureOut">
               <a:rPr lang="en-US" smtClean="0"/>
               <a:pPr/>
-              <a:t>5/5/2017</a:t>
+              <a:t>5/24/2017</a:t>
             </a:fld>
             <a:endParaRPr lang="en-US"/>
           </a:p>
@@ -1250,7 +1251,7 @@
             <a:fld id="{090B515E-C25E-45EE-BA79-D334A31660AC}" type="datetimeFigureOut">
               <a:rPr lang="en-US" smtClean="0"/>
               <a:pPr/>
-              <a:t>5/5/2017</a:t>
+              <a:t>5/24/2017</a:t>
             </a:fld>
             <a:endParaRPr lang="en-US"/>
           </a:p>
@@ -1493,7 +1494,7 @@
             <a:fld id="{090B515E-C25E-45EE-BA79-D334A31660AC}" type="datetimeFigureOut">
               <a:rPr lang="en-US" smtClean="0"/>
               <a:pPr/>
-              <a:t>5/5/2017</a:t>
+              <a:t>5/24/2017</a:t>
             </a:fld>
             <a:endParaRPr lang="en-US"/>
           </a:p>
@@ -1778,7 +1779,7 @@
             <a:fld id="{090B515E-C25E-45EE-BA79-D334A31660AC}" type="datetimeFigureOut">
               <a:rPr lang="en-US" smtClean="0"/>
               <a:pPr/>
-              <a:t>5/5/2017</a:t>
+              <a:t>5/24/2017</a:t>
             </a:fld>
             <a:endParaRPr lang="en-US"/>
           </a:p>
@@ -2197,7 +2198,7 @@
             <a:fld id="{090B515E-C25E-45EE-BA79-D334A31660AC}" type="datetimeFigureOut">
               <a:rPr lang="en-US" smtClean="0"/>
               <a:pPr/>
-              <a:t>5/5/2017</a:t>
+              <a:t>5/24/2017</a:t>
             </a:fld>
             <a:endParaRPr lang="en-US"/>
           </a:p>
@@ -2312,7 +2313,7 @@
             <a:fld id="{090B515E-C25E-45EE-BA79-D334A31660AC}" type="datetimeFigureOut">
               <a:rPr lang="en-US" smtClean="0"/>
               <a:pPr/>
-              <a:t>5/5/2017</a:t>
+              <a:t>5/24/2017</a:t>
             </a:fld>
             <a:endParaRPr lang="en-US"/>
           </a:p>
@@ -2404,7 +2405,7 @@
             <a:fld id="{090B515E-C25E-45EE-BA79-D334A31660AC}" type="datetimeFigureOut">
               <a:rPr lang="en-US" smtClean="0"/>
               <a:pPr/>
-              <a:t>5/5/2017</a:t>
+              <a:t>5/24/2017</a:t>
             </a:fld>
             <a:endParaRPr lang="en-US"/>
           </a:p>
@@ -2678,7 +2679,7 @@
             <a:fld id="{090B515E-C25E-45EE-BA79-D334A31660AC}" type="datetimeFigureOut">
               <a:rPr lang="en-US" smtClean="0"/>
               <a:pPr/>
-              <a:t>5/5/2017</a:t>
+              <a:t>5/24/2017</a:t>
             </a:fld>
             <a:endParaRPr lang="en-US"/>
           </a:p>
@@ -2928,7 +2929,7 @@
             <a:fld id="{090B515E-C25E-45EE-BA79-D334A31660AC}" type="datetimeFigureOut">
               <a:rPr lang="en-US" smtClean="0"/>
               <a:pPr/>
-              <a:t>5/5/2017</a:t>
+              <a:t>5/24/2017</a:t>
             </a:fld>
             <a:endParaRPr lang="en-US"/>
           </a:p>
@@ -3138,7 +3139,7 @@
             <a:fld id="{090B515E-C25E-45EE-BA79-D334A31660AC}" type="datetimeFigureOut">
               <a:rPr lang="en-US" smtClean="0"/>
               <a:pPr/>
-              <a:t>5/5/2017</a:t>
+              <a:t>5/24/2017</a:t>
             </a:fld>
             <a:endParaRPr lang="en-US"/>
           </a:p>
@@ -11786,6 +11787,1549 @@
       </p:grpSpPr>
       <p:sp>
         <p:nvSpPr>
+          <p:cNvPr id="4" name="Rectangle 3"/>
+          <p:cNvSpPr/>
+          <p:nvPr/>
+        </p:nvSpPr>
+        <p:spPr>
+          <a:xfrm>
+            <a:off x="5791200" y="0"/>
+            <a:ext cx="3352800" cy="3352800"/>
+          </a:xfrm>
+          <a:prstGeom prst="rect">
+            <a:avLst/>
+          </a:prstGeom>
+          <a:solidFill>
+            <a:schemeClr val="accent4">
+              <a:lumMod val="50000"/>
+            </a:schemeClr>
+          </a:solidFill>
+          <a:ln>
+            <a:noFill/>
+          </a:ln>
+        </p:spPr>
+        <p:style>
+          <a:lnRef idx="2">
+            <a:schemeClr val="accent1">
+              <a:shade val="50000"/>
+            </a:schemeClr>
+          </a:lnRef>
+          <a:fillRef idx="1">
+            <a:schemeClr val="accent1"/>
+          </a:fillRef>
+          <a:effectRef idx="0">
+            <a:schemeClr val="accent1"/>
+          </a:effectRef>
+          <a:fontRef idx="minor">
+            <a:schemeClr val="lt1"/>
+          </a:fontRef>
+        </p:style>
+        <p:txBody>
+          <a:bodyPr rtlCol="0" anchor="ctr"/>
+          <a:lstStyle/>
+          <a:p>
+            <a:pPr algn="ctr"/>
+            <a:r>
+              <a:rPr lang="en-US" sz="4400" dirty="0" err="1" smtClean="0">
+                <a:solidFill>
+                  <a:srgbClr val="FFFF00"/>
+                </a:solidFill>
+                <a:latin typeface="Blocked" pitchFamily="2" charset="0"/>
+              </a:rPr>
+              <a:t>elephun</a:t>
+            </a:r>
+            <a:endParaRPr lang="en-US" sz="4400" dirty="0" smtClean="0">
+              <a:solidFill>
+                <a:srgbClr val="FFFF00"/>
+              </a:solidFill>
+              <a:latin typeface="Blocked" pitchFamily="2" charset="0"/>
+            </a:endParaRPr>
+          </a:p>
+          <a:p>
+            <a:pPr algn="ctr"/>
+            <a:endParaRPr lang="en-US" sz="7200" dirty="0">
+              <a:solidFill>
+                <a:srgbClr val="00FF00"/>
+              </a:solidFill>
+              <a:latin typeface="Ananda Namaste" pitchFamily="2" charset="0"/>
+            </a:endParaRPr>
+          </a:p>
+          <a:p>
+            <a:pPr algn="ctr"/>
+            <a:endParaRPr lang="en-US" sz="700" dirty="0">
+              <a:solidFill>
+                <a:srgbClr val="00FF00"/>
+              </a:solidFill>
+              <a:latin typeface="Ananda Namaste" pitchFamily="2" charset="0"/>
+            </a:endParaRPr>
+          </a:p>
+        </p:txBody>
+      </p:sp>
+      <p:sp>
+        <p:nvSpPr>
+          <p:cNvPr id="5" name="Rectangle 4"/>
+          <p:cNvSpPr/>
+          <p:nvPr/>
+        </p:nvSpPr>
+        <p:spPr>
+          <a:xfrm>
+            <a:off x="0" y="0"/>
+            <a:ext cx="3352800" cy="3352800"/>
+          </a:xfrm>
+          <a:prstGeom prst="rect">
+            <a:avLst/>
+          </a:prstGeom>
+          <a:solidFill>
+            <a:schemeClr val="accent3">
+              <a:lumMod val="50000"/>
+            </a:schemeClr>
+          </a:solidFill>
+          <a:ln>
+            <a:noFill/>
+          </a:ln>
+        </p:spPr>
+        <p:style>
+          <a:lnRef idx="2">
+            <a:schemeClr val="accent1">
+              <a:shade val="50000"/>
+            </a:schemeClr>
+          </a:lnRef>
+          <a:fillRef idx="1">
+            <a:schemeClr val="accent1"/>
+          </a:fillRef>
+          <a:effectRef idx="0">
+            <a:schemeClr val="accent1"/>
+          </a:effectRef>
+          <a:fontRef idx="minor">
+            <a:schemeClr val="lt1"/>
+          </a:fontRef>
+        </p:style>
+        <p:txBody>
+          <a:bodyPr rtlCol="0" anchor="ctr"/>
+          <a:lstStyle/>
+          <a:p>
+            <a:pPr algn="ctr"/>
+            <a:r>
+              <a:rPr lang="en-US" sz="4400" dirty="0" err="1" smtClean="0">
+                <a:solidFill>
+                  <a:srgbClr val="FFFF00"/>
+                </a:solidFill>
+                <a:latin typeface="Blocked" pitchFamily="2" charset="0"/>
+              </a:rPr>
+              <a:t>e</a:t>
+            </a:r>
+            <a:r>
+              <a:rPr lang="en-US" sz="4400" dirty="0" err="1" smtClean="0">
+                <a:solidFill>
+                  <a:srgbClr val="FFFF00"/>
+                </a:solidFill>
+                <a:latin typeface="Blocked" pitchFamily="2" charset="0"/>
+              </a:rPr>
+              <a:t>lephun</a:t>
+            </a:r>
+            <a:endParaRPr lang="en-US" sz="4400" dirty="0" smtClean="0">
+              <a:solidFill>
+                <a:srgbClr val="FFFF00"/>
+              </a:solidFill>
+              <a:latin typeface="Blocked" pitchFamily="2" charset="0"/>
+            </a:endParaRPr>
+          </a:p>
+          <a:p>
+            <a:pPr algn="ctr"/>
+            <a:endParaRPr lang="en-US" sz="7200" dirty="0">
+              <a:latin typeface="Ananda Namaste" pitchFamily="2" charset="0"/>
+            </a:endParaRPr>
+          </a:p>
+          <a:p>
+            <a:pPr algn="ctr"/>
+            <a:endParaRPr lang="en-US" sz="700" dirty="0">
+              <a:latin typeface="Ananda Namaste" pitchFamily="2" charset="0"/>
+            </a:endParaRPr>
+          </a:p>
+        </p:txBody>
+      </p:sp>
+      <p:sp>
+        <p:nvSpPr>
+          <p:cNvPr id="6" name="Rectangle 5"/>
+          <p:cNvSpPr/>
+          <p:nvPr/>
+        </p:nvSpPr>
+        <p:spPr>
+          <a:xfrm>
+            <a:off x="1371600" y="1905000"/>
+            <a:ext cx="76200" cy="76200"/>
+          </a:xfrm>
+          <a:prstGeom prst="rect">
+            <a:avLst/>
+          </a:prstGeom>
+          <a:solidFill>
+            <a:srgbClr val="FFFF00"/>
+          </a:solidFill>
+          <a:ln>
+            <a:noFill/>
+          </a:ln>
+        </p:spPr>
+        <p:style>
+          <a:lnRef idx="2">
+            <a:schemeClr val="accent1">
+              <a:shade val="50000"/>
+            </a:schemeClr>
+          </a:lnRef>
+          <a:fillRef idx="1">
+            <a:schemeClr val="accent1"/>
+          </a:fillRef>
+          <a:effectRef idx="0">
+            <a:schemeClr val="accent1"/>
+          </a:effectRef>
+          <a:fontRef idx="minor">
+            <a:schemeClr val="lt1"/>
+          </a:fontRef>
+        </p:style>
+        <p:txBody>
+          <a:bodyPr rtlCol="0" anchor="ctr"/>
+          <a:lstStyle/>
+          <a:p>
+            <a:pPr algn="ctr"/>
+            <a:endParaRPr lang="en-US"/>
+          </a:p>
+        </p:txBody>
+      </p:sp>
+      <p:sp>
+        <p:nvSpPr>
+          <p:cNvPr id="7" name="Rectangle 6"/>
+          <p:cNvSpPr/>
+          <p:nvPr/>
+        </p:nvSpPr>
+        <p:spPr>
+          <a:xfrm>
+            <a:off x="1371600" y="1993100"/>
+            <a:ext cx="76200" cy="76200"/>
+          </a:xfrm>
+          <a:prstGeom prst="rect">
+            <a:avLst/>
+          </a:prstGeom>
+          <a:solidFill>
+            <a:srgbClr val="FFFF00"/>
+          </a:solidFill>
+          <a:ln>
+            <a:noFill/>
+          </a:ln>
+        </p:spPr>
+        <p:style>
+          <a:lnRef idx="2">
+            <a:schemeClr val="accent1">
+              <a:shade val="50000"/>
+            </a:schemeClr>
+          </a:lnRef>
+          <a:fillRef idx="1">
+            <a:schemeClr val="accent1"/>
+          </a:fillRef>
+          <a:effectRef idx="0">
+            <a:schemeClr val="accent1"/>
+          </a:effectRef>
+          <a:fontRef idx="minor">
+            <a:schemeClr val="lt1"/>
+          </a:fontRef>
+        </p:style>
+        <p:txBody>
+          <a:bodyPr rtlCol="0" anchor="ctr"/>
+          <a:lstStyle/>
+          <a:p>
+            <a:pPr algn="ctr"/>
+            <a:endParaRPr lang="en-US" dirty="0"/>
+          </a:p>
+        </p:txBody>
+      </p:sp>
+      <p:sp>
+        <p:nvSpPr>
+          <p:cNvPr id="8" name="Rectangle 7"/>
+          <p:cNvSpPr/>
+          <p:nvPr/>
+        </p:nvSpPr>
+        <p:spPr>
+          <a:xfrm>
+            <a:off x="1371600" y="2081208"/>
+            <a:ext cx="76200" cy="76200"/>
+          </a:xfrm>
+          <a:prstGeom prst="rect">
+            <a:avLst/>
+          </a:prstGeom>
+          <a:solidFill>
+            <a:srgbClr val="FFFF00"/>
+          </a:solidFill>
+          <a:ln>
+            <a:noFill/>
+          </a:ln>
+        </p:spPr>
+        <p:style>
+          <a:lnRef idx="2">
+            <a:schemeClr val="accent1">
+              <a:shade val="50000"/>
+            </a:schemeClr>
+          </a:lnRef>
+          <a:fillRef idx="1">
+            <a:schemeClr val="accent1"/>
+          </a:fillRef>
+          <a:effectRef idx="0">
+            <a:schemeClr val="accent1"/>
+          </a:effectRef>
+          <a:fontRef idx="minor">
+            <a:schemeClr val="lt1"/>
+          </a:fontRef>
+        </p:style>
+        <p:txBody>
+          <a:bodyPr rtlCol="0" anchor="ctr"/>
+          <a:lstStyle/>
+          <a:p>
+            <a:pPr algn="ctr"/>
+            <a:endParaRPr lang="en-US" dirty="0"/>
+          </a:p>
+        </p:txBody>
+      </p:sp>
+      <p:sp>
+        <p:nvSpPr>
+          <p:cNvPr id="9" name="Rectangle 8"/>
+          <p:cNvSpPr/>
+          <p:nvPr/>
+        </p:nvSpPr>
+        <p:spPr>
+          <a:xfrm>
+            <a:off x="1459705" y="1905000"/>
+            <a:ext cx="76200" cy="76200"/>
+          </a:xfrm>
+          <a:prstGeom prst="rect">
+            <a:avLst/>
+          </a:prstGeom>
+          <a:solidFill>
+            <a:srgbClr val="FFFF00"/>
+          </a:solidFill>
+          <a:ln>
+            <a:noFill/>
+          </a:ln>
+        </p:spPr>
+        <p:style>
+          <a:lnRef idx="2">
+            <a:schemeClr val="accent1">
+              <a:shade val="50000"/>
+            </a:schemeClr>
+          </a:lnRef>
+          <a:fillRef idx="1">
+            <a:schemeClr val="accent1"/>
+          </a:fillRef>
+          <a:effectRef idx="0">
+            <a:schemeClr val="accent1"/>
+          </a:effectRef>
+          <a:fontRef idx="minor">
+            <a:schemeClr val="lt1"/>
+          </a:fontRef>
+        </p:style>
+        <p:txBody>
+          <a:bodyPr rtlCol="0" anchor="ctr"/>
+          <a:lstStyle/>
+          <a:p>
+            <a:pPr algn="ctr"/>
+            <a:endParaRPr lang="en-US"/>
+          </a:p>
+        </p:txBody>
+      </p:sp>
+      <p:sp>
+        <p:nvSpPr>
+          <p:cNvPr id="10" name="Rectangle 9"/>
+          <p:cNvSpPr/>
+          <p:nvPr/>
+        </p:nvSpPr>
+        <p:spPr>
+          <a:xfrm>
+            <a:off x="1547818" y="1905000"/>
+            <a:ext cx="76200" cy="76200"/>
+          </a:xfrm>
+          <a:prstGeom prst="rect">
+            <a:avLst/>
+          </a:prstGeom>
+          <a:solidFill>
+            <a:srgbClr val="FFFF00"/>
+          </a:solidFill>
+          <a:ln>
+            <a:noFill/>
+          </a:ln>
+        </p:spPr>
+        <p:style>
+          <a:lnRef idx="2">
+            <a:schemeClr val="accent1">
+              <a:shade val="50000"/>
+            </a:schemeClr>
+          </a:lnRef>
+          <a:fillRef idx="1">
+            <a:schemeClr val="accent1"/>
+          </a:fillRef>
+          <a:effectRef idx="0">
+            <a:schemeClr val="accent1"/>
+          </a:effectRef>
+          <a:fontRef idx="minor">
+            <a:schemeClr val="lt1"/>
+          </a:fontRef>
+        </p:style>
+        <p:txBody>
+          <a:bodyPr rtlCol="0" anchor="ctr"/>
+          <a:lstStyle/>
+          <a:p>
+            <a:pPr algn="ctr"/>
+            <a:endParaRPr lang="en-US"/>
+          </a:p>
+        </p:txBody>
+      </p:sp>
+      <p:sp>
+        <p:nvSpPr>
+          <p:cNvPr id="11" name="Rectangle 10"/>
+          <p:cNvSpPr/>
+          <p:nvPr/>
+        </p:nvSpPr>
+        <p:spPr>
+          <a:xfrm>
+            <a:off x="1371600" y="2169325"/>
+            <a:ext cx="76200" cy="76200"/>
+          </a:xfrm>
+          <a:prstGeom prst="rect">
+            <a:avLst/>
+          </a:prstGeom>
+          <a:solidFill>
+            <a:srgbClr val="FFFF00"/>
+          </a:solidFill>
+          <a:ln>
+            <a:noFill/>
+          </a:ln>
+        </p:spPr>
+        <p:style>
+          <a:lnRef idx="2">
+            <a:schemeClr val="accent1">
+              <a:shade val="50000"/>
+            </a:schemeClr>
+          </a:lnRef>
+          <a:fillRef idx="1">
+            <a:schemeClr val="accent1"/>
+          </a:fillRef>
+          <a:effectRef idx="0">
+            <a:schemeClr val="accent1"/>
+          </a:effectRef>
+          <a:fontRef idx="minor">
+            <a:schemeClr val="lt1"/>
+          </a:fontRef>
+        </p:style>
+        <p:txBody>
+          <a:bodyPr rtlCol="0" anchor="ctr"/>
+          <a:lstStyle/>
+          <a:p>
+            <a:pPr algn="ctr"/>
+            <a:endParaRPr lang="en-US"/>
+          </a:p>
+        </p:txBody>
+      </p:sp>
+      <p:sp>
+        <p:nvSpPr>
+          <p:cNvPr id="12" name="Rectangle 11"/>
+          <p:cNvSpPr/>
+          <p:nvPr/>
+        </p:nvSpPr>
+        <p:spPr>
+          <a:xfrm>
+            <a:off x="1371600" y="2257425"/>
+            <a:ext cx="76200" cy="76200"/>
+          </a:xfrm>
+          <a:prstGeom prst="rect">
+            <a:avLst/>
+          </a:prstGeom>
+          <a:solidFill>
+            <a:srgbClr val="FFFF00"/>
+          </a:solidFill>
+          <a:ln>
+            <a:noFill/>
+          </a:ln>
+        </p:spPr>
+        <p:style>
+          <a:lnRef idx="2">
+            <a:schemeClr val="accent1">
+              <a:shade val="50000"/>
+            </a:schemeClr>
+          </a:lnRef>
+          <a:fillRef idx="1">
+            <a:schemeClr val="accent1"/>
+          </a:fillRef>
+          <a:effectRef idx="0">
+            <a:schemeClr val="accent1"/>
+          </a:effectRef>
+          <a:fontRef idx="minor">
+            <a:schemeClr val="lt1"/>
+          </a:fontRef>
+        </p:style>
+        <p:txBody>
+          <a:bodyPr rtlCol="0" anchor="ctr"/>
+          <a:lstStyle/>
+          <a:p>
+            <a:pPr algn="ctr"/>
+            <a:endParaRPr lang="en-US" dirty="0"/>
+          </a:p>
+        </p:txBody>
+      </p:sp>
+      <p:sp>
+        <p:nvSpPr>
+          <p:cNvPr id="13" name="Rectangle 12"/>
+          <p:cNvSpPr/>
+          <p:nvPr/>
+        </p:nvSpPr>
+        <p:spPr>
+          <a:xfrm>
+            <a:off x="1371600" y="2345536"/>
+            <a:ext cx="76200" cy="76200"/>
+          </a:xfrm>
+          <a:prstGeom prst="rect">
+            <a:avLst/>
+          </a:prstGeom>
+          <a:solidFill>
+            <a:srgbClr val="FFFF00"/>
+          </a:solidFill>
+          <a:ln>
+            <a:noFill/>
+          </a:ln>
+        </p:spPr>
+        <p:style>
+          <a:lnRef idx="2">
+            <a:schemeClr val="accent1">
+              <a:shade val="50000"/>
+            </a:schemeClr>
+          </a:lnRef>
+          <a:fillRef idx="1">
+            <a:schemeClr val="accent1"/>
+          </a:fillRef>
+          <a:effectRef idx="0">
+            <a:schemeClr val="accent1"/>
+          </a:effectRef>
+          <a:fontRef idx="minor">
+            <a:schemeClr val="lt1"/>
+          </a:fontRef>
+        </p:style>
+        <p:txBody>
+          <a:bodyPr rtlCol="0" anchor="ctr"/>
+          <a:lstStyle/>
+          <a:p>
+            <a:pPr algn="ctr"/>
+            <a:endParaRPr lang="en-US"/>
+          </a:p>
+        </p:txBody>
+      </p:sp>
+      <p:sp>
+        <p:nvSpPr>
+          <p:cNvPr id="14" name="Rectangle 13"/>
+          <p:cNvSpPr/>
+          <p:nvPr/>
+        </p:nvSpPr>
+        <p:spPr>
+          <a:xfrm>
+            <a:off x="1371600" y="2433636"/>
+            <a:ext cx="76200" cy="76200"/>
+          </a:xfrm>
+          <a:prstGeom prst="rect">
+            <a:avLst/>
+          </a:prstGeom>
+          <a:solidFill>
+            <a:srgbClr val="FFFF00"/>
+          </a:solidFill>
+          <a:ln>
+            <a:noFill/>
+          </a:ln>
+        </p:spPr>
+        <p:style>
+          <a:lnRef idx="2">
+            <a:schemeClr val="accent1">
+              <a:shade val="50000"/>
+            </a:schemeClr>
+          </a:lnRef>
+          <a:fillRef idx="1">
+            <a:schemeClr val="accent1"/>
+          </a:fillRef>
+          <a:effectRef idx="0">
+            <a:schemeClr val="accent1"/>
+          </a:effectRef>
+          <a:fontRef idx="minor">
+            <a:schemeClr val="lt1"/>
+          </a:fontRef>
+        </p:style>
+        <p:txBody>
+          <a:bodyPr rtlCol="0" anchor="ctr"/>
+          <a:lstStyle/>
+          <a:p>
+            <a:pPr algn="ctr"/>
+            <a:endParaRPr lang="en-US" dirty="0"/>
+          </a:p>
+        </p:txBody>
+      </p:sp>
+      <p:sp>
+        <p:nvSpPr>
+          <p:cNvPr id="15" name="Rectangle 14"/>
+          <p:cNvSpPr/>
+          <p:nvPr/>
+        </p:nvSpPr>
+        <p:spPr>
+          <a:xfrm>
+            <a:off x="1371600" y="2521744"/>
+            <a:ext cx="76200" cy="76200"/>
+          </a:xfrm>
+          <a:prstGeom prst="rect">
+            <a:avLst/>
+          </a:prstGeom>
+          <a:solidFill>
+            <a:srgbClr val="FFFF00"/>
+          </a:solidFill>
+          <a:ln>
+            <a:noFill/>
+          </a:ln>
+        </p:spPr>
+        <p:style>
+          <a:lnRef idx="2">
+            <a:schemeClr val="accent1">
+              <a:shade val="50000"/>
+            </a:schemeClr>
+          </a:lnRef>
+          <a:fillRef idx="1">
+            <a:schemeClr val="accent1"/>
+          </a:fillRef>
+          <a:effectRef idx="0">
+            <a:schemeClr val="accent1"/>
+          </a:effectRef>
+          <a:fontRef idx="minor">
+            <a:schemeClr val="lt1"/>
+          </a:fontRef>
+        </p:style>
+        <p:txBody>
+          <a:bodyPr rtlCol="0" anchor="ctr"/>
+          <a:lstStyle/>
+          <a:p>
+            <a:pPr algn="ctr"/>
+            <a:endParaRPr lang="en-US" dirty="0"/>
+          </a:p>
+        </p:txBody>
+      </p:sp>
+      <p:sp>
+        <p:nvSpPr>
+          <p:cNvPr id="16" name="Rectangle 15"/>
+          <p:cNvSpPr/>
+          <p:nvPr/>
+        </p:nvSpPr>
+        <p:spPr>
+          <a:xfrm>
+            <a:off x="1371600" y="2609861"/>
+            <a:ext cx="76200" cy="76200"/>
+          </a:xfrm>
+          <a:prstGeom prst="rect">
+            <a:avLst/>
+          </a:prstGeom>
+          <a:solidFill>
+            <a:srgbClr val="FFFF00"/>
+          </a:solidFill>
+          <a:ln>
+            <a:noFill/>
+          </a:ln>
+        </p:spPr>
+        <p:style>
+          <a:lnRef idx="2">
+            <a:schemeClr val="accent1">
+              <a:shade val="50000"/>
+            </a:schemeClr>
+          </a:lnRef>
+          <a:fillRef idx="1">
+            <a:schemeClr val="accent1"/>
+          </a:fillRef>
+          <a:effectRef idx="0">
+            <a:schemeClr val="accent1"/>
+          </a:effectRef>
+          <a:fontRef idx="minor">
+            <a:schemeClr val="lt1"/>
+          </a:fontRef>
+        </p:style>
+        <p:txBody>
+          <a:bodyPr rtlCol="0" anchor="ctr"/>
+          <a:lstStyle/>
+          <a:p>
+            <a:pPr algn="ctr"/>
+            <a:endParaRPr lang="en-US"/>
+          </a:p>
+        </p:txBody>
+      </p:sp>
+      <p:sp>
+        <p:nvSpPr>
+          <p:cNvPr id="17" name="Rectangle 16"/>
+          <p:cNvSpPr/>
+          <p:nvPr/>
+        </p:nvSpPr>
+        <p:spPr>
+          <a:xfrm>
+            <a:off x="1371600" y="2698750"/>
+            <a:ext cx="76200" cy="76200"/>
+          </a:xfrm>
+          <a:prstGeom prst="rect">
+            <a:avLst/>
+          </a:prstGeom>
+          <a:solidFill>
+            <a:srgbClr val="FFFF00"/>
+          </a:solidFill>
+          <a:ln>
+            <a:noFill/>
+          </a:ln>
+        </p:spPr>
+        <p:style>
+          <a:lnRef idx="2">
+            <a:schemeClr val="accent1">
+              <a:shade val="50000"/>
+            </a:schemeClr>
+          </a:lnRef>
+          <a:fillRef idx="1">
+            <a:schemeClr val="accent1"/>
+          </a:fillRef>
+          <a:effectRef idx="0">
+            <a:schemeClr val="accent1"/>
+          </a:effectRef>
+          <a:fontRef idx="minor">
+            <a:schemeClr val="lt1"/>
+          </a:fontRef>
+        </p:style>
+        <p:txBody>
+          <a:bodyPr rtlCol="0" anchor="ctr"/>
+          <a:lstStyle/>
+          <a:p>
+            <a:pPr algn="ctr"/>
+            <a:endParaRPr lang="en-US" dirty="0"/>
+          </a:p>
+        </p:txBody>
+      </p:sp>
+      <p:sp>
+        <p:nvSpPr>
+          <p:cNvPr id="18" name="Rectangle 17"/>
+          <p:cNvSpPr/>
+          <p:nvPr/>
+        </p:nvSpPr>
+        <p:spPr>
+          <a:xfrm>
+            <a:off x="1636709" y="1905000"/>
+            <a:ext cx="76200" cy="76200"/>
+          </a:xfrm>
+          <a:prstGeom prst="rect">
+            <a:avLst/>
+          </a:prstGeom>
+          <a:solidFill>
+            <a:srgbClr val="FFFF00"/>
+          </a:solidFill>
+          <a:ln>
+            <a:noFill/>
+          </a:ln>
+        </p:spPr>
+        <p:style>
+          <a:lnRef idx="2">
+            <a:schemeClr val="accent1">
+              <a:shade val="50000"/>
+            </a:schemeClr>
+          </a:lnRef>
+          <a:fillRef idx="1">
+            <a:schemeClr val="accent1"/>
+          </a:fillRef>
+          <a:effectRef idx="0">
+            <a:schemeClr val="accent1"/>
+          </a:effectRef>
+          <a:fontRef idx="minor">
+            <a:schemeClr val="lt1"/>
+          </a:fontRef>
+        </p:style>
+        <p:txBody>
+          <a:bodyPr rtlCol="0" anchor="ctr"/>
+          <a:lstStyle/>
+          <a:p>
+            <a:pPr algn="ctr"/>
+            <a:endParaRPr lang="en-US"/>
+          </a:p>
+        </p:txBody>
+      </p:sp>
+      <p:sp>
+        <p:nvSpPr>
+          <p:cNvPr id="19" name="Rectangle 18"/>
+          <p:cNvSpPr/>
+          <p:nvPr/>
+        </p:nvSpPr>
+        <p:spPr>
+          <a:xfrm>
+            <a:off x="1724822" y="1905000"/>
+            <a:ext cx="76200" cy="76200"/>
+          </a:xfrm>
+          <a:prstGeom prst="rect">
+            <a:avLst/>
+          </a:prstGeom>
+          <a:solidFill>
+            <a:srgbClr val="FFFF00"/>
+          </a:solidFill>
+          <a:ln>
+            <a:noFill/>
+          </a:ln>
+        </p:spPr>
+        <p:style>
+          <a:lnRef idx="2">
+            <a:schemeClr val="accent1">
+              <a:shade val="50000"/>
+            </a:schemeClr>
+          </a:lnRef>
+          <a:fillRef idx="1">
+            <a:schemeClr val="accent1"/>
+          </a:fillRef>
+          <a:effectRef idx="0">
+            <a:schemeClr val="accent1"/>
+          </a:effectRef>
+          <a:fontRef idx="minor">
+            <a:schemeClr val="lt1"/>
+          </a:fontRef>
+        </p:style>
+        <p:txBody>
+          <a:bodyPr rtlCol="0" anchor="ctr"/>
+          <a:lstStyle/>
+          <a:p>
+            <a:pPr algn="ctr"/>
+            <a:endParaRPr lang="en-US"/>
+          </a:p>
+        </p:txBody>
+      </p:sp>
+      <p:sp>
+        <p:nvSpPr>
+          <p:cNvPr id="20" name="Rectangle 19"/>
+          <p:cNvSpPr/>
+          <p:nvPr/>
+        </p:nvSpPr>
+        <p:spPr>
+          <a:xfrm>
+            <a:off x="1812919" y="1905000"/>
+            <a:ext cx="76200" cy="76200"/>
+          </a:xfrm>
+          <a:prstGeom prst="rect">
+            <a:avLst/>
+          </a:prstGeom>
+          <a:solidFill>
+            <a:srgbClr val="FFFF00"/>
+          </a:solidFill>
+          <a:ln>
+            <a:noFill/>
+          </a:ln>
+        </p:spPr>
+        <p:style>
+          <a:lnRef idx="2">
+            <a:schemeClr val="accent1">
+              <a:shade val="50000"/>
+            </a:schemeClr>
+          </a:lnRef>
+          <a:fillRef idx="1">
+            <a:schemeClr val="accent1"/>
+          </a:fillRef>
+          <a:effectRef idx="0">
+            <a:schemeClr val="accent1"/>
+          </a:effectRef>
+          <a:fontRef idx="minor">
+            <a:schemeClr val="lt1"/>
+          </a:fontRef>
+        </p:style>
+        <p:txBody>
+          <a:bodyPr rtlCol="0" anchor="ctr"/>
+          <a:lstStyle/>
+          <a:p>
+            <a:pPr algn="ctr"/>
+            <a:endParaRPr lang="en-US"/>
+          </a:p>
+        </p:txBody>
+      </p:sp>
+      <p:sp>
+        <p:nvSpPr>
+          <p:cNvPr id="21" name="Rectangle 20"/>
+          <p:cNvSpPr/>
+          <p:nvPr/>
+        </p:nvSpPr>
+        <p:spPr>
+          <a:xfrm>
+            <a:off x="1903413" y="1905000"/>
+            <a:ext cx="76200" cy="76200"/>
+          </a:xfrm>
+          <a:prstGeom prst="rect">
+            <a:avLst/>
+          </a:prstGeom>
+          <a:solidFill>
+            <a:srgbClr val="FFFF00"/>
+          </a:solidFill>
+          <a:ln>
+            <a:noFill/>
+          </a:ln>
+        </p:spPr>
+        <p:style>
+          <a:lnRef idx="2">
+            <a:schemeClr val="accent1">
+              <a:shade val="50000"/>
+            </a:schemeClr>
+          </a:lnRef>
+          <a:fillRef idx="1">
+            <a:schemeClr val="accent1"/>
+          </a:fillRef>
+          <a:effectRef idx="0">
+            <a:schemeClr val="accent1"/>
+          </a:effectRef>
+          <a:fontRef idx="minor">
+            <a:schemeClr val="lt1"/>
+          </a:fontRef>
+        </p:style>
+        <p:txBody>
+          <a:bodyPr rtlCol="0" anchor="ctr"/>
+          <a:lstStyle/>
+          <a:p>
+            <a:pPr algn="ctr"/>
+            <a:endParaRPr lang="en-US"/>
+          </a:p>
+        </p:txBody>
+      </p:sp>
+      <p:sp>
+        <p:nvSpPr>
+          <p:cNvPr id="22" name="Rectangle 21"/>
+          <p:cNvSpPr/>
+          <p:nvPr/>
+        </p:nvSpPr>
+        <p:spPr>
+          <a:xfrm>
+            <a:off x="1903413" y="1993105"/>
+            <a:ext cx="76200" cy="76200"/>
+          </a:xfrm>
+          <a:prstGeom prst="rect">
+            <a:avLst/>
+          </a:prstGeom>
+          <a:solidFill>
+            <a:srgbClr val="FFFF00"/>
+          </a:solidFill>
+          <a:ln>
+            <a:noFill/>
+          </a:ln>
+        </p:spPr>
+        <p:style>
+          <a:lnRef idx="2">
+            <a:schemeClr val="accent1">
+              <a:shade val="50000"/>
+            </a:schemeClr>
+          </a:lnRef>
+          <a:fillRef idx="1">
+            <a:schemeClr val="accent1"/>
+          </a:fillRef>
+          <a:effectRef idx="0">
+            <a:schemeClr val="accent1"/>
+          </a:effectRef>
+          <a:fontRef idx="minor">
+            <a:schemeClr val="lt1"/>
+          </a:fontRef>
+        </p:style>
+        <p:txBody>
+          <a:bodyPr rtlCol="0" anchor="ctr"/>
+          <a:lstStyle/>
+          <a:p>
+            <a:pPr algn="ctr"/>
+            <a:endParaRPr lang="en-US" dirty="0"/>
+          </a:p>
+        </p:txBody>
+      </p:sp>
+      <p:sp>
+        <p:nvSpPr>
+          <p:cNvPr id="23" name="Rectangle 22"/>
+          <p:cNvSpPr/>
+          <p:nvPr/>
+        </p:nvSpPr>
+        <p:spPr>
+          <a:xfrm>
+            <a:off x="1903413" y="2081213"/>
+            <a:ext cx="76200" cy="76200"/>
+          </a:xfrm>
+          <a:prstGeom prst="rect">
+            <a:avLst/>
+          </a:prstGeom>
+          <a:solidFill>
+            <a:srgbClr val="FFFF00"/>
+          </a:solidFill>
+          <a:ln>
+            <a:noFill/>
+          </a:ln>
+        </p:spPr>
+        <p:style>
+          <a:lnRef idx="2">
+            <a:schemeClr val="accent1">
+              <a:shade val="50000"/>
+            </a:schemeClr>
+          </a:lnRef>
+          <a:fillRef idx="1">
+            <a:schemeClr val="accent1"/>
+          </a:fillRef>
+          <a:effectRef idx="0">
+            <a:schemeClr val="accent1"/>
+          </a:effectRef>
+          <a:fontRef idx="minor">
+            <a:schemeClr val="lt1"/>
+          </a:fontRef>
+        </p:style>
+        <p:txBody>
+          <a:bodyPr rtlCol="0" anchor="ctr"/>
+          <a:lstStyle/>
+          <a:p>
+            <a:pPr algn="ctr"/>
+            <a:endParaRPr lang="en-US" dirty="0"/>
+          </a:p>
+        </p:txBody>
+      </p:sp>
+      <p:sp>
+        <p:nvSpPr>
+          <p:cNvPr id="24" name="Rectangle 23"/>
+          <p:cNvSpPr/>
+          <p:nvPr/>
+        </p:nvSpPr>
+        <p:spPr>
+          <a:xfrm>
+            <a:off x="1903413" y="2169330"/>
+            <a:ext cx="76200" cy="76200"/>
+          </a:xfrm>
+          <a:prstGeom prst="rect">
+            <a:avLst/>
+          </a:prstGeom>
+          <a:solidFill>
+            <a:srgbClr val="FFFF00"/>
+          </a:solidFill>
+          <a:ln>
+            <a:noFill/>
+          </a:ln>
+        </p:spPr>
+        <p:style>
+          <a:lnRef idx="2">
+            <a:schemeClr val="accent1">
+              <a:shade val="50000"/>
+            </a:schemeClr>
+          </a:lnRef>
+          <a:fillRef idx="1">
+            <a:schemeClr val="accent1"/>
+          </a:fillRef>
+          <a:effectRef idx="0">
+            <a:schemeClr val="accent1"/>
+          </a:effectRef>
+          <a:fontRef idx="minor">
+            <a:schemeClr val="lt1"/>
+          </a:fontRef>
+        </p:style>
+        <p:txBody>
+          <a:bodyPr rtlCol="0" anchor="ctr"/>
+          <a:lstStyle/>
+          <a:p>
+            <a:pPr algn="ctr"/>
+            <a:endParaRPr lang="en-US"/>
+          </a:p>
+        </p:txBody>
+      </p:sp>
+      <p:sp>
+        <p:nvSpPr>
+          <p:cNvPr id="25" name="Rectangle 24"/>
+          <p:cNvSpPr/>
+          <p:nvPr/>
+        </p:nvSpPr>
+        <p:spPr>
+          <a:xfrm>
+            <a:off x="1817681" y="2257428"/>
+            <a:ext cx="76200" cy="76200"/>
+          </a:xfrm>
+          <a:prstGeom prst="rect">
+            <a:avLst/>
+          </a:prstGeom>
+          <a:solidFill>
+            <a:srgbClr val="FFFF00"/>
+          </a:solidFill>
+          <a:ln>
+            <a:noFill/>
+          </a:ln>
+        </p:spPr>
+        <p:style>
+          <a:lnRef idx="2">
+            <a:schemeClr val="accent1">
+              <a:shade val="50000"/>
+            </a:schemeClr>
+          </a:lnRef>
+          <a:fillRef idx="1">
+            <a:schemeClr val="accent1"/>
+          </a:fillRef>
+          <a:effectRef idx="0">
+            <a:schemeClr val="accent1"/>
+          </a:effectRef>
+          <a:fontRef idx="minor">
+            <a:schemeClr val="lt1"/>
+          </a:fontRef>
+        </p:style>
+        <p:txBody>
+          <a:bodyPr rtlCol="0" anchor="ctr"/>
+          <a:lstStyle/>
+          <a:p>
+            <a:pPr algn="ctr"/>
+            <a:endParaRPr lang="en-US"/>
+          </a:p>
+        </p:txBody>
+      </p:sp>
+      <p:sp>
+        <p:nvSpPr>
+          <p:cNvPr id="26" name="Rectangle 25"/>
+          <p:cNvSpPr/>
+          <p:nvPr/>
+        </p:nvSpPr>
+        <p:spPr>
+          <a:xfrm>
+            <a:off x="1905794" y="2257428"/>
+            <a:ext cx="76200" cy="76200"/>
+          </a:xfrm>
+          <a:prstGeom prst="rect">
+            <a:avLst/>
+          </a:prstGeom>
+          <a:solidFill>
+            <a:srgbClr val="FFFF00"/>
+          </a:solidFill>
+          <a:ln>
+            <a:noFill/>
+          </a:ln>
+        </p:spPr>
+        <p:style>
+          <a:lnRef idx="2">
+            <a:schemeClr val="accent1">
+              <a:shade val="50000"/>
+            </a:schemeClr>
+          </a:lnRef>
+          <a:fillRef idx="1">
+            <a:schemeClr val="accent1"/>
+          </a:fillRef>
+          <a:effectRef idx="0">
+            <a:schemeClr val="accent1"/>
+          </a:effectRef>
+          <a:fontRef idx="minor">
+            <a:schemeClr val="lt1"/>
+          </a:fontRef>
+        </p:style>
+        <p:txBody>
+          <a:bodyPr rtlCol="0" anchor="ctr"/>
+          <a:lstStyle/>
+          <a:p>
+            <a:pPr algn="ctr"/>
+            <a:endParaRPr lang="en-US"/>
+          </a:p>
+        </p:txBody>
+      </p:sp>
+      <p:sp>
+        <p:nvSpPr>
+          <p:cNvPr id="27" name="Rectangle 26"/>
+          <p:cNvSpPr/>
+          <p:nvPr/>
+        </p:nvSpPr>
+        <p:spPr>
+          <a:xfrm>
+            <a:off x="1524000" y="2057400"/>
+            <a:ext cx="76200" cy="76200"/>
+          </a:xfrm>
+          <a:prstGeom prst="rect">
+            <a:avLst/>
+          </a:prstGeom>
+          <a:solidFill>
+            <a:srgbClr val="FFFF00"/>
+          </a:solidFill>
+          <a:ln>
+            <a:noFill/>
+          </a:ln>
+        </p:spPr>
+        <p:style>
+          <a:lnRef idx="2">
+            <a:schemeClr val="accent1">
+              <a:shade val="50000"/>
+            </a:schemeClr>
+          </a:lnRef>
+          <a:fillRef idx="1">
+            <a:schemeClr val="accent1"/>
+          </a:fillRef>
+          <a:effectRef idx="0">
+            <a:schemeClr val="accent1"/>
+          </a:effectRef>
+          <a:fontRef idx="minor">
+            <a:schemeClr val="lt1"/>
+          </a:fontRef>
+        </p:style>
+        <p:txBody>
+          <a:bodyPr rtlCol="0" anchor="ctr"/>
+          <a:lstStyle/>
+          <a:p>
+            <a:pPr algn="ctr"/>
+            <a:endParaRPr lang="en-US"/>
+          </a:p>
+        </p:txBody>
+      </p:sp>
+      <p:sp>
+        <p:nvSpPr>
+          <p:cNvPr id="28" name="Rectangle 27"/>
+          <p:cNvSpPr/>
+          <p:nvPr/>
+        </p:nvSpPr>
+        <p:spPr>
+          <a:xfrm>
+            <a:off x="1460500" y="2698750"/>
+            <a:ext cx="76200" cy="76200"/>
+          </a:xfrm>
+          <a:prstGeom prst="rect">
+            <a:avLst/>
+          </a:prstGeom>
+          <a:solidFill>
+            <a:srgbClr val="FFFF00"/>
+          </a:solidFill>
+          <a:ln>
+            <a:noFill/>
+          </a:ln>
+        </p:spPr>
+        <p:style>
+          <a:lnRef idx="2">
+            <a:schemeClr val="accent1">
+              <a:shade val="50000"/>
+            </a:schemeClr>
+          </a:lnRef>
+          <a:fillRef idx="1">
+            <a:schemeClr val="accent1"/>
+          </a:fillRef>
+          <a:effectRef idx="0">
+            <a:schemeClr val="accent1"/>
+          </a:effectRef>
+          <a:fontRef idx="minor">
+            <a:schemeClr val="lt1"/>
+          </a:fontRef>
+        </p:style>
+        <p:txBody>
+          <a:bodyPr rtlCol="0" anchor="ctr"/>
+          <a:lstStyle/>
+          <a:p>
+            <a:pPr algn="ctr"/>
+            <a:endParaRPr lang="en-US"/>
+          </a:p>
+        </p:txBody>
+      </p:sp>
+      <p:sp>
+        <p:nvSpPr>
+          <p:cNvPr id="29" name="Rectangle 28"/>
+          <p:cNvSpPr/>
+          <p:nvPr/>
+        </p:nvSpPr>
+        <p:spPr>
+          <a:xfrm>
+            <a:off x="1548613" y="2698750"/>
+            <a:ext cx="76200" cy="76200"/>
+          </a:xfrm>
+          <a:prstGeom prst="rect">
+            <a:avLst/>
+          </a:prstGeom>
+          <a:solidFill>
+            <a:srgbClr val="FFFF00"/>
+          </a:solidFill>
+          <a:ln>
+            <a:noFill/>
+          </a:ln>
+        </p:spPr>
+        <p:style>
+          <a:lnRef idx="2">
+            <a:schemeClr val="accent1">
+              <a:shade val="50000"/>
+            </a:schemeClr>
+          </a:lnRef>
+          <a:fillRef idx="1">
+            <a:schemeClr val="accent1"/>
+          </a:fillRef>
+          <a:effectRef idx="0">
+            <a:schemeClr val="accent1"/>
+          </a:effectRef>
+          <a:fontRef idx="minor">
+            <a:schemeClr val="lt1"/>
+          </a:fontRef>
+        </p:style>
+        <p:txBody>
+          <a:bodyPr rtlCol="0" anchor="ctr"/>
+          <a:lstStyle/>
+          <a:p>
+            <a:pPr algn="ctr"/>
+            <a:endParaRPr lang="en-US"/>
+          </a:p>
+        </p:txBody>
+      </p:sp>
+      <p:sp>
+        <p:nvSpPr>
+          <p:cNvPr id="30" name="Rectangle 29"/>
+          <p:cNvSpPr/>
+          <p:nvPr/>
+        </p:nvSpPr>
+        <p:spPr>
+          <a:xfrm>
+            <a:off x="1727200" y="2257425"/>
+            <a:ext cx="76200" cy="76200"/>
+          </a:xfrm>
+          <a:prstGeom prst="rect">
+            <a:avLst/>
+          </a:prstGeom>
+          <a:solidFill>
+            <a:srgbClr val="FFFF00"/>
+          </a:solidFill>
+          <a:ln>
+            <a:noFill/>
+          </a:ln>
+        </p:spPr>
+        <p:style>
+          <a:lnRef idx="2">
+            <a:schemeClr val="accent1">
+              <a:shade val="50000"/>
+            </a:schemeClr>
+          </a:lnRef>
+          <a:fillRef idx="1">
+            <a:schemeClr val="accent1"/>
+          </a:fillRef>
+          <a:effectRef idx="0">
+            <a:schemeClr val="accent1"/>
+          </a:effectRef>
+          <a:fontRef idx="minor">
+            <a:schemeClr val="lt1"/>
+          </a:fontRef>
+        </p:style>
+        <p:txBody>
+          <a:bodyPr rtlCol="0" anchor="ctr"/>
+          <a:lstStyle/>
+          <a:p>
+            <a:pPr algn="ctr"/>
+            <a:endParaRPr lang="en-US"/>
+          </a:p>
+        </p:txBody>
+      </p:sp>
+      <p:sp>
+        <p:nvSpPr>
+          <p:cNvPr id="31" name="TextBox 30"/>
+          <p:cNvSpPr txBox="1"/>
+          <p:nvPr/>
+        </p:nvSpPr>
+        <p:spPr>
+          <a:xfrm>
+            <a:off x="6553200" y="1755338"/>
+            <a:ext cx="1904230" cy="1292662"/>
+          </a:xfrm>
+          <a:prstGeom prst="rect">
+            <a:avLst/>
+          </a:prstGeom>
+          <a:noFill/>
+        </p:spPr>
+        <p:txBody>
+          <a:bodyPr wrap="square" rtlCol="0">
+            <a:spAutoFit/>
+          </a:bodyPr>
+          <a:lstStyle/>
+          <a:p>
+            <a:r>
+              <a:rPr lang="en-US" sz="6000" dirty="0" smtClean="0">
+                <a:solidFill>
+                  <a:srgbClr val="FFFF00"/>
+                </a:solidFill>
+                <a:latin typeface="Adobe Caslon Pro Bold" pitchFamily="18" charset="0"/>
+              </a:rPr>
+              <a:t>{(.</a:t>
+            </a:r>
+            <a:r>
+              <a:rPr lang="en-US" sz="8000" baseline="-36000" dirty="0" smtClean="0">
+                <a:solidFill>
+                  <a:srgbClr val="FFFF00"/>
+                </a:solidFill>
+                <a:latin typeface="Adobe Caslon Pro Bold" pitchFamily="18" charset="0"/>
+              </a:rPr>
+              <a:t>;</a:t>
+            </a:r>
+            <a:r>
+              <a:rPr lang="en-US" sz="6000" dirty="0" smtClean="0">
+                <a:solidFill>
+                  <a:srgbClr val="FFFF00"/>
+                </a:solidFill>
+                <a:latin typeface="Adobe Caslon Pro Bold" pitchFamily="18" charset="0"/>
+              </a:rPr>
+              <a:t>.)}</a:t>
+            </a:r>
+          </a:p>
+          <a:p>
+            <a:endParaRPr lang="en-US" dirty="0">
+              <a:solidFill>
+                <a:srgbClr val="00FF00"/>
+              </a:solidFill>
+            </a:endParaRPr>
+          </a:p>
+        </p:txBody>
+      </p:sp>
+      <p:grpSp>
+        <p:nvGrpSpPr>
+          <p:cNvPr id="34" name="Group 33"/>
+          <p:cNvGrpSpPr/>
+          <p:nvPr/>
+        </p:nvGrpSpPr>
+        <p:grpSpPr>
+          <a:xfrm>
+            <a:off x="2743200" y="3200400"/>
+            <a:ext cx="3352800" cy="3352800"/>
+            <a:chOff x="8686800" y="1828800"/>
+            <a:chExt cx="3352800" cy="3352800"/>
+          </a:xfrm>
+          <a:solidFill>
+            <a:schemeClr val="accent2">
+              <a:lumMod val="75000"/>
+            </a:schemeClr>
+          </a:solidFill>
+        </p:grpSpPr>
+        <p:sp>
+          <p:nvSpPr>
+            <p:cNvPr id="32" name="Oval 31"/>
+            <p:cNvSpPr/>
+            <p:nvPr/>
+          </p:nvSpPr>
+          <p:spPr>
+            <a:xfrm>
+              <a:off x="8686800" y="1828800"/>
+              <a:ext cx="3352800" cy="3352800"/>
+            </a:xfrm>
+            <a:prstGeom prst="ellipse">
+              <a:avLst/>
+            </a:prstGeom>
+            <a:grpFill/>
+            <a:ln>
+              <a:noFill/>
+            </a:ln>
+          </p:spPr>
+          <p:style>
+            <a:lnRef idx="2">
+              <a:schemeClr val="accent1">
+                <a:shade val="50000"/>
+              </a:schemeClr>
+            </a:lnRef>
+            <a:fillRef idx="1">
+              <a:schemeClr val="accent1"/>
+            </a:fillRef>
+            <a:effectRef idx="0">
+              <a:schemeClr val="accent1"/>
+            </a:effectRef>
+            <a:fontRef idx="minor">
+              <a:schemeClr val="lt1"/>
+            </a:fontRef>
+          </p:style>
+          <p:txBody>
+            <a:bodyPr rtlCol="0" anchor="ctr"/>
+            <a:lstStyle/>
+            <a:p>
+              <a:pPr algn="ctr"/>
+              <a:endParaRPr lang="en-US" sz="3200" dirty="0" smtClean="0">
+                <a:solidFill>
+                  <a:srgbClr val="FFFF00"/>
+                </a:solidFill>
+                <a:latin typeface="Blocked" pitchFamily="2" charset="0"/>
+              </a:endParaRPr>
+            </a:p>
+            <a:p>
+              <a:pPr algn="ctr"/>
+              <a:endParaRPr lang="en-US" sz="7200" dirty="0">
+                <a:solidFill>
+                  <a:srgbClr val="00FF00"/>
+                </a:solidFill>
+                <a:latin typeface="Ananda Namaste" pitchFamily="2" charset="0"/>
+              </a:endParaRPr>
+            </a:p>
+            <a:p>
+              <a:pPr algn="ctr"/>
+              <a:endParaRPr lang="en-US" sz="700" dirty="0">
+                <a:solidFill>
+                  <a:srgbClr val="00FF00"/>
+                </a:solidFill>
+                <a:latin typeface="Ananda Namaste" pitchFamily="2" charset="0"/>
+              </a:endParaRPr>
+            </a:p>
+          </p:txBody>
+        </p:sp>
+        <p:sp>
+          <p:nvSpPr>
+            <p:cNvPr id="33" name="TextBox 32"/>
+            <p:cNvSpPr txBox="1"/>
+            <p:nvPr/>
+          </p:nvSpPr>
+          <p:spPr>
+            <a:xfrm>
+              <a:off x="9296400" y="2971800"/>
+              <a:ext cx="2438400" cy="1477328"/>
+            </a:xfrm>
+            <a:prstGeom prst="rect">
+              <a:avLst/>
+            </a:prstGeom>
+            <a:grpFill/>
+          </p:spPr>
+          <p:txBody>
+            <a:bodyPr wrap="square" rtlCol="0">
+              <a:spAutoFit/>
+            </a:bodyPr>
+            <a:lstStyle/>
+            <a:p>
+              <a:r>
+                <a:rPr lang="en-US" sz="7200" dirty="0" smtClean="0">
+                  <a:solidFill>
+                    <a:srgbClr val="FFFF99"/>
+                  </a:solidFill>
+                  <a:latin typeface="Adobe Caslon Pro Bold" pitchFamily="18" charset="0"/>
+                </a:rPr>
+                <a:t>{(.</a:t>
+              </a:r>
+              <a:r>
+                <a:rPr lang="en-US" sz="9600" baseline="-36000" dirty="0" smtClean="0">
+                  <a:solidFill>
+                    <a:srgbClr val="FFFF99"/>
+                  </a:solidFill>
+                  <a:latin typeface="Adobe Caslon Pro Bold" pitchFamily="18" charset="0"/>
+                </a:rPr>
+                <a:t>;</a:t>
+              </a:r>
+              <a:r>
+                <a:rPr lang="en-US" sz="7200" dirty="0" smtClean="0">
+                  <a:solidFill>
+                    <a:srgbClr val="FFFF99"/>
+                  </a:solidFill>
+                  <a:latin typeface="Adobe Caslon Pro Bold" pitchFamily="18" charset="0"/>
+                </a:rPr>
+                <a:t>.)}</a:t>
+              </a:r>
+            </a:p>
+            <a:p>
+              <a:endParaRPr lang="en-US" dirty="0">
+                <a:solidFill>
+                  <a:srgbClr val="00FF00"/>
+                </a:solidFill>
+              </a:endParaRPr>
+            </a:p>
+          </p:txBody>
+        </p:sp>
+      </p:grpSp>
+    </p:spTree>
+  </p:cSld>
+  <p:clrMapOvr>
+    <a:masterClrMapping/>
+  </p:clrMapOvr>
+</p:sld>
+</file>
+
+<file path=ppt/slides/slide17.xml><?xml version="1.0" encoding="utf-8"?>
+<p:sld xmlns:a="http://schemas.openxmlformats.org/drawingml/2006/main" xmlns:r="http://schemas.openxmlformats.org/officeDocument/2006/relationships" xmlns:p="http://schemas.openxmlformats.org/presentationml/2006/main">
+  <p:cSld>
+    <p:spTree>
+      <p:nvGrpSpPr>
+        <p:cNvPr id="1" name=""/>
+        <p:cNvGrpSpPr/>
+        <p:nvPr/>
+      </p:nvGrpSpPr>
+      <p:grpSpPr>
+        <a:xfrm>
+          <a:off x="0" y="0"/>
+          <a:ext cx="0" cy="0"/>
+          <a:chOff x="0" y="0"/>
+          <a:chExt cx="0" cy="0"/>
+        </a:xfrm>
+      </p:grpSpPr>
+      <p:sp>
+        <p:nvSpPr>
           <p:cNvPr id="4" name="Title 1"/>
           <p:cNvSpPr txBox="1">
             <a:spLocks/>
@@ -12006,7 +13550,7 @@
 </p:sld>
 </file>
 
-<file path=ppt/slides/slide17.xml><?xml version="1.0" encoding="utf-8"?>
+<file path=ppt/slides/slide18.xml><?xml version="1.0" encoding="utf-8"?>
 <p:sld xmlns:a="http://schemas.openxmlformats.org/drawingml/2006/main" xmlns:r="http://schemas.openxmlformats.org/officeDocument/2006/relationships" xmlns:p="http://schemas.openxmlformats.org/presentationml/2006/main">
   <p:cSld>
     <p:spTree>
@@ -13232,6 +14776,201 @@
           </a:p>
         </p:txBody>
       </p:sp>
+      <p:grpSp>
+        <p:nvGrpSpPr>
+          <p:cNvPr id="40" name="Group 39"/>
+          <p:cNvGrpSpPr/>
+          <p:nvPr/>
+        </p:nvGrpSpPr>
+        <p:grpSpPr>
+          <a:xfrm>
+            <a:off x="5562600" y="2209800"/>
+            <a:ext cx="3886200" cy="228600"/>
+            <a:chOff x="5562600" y="2209800"/>
+            <a:chExt cx="3886200" cy="228600"/>
+          </a:xfrm>
+        </p:grpSpPr>
+        <p:sp>
+          <p:nvSpPr>
+            <p:cNvPr id="36" name="Rectangle 35"/>
+            <p:cNvSpPr/>
+            <p:nvPr/>
+          </p:nvSpPr>
+          <p:spPr>
+            <a:xfrm>
+              <a:off x="5562600" y="2275114"/>
+              <a:ext cx="3886200" cy="97971"/>
+            </a:xfrm>
+            <a:prstGeom prst="rect">
+              <a:avLst/>
+            </a:prstGeom>
+            <a:solidFill>
+              <a:schemeClr val="bg1"/>
+            </a:solidFill>
+            <a:ln>
+              <a:noFill/>
+            </a:ln>
+          </p:spPr>
+          <p:style>
+            <a:lnRef idx="2">
+              <a:schemeClr val="accent1">
+                <a:shade val="50000"/>
+              </a:schemeClr>
+            </a:lnRef>
+            <a:fillRef idx="1">
+              <a:schemeClr val="accent1"/>
+            </a:fillRef>
+            <a:effectRef idx="0">
+              <a:schemeClr val="accent1"/>
+            </a:effectRef>
+            <a:fontRef idx="minor">
+              <a:schemeClr val="lt1"/>
+            </a:fontRef>
+          </p:style>
+          <p:txBody>
+            <a:bodyPr rtlCol="0" anchor="ctr"/>
+            <a:lstStyle/>
+            <a:p>
+              <a:endParaRPr lang="en-US" dirty="0"/>
+            </a:p>
+          </p:txBody>
+        </p:sp>
+        <p:sp>
+          <p:nvSpPr>
+            <p:cNvPr id="37" name="Rectangle 36"/>
+            <p:cNvSpPr/>
+            <p:nvPr/>
+          </p:nvSpPr>
+          <p:spPr>
+            <a:xfrm>
+              <a:off x="6092824" y="2373086"/>
+              <a:ext cx="307976" cy="65314"/>
+            </a:xfrm>
+            <a:prstGeom prst="rect">
+              <a:avLst/>
+            </a:prstGeom>
+            <a:solidFill>
+              <a:schemeClr val="bg1"/>
+            </a:solidFill>
+            <a:ln>
+              <a:noFill/>
+            </a:ln>
+          </p:spPr>
+          <p:style>
+            <a:lnRef idx="2">
+              <a:schemeClr val="accent1">
+                <a:shade val="50000"/>
+              </a:schemeClr>
+            </a:lnRef>
+            <a:fillRef idx="1">
+              <a:schemeClr val="accent1"/>
+            </a:fillRef>
+            <a:effectRef idx="0">
+              <a:schemeClr val="accent1"/>
+            </a:effectRef>
+            <a:fontRef idx="minor">
+              <a:schemeClr val="lt1"/>
+            </a:fontRef>
+          </p:style>
+          <p:txBody>
+            <a:bodyPr rtlCol="0" anchor="ctr"/>
+            <a:lstStyle/>
+            <a:p>
+              <a:endParaRPr lang="en-US" dirty="0"/>
+            </a:p>
+          </p:txBody>
+        </p:sp>
+        <p:sp>
+          <p:nvSpPr>
+            <p:cNvPr id="38" name="Rectangle 37"/>
+            <p:cNvSpPr/>
+            <p:nvPr/>
+          </p:nvSpPr>
+          <p:spPr>
+            <a:xfrm>
+              <a:off x="5562600" y="2209800"/>
+              <a:ext cx="457200" cy="65314"/>
+            </a:xfrm>
+            <a:prstGeom prst="rect">
+              <a:avLst/>
+            </a:prstGeom>
+            <a:solidFill>
+              <a:schemeClr val="bg1"/>
+            </a:solidFill>
+            <a:ln>
+              <a:noFill/>
+            </a:ln>
+          </p:spPr>
+          <p:style>
+            <a:lnRef idx="2">
+              <a:schemeClr val="accent1">
+                <a:shade val="50000"/>
+              </a:schemeClr>
+            </a:lnRef>
+            <a:fillRef idx="1">
+              <a:schemeClr val="accent1"/>
+            </a:fillRef>
+            <a:effectRef idx="0">
+              <a:schemeClr val="accent1"/>
+            </a:effectRef>
+            <a:fontRef idx="minor">
+              <a:schemeClr val="lt1"/>
+            </a:fontRef>
+          </p:style>
+          <p:txBody>
+            <a:bodyPr rtlCol="0" anchor="ctr"/>
+            <a:lstStyle/>
+            <a:p>
+              <a:endParaRPr lang="en-US" dirty="0"/>
+            </a:p>
+          </p:txBody>
+        </p:sp>
+        <p:sp>
+          <p:nvSpPr>
+            <p:cNvPr id="39" name="Rectangle 38"/>
+            <p:cNvSpPr/>
+            <p:nvPr/>
+          </p:nvSpPr>
+          <p:spPr>
+            <a:xfrm>
+              <a:off x="6477000" y="2209800"/>
+              <a:ext cx="2971800" cy="65314"/>
+            </a:xfrm>
+            <a:prstGeom prst="rect">
+              <a:avLst/>
+            </a:prstGeom>
+            <a:solidFill>
+              <a:schemeClr val="bg1"/>
+            </a:solidFill>
+            <a:ln>
+              <a:noFill/>
+            </a:ln>
+          </p:spPr>
+          <p:style>
+            <a:lnRef idx="2">
+              <a:schemeClr val="accent1">
+                <a:shade val="50000"/>
+              </a:schemeClr>
+            </a:lnRef>
+            <a:fillRef idx="1">
+              <a:schemeClr val="accent1"/>
+            </a:fillRef>
+            <a:effectRef idx="0">
+              <a:schemeClr val="accent1"/>
+            </a:effectRef>
+            <a:fontRef idx="minor">
+              <a:schemeClr val="lt1"/>
+            </a:fontRef>
+          </p:style>
+          <p:txBody>
+            <a:bodyPr rtlCol="0" anchor="ctr"/>
+            <a:lstStyle/>
+            <a:p>
+              <a:endParaRPr lang="en-US" dirty="0"/>
+            </a:p>
+          </p:txBody>
+        </p:sp>
+      </p:grpSp>
     </p:spTree>
   </p:cSld>
   <p:clrMapOvr>

</xml_diff>

<commit_message>
implemented syntax highlighting using regex
</commit_message>
<xml_diff>
--- a/HMSWebTest-Pen/Assets/Images/hmsgraphics.pptx
+++ b/HMSWebTest-Pen/Assets/Images/hmsgraphics.pptx
@@ -5,7 +5,7 @@
     <p:sldMasterId id="2147483648" r:id="rId1"/>
   </p:sldMasterIdLst>
   <p:notesMasterIdLst>
-    <p:notesMasterId r:id="rId20"/>
+    <p:notesMasterId r:id="rId21"/>
   </p:notesMasterIdLst>
   <p:sldIdLst>
     <p:sldId id="256" r:id="rId2"/>
@@ -25,7 +25,8 @@
     <p:sldId id="268" r:id="rId16"/>
     <p:sldId id="273" r:id="rId17"/>
     <p:sldId id="269" r:id="rId18"/>
-    <p:sldId id="272" r:id="rId19"/>
+    <p:sldId id="274" r:id="rId19"/>
+    <p:sldId id="272" r:id="rId20"/>
   </p:sldIdLst>
   <p:sldSz cx="9144000" cy="6858000" type="screen4x3"/>
   <p:notesSz cx="6858000" cy="9144000"/>
@@ -210,7 +211,7 @@
             <a:fld id="{6153BB3E-9447-4512-867E-C40997E12B5B}" type="datetimeFigureOut">
               <a:rPr lang="en-US" smtClean="0"/>
               <a:pPr/>
-              <a:t>5/26/2017</a:t>
+              <a:t>6/3/2017</a:t>
             </a:fld>
             <a:endParaRPr lang="en-US"/>
           </a:p>
@@ -740,7 +741,7 @@
             <a:fld id="{090B515E-C25E-45EE-BA79-D334A31660AC}" type="datetimeFigureOut">
               <a:rPr lang="en-US" smtClean="0"/>
               <a:pPr/>
-              <a:t>5/26/2017</a:t>
+              <a:t>6/3/2017</a:t>
             </a:fld>
             <a:endParaRPr lang="en-US"/>
           </a:p>
@@ -907,7 +908,7 @@
             <a:fld id="{090B515E-C25E-45EE-BA79-D334A31660AC}" type="datetimeFigureOut">
               <a:rPr lang="en-US" smtClean="0"/>
               <a:pPr/>
-              <a:t>5/26/2017</a:t>
+              <a:t>6/3/2017</a:t>
             </a:fld>
             <a:endParaRPr lang="en-US"/>
           </a:p>
@@ -1084,7 +1085,7 @@
             <a:fld id="{090B515E-C25E-45EE-BA79-D334A31660AC}" type="datetimeFigureOut">
               <a:rPr lang="en-US" smtClean="0"/>
               <a:pPr/>
-              <a:t>5/26/2017</a:t>
+              <a:t>6/3/2017</a:t>
             </a:fld>
             <a:endParaRPr lang="en-US"/>
           </a:p>
@@ -1251,7 +1252,7 @@
             <a:fld id="{090B515E-C25E-45EE-BA79-D334A31660AC}" type="datetimeFigureOut">
               <a:rPr lang="en-US" smtClean="0"/>
               <a:pPr/>
-              <a:t>5/26/2017</a:t>
+              <a:t>6/3/2017</a:t>
             </a:fld>
             <a:endParaRPr lang="en-US"/>
           </a:p>
@@ -1494,7 +1495,7 @@
             <a:fld id="{090B515E-C25E-45EE-BA79-D334A31660AC}" type="datetimeFigureOut">
               <a:rPr lang="en-US" smtClean="0"/>
               <a:pPr/>
-              <a:t>5/26/2017</a:t>
+              <a:t>6/3/2017</a:t>
             </a:fld>
             <a:endParaRPr lang="en-US"/>
           </a:p>
@@ -1779,7 +1780,7 @@
             <a:fld id="{090B515E-C25E-45EE-BA79-D334A31660AC}" type="datetimeFigureOut">
               <a:rPr lang="en-US" smtClean="0"/>
               <a:pPr/>
-              <a:t>5/26/2017</a:t>
+              <a:t>6/3/2017</a:t>
             </a:fld>
             <a:endParaRPr lang="en-US"/>
           </a:p>
@@ -2198,7 +2199,7 @@
             <a:fld id="{090B515E-C25E-45EE-BA79-D334A31660AC}" type="datetimeFigureOut">
               <a:rPr lang="en-US" smtClean="0"/>
               <a:pPr/>
-              <a:t>5/26/2017</a:t>
+              <a:t>6/3/2017</a:t>
             </a:fld>
             <a:endParaRPr lang="en-US"/>
           </a:p>
@@ -2313,7 +2314,7 @@
             <a:fld id="{090B515E-C25E-45EE-BA79-D334A31660AC}" type="datetimeFigureOut">
               <a:rPr lang="en-US" smtClean="0"/>
               <a:pPr/>
-              <a:t>5/26/2017</a:t>
+              <a:t>6/3/2017</a:t>
             </a:fld>
             <a:endParaRPr lang="en-US"/>
           </a:p>
@@ -2405,7 +2406,7 @@
             <a:fld id="{090B515E-C25E-45EE-BA79-D334A31660AC}" type="datetimeFigureOut">
               <a:rPr lang="en-US" smtClean="0"/>
               <a:pPr/>
-              <a:t>5/26/2017</a:t>
+              <a:t>6/3/2017</a:t>
             </a:fld>
             <a:endParaRPr lang="en-US"/>
           </a:p>
@@ -2679,7 +2680,7 @@
             <a:fld id="{090B515E-C25E-45EE-BA79-D334A31660AC}" type="datetimeFigureOut">
               <a:rPr lang="en-US" smtClean="0"/>
               <a:pPr/>
-              <a:t>5/26/2017</a:t>
+              <a:t>6/3/2017</a:t>
             </a:fld>
             <a:endParaRPr lang="en-US"/>
           </a:p>
@@ -2929,7 +2930,7 @@
             <a:fld id="{090B515E-C25E-45EE-BA79-D334A31660AC}" type="datetimeFigureOut">
               <a:rPr lang="en-US" smtClean="0"/>
               <a:pPr/>
-              <a:t>5/26/2017</a:t>
+              <a:t>6/3/2017</a:t>
             </a:fld>
             <a:endParaRPr lang="en-US"/>
           </a:p>
@@ -3139,7 +3140,7 @@
             <a:fld id="{090B515E-C25E-45EE-BA79-D334A31660AC}" type="datetimeFigureOut">
               <a:rPr lang="en-US" smtClean="0"/>
               <a:pPr/>
-              <a:t>5/26/2017</a:t>
+              <a:t>6/3/2017</a:t>
             </a:fld>
             <a:endParaRPr lang="en-US"/>
           </a:p>
@@ -3977,7 +3978,7 @@
             <a:blip r:embed="rId2" cstate="print">
               <a:extLst>
                 <a:ext uri="{28A0092B-C50C-407E-A947-70E740481C1C}">
-                  <a14:useLocalDpi xmlns="" xmlns:a14="http://schemas.microsoft.com/office/drawing/2010/main" val="0"/>
+                  <a14:useLocalDpi xmlns:a14="http://schemas.microsoft.com/office/drawing/2010/main" xmlns="" val="0"/>
                 </a:ext>
               </a:extLst>
             </a:blip>
@@ -3997,7 +3998,7 @@
             <a:noFill/>
             <a:extLst>
               <a:ext uri="{909E8E84-426E-40DD-AFC4-6F175D3DCCD1}">
-                <a14:hiddenFill xmlns="" xmlns:a14="http://schemas.microsoft.com/office/drawing/2010/main">
+                <a14:hiddenFill xmlns:a14="http://schemas.microsoft.com/office/drawing/2010/main" xmlns="">
                   <a:solidFill>
                     <a:srgbClr val="FFFFFF"/>
                   </a:solidFill>
@@ -4080,7 +4081,7 @@
             <a:blip r:embed="rId3" cstate="print">
               <a:extLst>
                 <a:ext uri="{28A0092B-C50C-407E-A947-70E740481C1C}">
-                  <a14:useLocalDpi xmlns="" xmlns:a14="http://schemas.microsoft.com/office/drawing/2010/main" val="0"/>
+                  <a14:useLocalDpi xmlns:a14="http://schemas.microsoft.com/office/drawing/2010/main" xmlns="" val="0"/>
                 </a:ext>
               </a:extLst>
             </a:blip>
@@ -4100,7 +4101,7 @@
             <a:noFill/>
             <a:extLst>
               <a:ext uri="{909E8E84-426E-40DD-AFC4-6F175D3DCCD1}">
-                <a14:hiddenFill xmlns="" xmlns:a14="http://schemas.microsoft.com/office/drawing/2010/main">
+                <a14:hiddenFill xmlns:a14="http://schemas.microsoft.com/office/drawing/2010/main" xmlns="">
                   <a:solidFill>
                     <a:srgbClr val="FFFFFF"/>
                   </a:solidFill>
@@ -7083,7 +7084,7 @@
     </p:spTree>
     <p:extLst>
       <p:ext uri="{BB962C8B-B14F-4D97-AF65-F5344CB8AC3E}">
-        <p14:creationId xmlns="" xmlns:p14="http://schemas.microsoft.com/office/powerpoint/2010/main" val="1874106700"/>
+        <p14:creationId xmlns:p14="http://schemas.microsoft.com/office/powerpoint/2010/main" xmlns="" val="1874106700"/>
       </p:ext>
     </p:extLst>
   </p:cSld>
@@ -7756,7 +7757,7 @@
           <a:blip r:embed="rId2" cstate="print">
             <a:extLst>
               <a:ext uri="{28A0092B-C50C-407E-A947-70E740481C1C}">
-                <a14:useLocalDpi xmlns:a14="http://schemas.microsoft.com/office/drawing/2010/main" xmlns="" val="0"/>
+                <a14:useLocalDpi xmlns="" xmlns:a14="http://schemas.microsoft.com/office/drawing/2010/main" val="0"/>
               </a:ext>
             </a:extLst>
           </a:blip>
@@ -7785,14 +7786,14 @@
           </a:effectLst>
           <a:extLst>
             <a:ext uri="{909E8E84-426E-40DD-AFC4-6F175D3DCCD1}">
-              <a14:hiddenFill xmlns:a14="http://schemas.microsoft.com/office/drawing/2010/main" xmlns="">
+              <a14:hiddenFill xmlns="" xmlns:a14="http://schemas.microsoft.com/office/drawing/2010/main">
                 <a:solidFill>
                   <a:schemeClr val="accent1"/>
                 </a:solidFill>
               </a14:hiddenFill>
             </a:ext>
             <a:ext uri="{91240B29-F687-4F45-9708-019B960494DF}">
-              <a14:hiddenLine xmlns:a14="http://schemas.microsoft.com/office/drawing/2010/main" xmlns="" w="9525">
+              <a14:hiddenLine xmlns="" xmlns:a14="http://schemas.microsoft.com/office/drawing/2010/main" w="9525">
                 <a:solidFill>
                   <a:schemeClr val="tx1"/>
                 </a:solidFill>
@@ -7823,7 +7824,7 @@
             </a:duotone>
             <a:extLst>
               <a:ext uri="{28A0092B-C50C-407E-A947-70E740481C1C}">
-                <a14:useLocalDpi xmlns:a14="http://schemas.microsoft.com/office/drawing/2010/main" xmlns="" val="0"/>
+                <a14:useLocalDpi xmlns="" xmlns:a14="http://schemas.microsoft.com/office/drawing/2010/main" val="0"/>
               </a:ext>
             </a:extLst>
           </a:blip>
@@ -7852,14 +7853,14 @@
           </a:effectLst>
           <a:extLst>
             <a:ext uri="{909E8E84-426E-40DD-AFC4-6F175D3DCCD1}">
-              <a14:hiddenFill xmlns:a14="http://schemas.microsoft.com/office/drawing/2010/main" xmlns="">
+              <a14:hiddenFill xmlns="" xmlns:a14="http://schemas.microsoft.com/office/drawing/2010/main">
                 <a:solidFill>
                   <a:schemeClr val="accent1"/>
                 </a:solidFill>
               </a14:hiddenFill>
             </a:ext>
             <a:ext uri="{91240B29-F687-4F45-9708-019B960494DF}">
-              <a14:hiddenLine xmlns:a14="http://schemas.microsoft.com/office/drawing/2010/main" xmlns="" w="9525">
+              <a14:hiddenLine xmlns="" xmlns:a14="http://schemas.microsoft.com/office/drawing/2010/main" w="9525">
                 <a:solidFill>
                   <a:schemeClr val="tx1"/>
                 </a:solidFill>
@@ -14936,6 +14937,366 @@
           <a:chExt cx="0" cy="0"/>
         </a:xfrm>
       </p:grpSpPr>
+      <p:pic>
+        <p:nvPicPr>
+          <p:cNvPr id="7" name="Picture 2" descr="F:\Research\HMS\UnityProjects\HMS\HMSWebTest-Pen\Assets\Images\simplistic_play_icon__ico__png__by_micahpkay-d6opha8.png"/>
+          <p:cNvPicPr>
+            <a:picLocks noChangeAspect="1" noChangeArrowheads="1"/>
+          </p:cNvPicPr>
+          <p:nvPr/>
+        </p:nvPicPr>
+        <p:blipFill>
+          <a:blip r:embed="rId2" cstate="print"/>
+          <a:srcRect/>
+          <a:stretch>
+            <a:fillRect/>
+          </a:stretch>
+        </p:blipFill>
+        <p:spPr bwMode="auto">
+          <a:xfrm>
+            <a:off x="-4038600" y="-838200"/>
+            <a:ext cx="6348413" cy="6348412"/>
+          </a:xfrm>
+          <a:prstGeom prst="rect">
+            <a:avLst/>
+          </a:prstGeom>
+          <a:noFill/>
+        </p:spPr>
+      </p:pic>
+      <p:grpSp>
+        <p:nvGrpSpPr>
+          <p:cNvPr id="11" name="Group 10"/>
+          <p:cNvGrpSpPr/>
+          <p:nvPr/>
+        </p:nvGrpSpPr>
+        <p:grpSpPr>
+          <a:xfrm>
+            <a:off x="1981200" y="0"/>
+            <a:ext cx="5410200" cy="5410200"/>
+            <a:chOff x="6705600" y="762000"/>
+            <a:chExt cx="5410200" cy="5410200"/>
+          </a:xfrm>
+        </p:grpSpPr>
+        <p:sp>
+          <p:nvSpPr>
+            <p:cNvPr id="8" name="Oval 7"/>
+            <p:cNvSpPr/>
+            <p:nvPr/>
+          </p:nvSpPr>
+          <p:spPr>
+            <a:xfrm>
+              <a:off x="6705600" y="762000"/>
+              <a:ext cx="5410200" cy="5410200"/>
+            </a:xfrm>
+            <a:prstGeom prst="ellipse">
+              <a:avLst/>
+            </a:prstGeom>
+            <a:solidFill>
+              <a:srgbClr val="E62C00"/>
+            </a:solidFill>
+            <a:ln>
+              <a:noFill/>
+            </a:ln>
+          </p:spPr>
+          <p:style>
+            <a:lnRef idx="2">
+              <a:schemeClr val="accent1">
+                <a:shade val="50000"/>
+              </a:schemeClr>
+            </a:lnRef>
+            <a:fillRef idx="1">
+              <a:schemeClr val="accent1"/>
+            </a:fillRef>
+            <a:effectRef idx="0">
+              <a:schemeClr val="accent1"/>
+            </a:effectRef>
+            <a:fontRef idx="minor">
+              <a:schemeClr val="lt1"/>
+            </a:fontRef>
+          </p:style>
+          <p:txBody>
+            <a:bodyPr rtlCol="0" anchor="ctr"/>
+            <a:lstStyle/>
+            <a:p>
+              <a:pPr algn="ctr"/>
+              <a:endParaRPr lang="en-US"/>
+            </a:p>
+          </p:txBody>
+        </p:sp>
+        <p:sp>
+          <p:nvSpPr>
+            <p:cNvPr id="9" name="Down Arrow 8"/>
+            <p:cNvSpPr/>
+            <p:nvPr/>
+          </p:nvSpPr>
+          <p:spPr>
+            <a:xfrm>
+              <a:off x="8305800" y="1828800"/>
+              <a:ext cx="2247900" cy="2667000"/>
+            </a:xfrm>
+            <a:prstGeom prst="downArrow">
+              <a:avLst>
+                <a:gd name="adj1" fmla="val 46302"/>
+                <a:gd name="adj2" fmla="val 42604"/>
+              </a:avLst>
+            </a:prstGeom>
+            <a:solidFill>
+              <a:schemeClr val="bg1"/>
+            </a:solidFill>
+            <a:ln>
+              <a:noFill/>
+            </a:ln>
+          </p:spPr>
+          <p:style>
+            <a:lnRef idx="2">
+              <a:schemeClr val="accent1">
+                <a:shade val="50000"/>
+              </a:schemeClr>
+            </a:lnRef>
+            <a:fillRef idx="1">
+              <a:schemeClr val="accent1"/>
+            </a:fillRef>
+            <a:effectRef idx="0">
+              <a:schemeClr val="accent1"/>
+            </a:effectRef>
+            <a:fontRef idx="minor">
+              <a:schemeClr val="lt1"/>
+            </a:fontRef>
+          </p:style>
+          <p:txBody>
+            <a:bodyPr rtlCol="0" anchor="ctr"/>
+            <a:lstStyle/>
+            <a:p>
+              <a:pPr algn="ctr"/>
+              <a:endParaRPr lang="en-US"/>
+            </a:p>
+          </p:txBody>
+        </p:sp>
+        <p:sp>
+          <p:nvSpPr>
+            <p:cNvPr id="10" name="Rectangle 9"/>
+            <p:cNvSpPr/>
+            <p:nvPr/>
+          </p:nvSpPr>
+          <p:spPr>
+            <a:xfrm>
+              <a:off x="8305800" y="4655127"/>
+              <a:ext cx="2237509" cy="297873"/>
+            </a:xfrm>
+            <a:prstGeom prst="rect">
+              <a:avLst/>
+            </a:prstGeom>
+            <a:solidFill>
+              <a:schemeClr val="bg1"/>
+            </a:solidFill>
+            <a:ln>
+              <a:noFill/>
+            </a:ln>
+          </p:spPr>
+          <p:style>
+            <a:lnRef idx="2">
+              <a:schemeClr val="accent1">
+                <a:shade val="50000"/>
+              </a:schemeClr>
+            </a:lnRef>
+            <a:fillRef idx="1">
+              <a:schemeClr val="accent1"/>
+            </a:fillRef>
+            <a:effectRef idx="0">
+              <a:schemeClr val="accent1"/>
+            </a:effectRef>
+            <a:fontRef idx="minor">
+              <a:schemeClr val="lt1"/>
+            </a:fontRef>
+          </p:style>
+          <p:txBody>
+            <a:bodyPr rtlCol="0" anchor="ctr"/>
+            <a:lstStyle/>
+            <a:p>
+              <a:pPr algn="ctr"/>
+              <a:endParaRPr lang="en-US"/>
+            </a:p>
+          </p:txBody>
+        </p:sp>
+      </p:grpSp>
+      <p:grpSp>
+        <p:nvGrpSpPr>
+          <p:cNvPr id="16" name="Group 15"/>
+          <p:cNvGrpSpPr/>
+          <p:nvPr/>
+        </p:nvGrpSpPr>
+        <p:grpSpPr>
+          <a:xfrm>
+            <a:off x="13182600" y="838200"/>
+            <a:ext cx="5410200" cy="5410200"/>
+            <a:chOff x="13182600" y="838200"/>
+            <a:chExt cx="5410200" cy="5410200"/>
+          </a:xfrm>
+        </p:grpSpPr>
+        <p:sp>
+          <p:nvSpPr>
+            <p:cNvPr id="13" name="Oval 12"/>
+            <p:cNvSpPr/>
+            <p:nvPr/>
+          </p:nvSpPr>
+          <p:spPr>
+            <a:xfrm>
+              <a:off x="13182600" y="838200"/>
+              <a:ext cx="5410200" cy="5410200"/>
+            </a:xfrm>
+            <a:prstGeom prst="ellipse">
+              <a:avLst/>
+            </a:prstGeom>
+            <a:solidFill>
+              <a:srgbClr val="E62C00"/>
+            </a:solidFill>
+            <a:ln>
+              <a:noFill/>
+            </a:ln>
+          </p:spPr>
+          <p:style>
+            <a:lnRef idx="2">
+              <a:schemeClr val="accent1">
+                <a:shade val="50000"/>
+              </a:schemeClr>
+            </a:lnRef>
+            <a:fillRef idx="1">
+              <a:schemeClr val="accent1"/>
+            </a:fillRef>
+            <a:effectRef idx="0">
+              <a:schemeClr val="accent1"/>
+            </a:effectRef>
+            <a:fontRef idx="minor">
+              <a:schemeClr val="lt1"/>
+            </a:fontRef>
+          </p:style>
+          <p:txBody>
+            <a:bodyPr rtlCol="0" anchor="ctr"/>
+            <a:lstStyle/>
+            <a:p>
+              <a:pPr algn="ctr"/>
+              <a:endParaRPr lang="en-US"/>
+            </a:p>
+          </p:txBody>
+        </p:sp>
+        <p:sp>
+          <p:nvSpPr>
+            <p:cNvPr id="14" name="Up Arrow 13"/>
+            <p:cNvSpPr/>
+            <p:nvPr/>
+          </p:nvSpPr>
+          <p:spPr>
+            <a:xfrm>
+              <a:off x="14782800" y="1828800"/>
+              <a:ext cx="2247900" cy="2667000"/>
+            </a:xfrm>
+            <a:prstGeom prst="upArrow">
+              <a:avLst/>
+            </a:prstGeom>
+            <a:solidFill>
+              <a:schemeClr val="bg1"/>
+            </a:solidFill>
+            <a:ln>
+              <a:noFill/>
+            </a:ln>
+          </p:spPr>
+          <p:style>
+            <a:lnRef idx="2">
+              <a:schemeClr val="accent1">
+                <a:shade val="50000"/>
+              </a:schemeClr>
+            </a:lnRef>
+            <a:fillRef idx="1">
+              <a:schemeClr val="accent1"/>
+            </a:fillRef>
+            <a:effectRef idx="0">
+              <a:schemeClr val="accent1"/>
+            </a:effectRef>
+            <a:fontRef idx="minor">
+              <a:schemeClr val="lt1"/>
+            </a:fontRef>
+          </p:style>
+          <p:txBody>
+            <a:bodyPr rtlCol="0" anchor="ctr"/>
+            <a:lstStyle/>
+            <a:p>
+              <a:pPr algn="ctr"/>
+              <a:endParaRPr lang="en-US"/>
+            </a:p>
+          </p:txBody>
+        </p:sp>
+        <p:sp>
+          <p:nvSpPr>
+            <p:cNvPr id="15" name="Rectangle 14"/>
+            <p:cNvSpPr/>
+            <p:nvPr/>
+          </p:nvSpPr>
+          <p:spPr>
+            <a:xfrm>
+              <a:off x="14782800" y="4731327"/>
+              <a:ext cx="2237509" cy="297873"/>
+            </a:xfrm>
+            <a:prstGeom prst="rect">
+              <a:avLst/>
+            </a:prstGeom>
+            <a:solidFill>
+              <a:schemeClr val="bg1"/>
+            </a:solidFill>
+            <a:ln>
+              <a:noFill/>
+            </a:ln>
+          </p:spPr>
+          <p:style>
+            <a:lnRef idx="2">
+              <a:schemeClr val="accent1">
+                <a:shade val="50000"/>
+              </a:schemeClr>
+            </a:lnRef>
+            <a:fillRef idx="1">
+              <a:schemeClr val="accent1"/>
+            </a:fillRef>
+            <a:effectRef idx="0">
+              <a:schemeClr val="accent1"/>
+            </a:effectRef>
+            <a:fontRef idx="minor">
+              <a:schemeClr val="lt1"/>
+            </a:fontRef>
+          </p:style>
+          <p:txBody>
+            <a:bodyPr rtlCol="0" anchor="ctr"/>
+            <a:lstStyle/>
+            <a:p>
+              <a:pPr algn="ctr"/>
+              <a:endParaRPr lang="en-US"/>
+            </a:p>
+          </p:txBody>
+        </p:sp>
+      </p:grpSp>
+    </p:spTree>
+  </p:cSld>
+  <p:clrMapOvr>
+    <a:masterClrMapping/>
+  </p:clrMapOvr>
+</p:sld>
+</file>
+
+<file path=ppt/slides/slide19.xml><?xml version="1.0" encoding="utf-8"?>
+<p:sld xmlns:a="http://schemas.openxmlformats.org/drawingml/2006/main" xmlns:r="http://schemas.openxmlformats.org/officeDocument/2006/relationships" xmlns:p="http://schemas.openxmlformats.org/presentationml/2006/main">
+  <p:cSld>
+    <p:spTree>
+      <p:nvGrpSpPr>
+        <p:cNvPr id="1" name=""/>
+        <p:cNvGrpSpPr/>
+        <p:nvPr/>
+      </p:nvGrpSpPr>
+      <p:grpSpPr>
+        <a:xfrm>
+          <a:off x="0" y="0"/>
+          <a:ext cx="0" cy="0"/>
+          <a:chOff x="0" y="0"/>
+          <a:chExt cx="0" cy="0"/>
+        </a:xfrm>
+      </p:grpSpPr>
       <p:grpSp>
         <p:nvGrpSpPr>
           <p:cNvPr id="18" name="Group 17"/>
@@ -17632,7 +17993,7 @@
             <a:blip r:embed="rId4" cstate="print">
               <a:extLst>
                 <a:ext uri="{28A0092B-C50C-407E-A947-70E740481C1C}">
-                  <a14:useLocalDpi xmlns="" xmlns:a14="http://schemas.microsoft.com/office/drawing/2010/main" val="0"/>
+                  <a14:useLocalDpi xmlns:a14="http://schemas.microsoft.com/office/drawing/2010/main" xmlns="" val="0"/>
                 </a:ext>
               </a:extLst>
             </a:blip>
@@ -17652,7 +18013,7 @@
             <a:noFill/>
             <a:extLst>
               <a:ext uri="{909E8E84-426E-40DD-AFC4-6F175D3DCCD1}">
-                <a14:hiddenFill xmlns="" xmlns:a14="http://schemas.microsoft.com/office/drawing/2010/main">
+                <a14:hiddenFill xmlns:a14="http://schemas.microsoft.com/office/drawing/2010/main" xmlns="">
                   <a:solidFill>
                     <a:srgbClr val="FFFFFF"/>
                   </a:solidFill>
@@ -18099,7 +18460,7 @@
             <a:blip r:embed="rId6" cstate="print">
               <a:extLst>
                 <a:ext uri="{28A0092B-C50C-407E-A947-70E740481C1C}">
-                  <a14:useLocalDpi xmlns="" xmlns:a14="http://schemas.microsoft.com/office/drawing/2010/main" val="0"/>
+                  <a14:useLocalDpi xmlns:a14="http://schemas.microsoft.com/office/drawing/2010/main" xmlns="" val="0"/>
                 </a:ext>
               </a:extLst>
             </a:blip>
@@ -18119,7 +18480,7 @@
             <a:noFill/>
             <a:extLst>
               <a:ext uri="{909E8E84-426E-40DD-AFC4-6F175D3DCCD1}">
-                <a14:hiddenFill xmlns="" xmlns:a14="http://schemas.microsoft.com/office/drawing/2010/main">
+                <a14:hiddenFill xmlns:a14="http://schemas.microsoft.com/office/drawing/2010/main" xmlns="">
                   <a:solidFill>
                     <a:srgbClr val="FFFFFF"/>
                   </a:solidFill>
@@ -20323,7 +20684,7 @@
               <a:blip r:embed="rId6" cstate="print">
                 <a:extLst>
                   <a:ext uri="{28A0092B-C50C-407E-A947-70E740481C1C}">
-                    <a14:useLocalDpi xmlns="" xmlns:a14="http://schemas.microsoft.com/office/drawing/2010/main" val="0"/>
+                    <a14:useLocalDpi xmlns:a14="http://schemas.microsoft.com/office/drawing/2010/main" xmlns="" val="0"/>
                   </a:ext>
                 </a:extLst>
               </a:blip>
@@ -20343,7 +20704,7 @@
               <a:noFill/>
               <a:extLst>
                 <a:ext uri="{909E8E84-426E-40DD-AFC4-6F175D3DCCD1}">
-                  <a14:hiddenFill xmlns="" xmlns:a14="http://schemas.microsoft.com/office/drawing/2010/main">
+                  <a14:hiddenFill xmlns:a14="http://schemas.microsoft.com/office/drawing/2010/main" xmlns="">
                     <a:solidFill>
                       <a:srgbClr val="FFFFFF"/>
                     </a:solidFill>
@@ -27543,7 +27904,7 @@
               <a:blip r:embed="rId8" cstate="print">
                 <a:extLst>
                   <a:ext uri="{28A0092B-C50C-407E-A947-70E740481C1C}">
-                    <a14:useLocalDpi xmlns="" xmlns:a14="http://schemas.microsoft.com/office/drawing/2010/main" val="0"/>
+                    <a14:useLocalDpi xmlns:a14="http://schemas.microsoft.com/office/drawing/2010/main" xmlns="" val="0"/>
                   </a:ext>
                 </a:extLst>
               </a:blip>
@@ -27563,7 +27924,7 @@
               <a:noFill/>
               <a:extLst>
                 <a:ext uri="{909E8E84-426E-40DD-AFC4-6F175D3DCCD1}">
-                  <a14:hiddenFill xmlns="" xmlns:a14="http://schemas.microsoft.com/office/drawing/2010/main">
+                  <a14:hiddenFill xmlns:a14="http://schemas.microsoft.com/office/drawing/2010/main" xmlns="">
                     <a:solidFill>
                       <a:srgbClr val="FFFFFF"/>
                     </a:solidFill>
@@ -28031,7 +28392,7 @@
             <a:blip r:embed="rId8" cstate="print">
               <a:extLst>
                 <a:ext uri="{28A0092B-C50C-407E-A947-70E740481C1C}">
-                  <a14:useLocalDpi xmlns="" xmlns:a14="http://schemas.microsoft.com/office/drawing/2010/main" val="0"/>
+                  <a14:useLocalDpi xmlns:a14="http://schemas.microsoft.com/office/drawing/2010/main" xmlns="" val="0"/>
                 </a:ext>
               </a:extLst>
             </a:blip>
@@ -28051,7 +28412,7 @@
             <a:noFill/>
             <a:extLst>
               <a:ext uri="{909E8E84-426E-40DD-AFC4-6F175D3DCCD1}">
-                <a14:hiddenFill xmlns="" xmlns:a14="http://schemas.microsoft.com/office/drawing/2010/main">
+                <a14:hiddenFill xmlns:a14="http://schemas.microsoft.com/office/drawing/2010/main" xmlns="">
                   <a:solidFill>
                     <a:srgbClr val="FFFFFF"/>
                   </a:solidFill>
@@ -32614,7 +32975,7 @@
           <a:blip r:embed="rId2" cstate="print">
             <a:extLst>
               <a:ext uri="{28A0092B-C50C-407E-A947-70E740481C1C}">
-                <a14:useLocalDpi xmlns:a14="http://schemas.microsoft.com/office/drawing/2010/main" xmlns="" val="0"/>
+                <a14:useLocalDpi xmlns="" xmlns:a14="http://schemas.microsoft.com/office/drawing/2010/main" val="0"/>
               </a:ext>
             </a:extLst>
           </a:blip>
@@ -32643,14 +33004,14 @@
           </a:effectLst>
           <a:extLst>
             <a:ext uri="{909E8E84-426E-40DD-AFC4-6F175D3DCCD1}">
-              <a14:hiddenFill xmlns:a14="http://schemas.microsoft.com/office/drawing/2010/main" xmlns="">
+              <a14:hiddenFill xmlns="" xmlns:a14="http://schemas.microsoft.com/office/drawing/2010/main">
                 <a:solidFill>
                   <a:schemeClr val="accent1"/>
                 </a:solidFill>
               </a14:hiddenFill>
             </a:ext>
             <a:ext uri="{91240B29-F687-4F45-9708-019B960494DF}">
-              <a14:hiddenLine xmlns:a14="http://schemas.microsoft.com/office/drawing/2010/main" xmlns="" w="9525">
+              <a14:hiddenLine xmlns="" xmlns:a14="http://schemas.microsoft.com/office/drawing/2010/main" w="9525">
                 <a:solidFill>
                   <a:schemeClr val="tx1"/>
                 </a:solidFill>

</xml_diff>

<commit_message>
Restructured folders. Loop mid section added. Last version in Unity 2017.1.
</commit_message>
<xml_diff>
--- a/HMSWebTest-Pen/Assets/Images/hmsgraphics.pptx
+++ b/HMSWebTest-Pen/Assets/Images/hmsgraphics.pptx
@@ -129,7 +129,7 @@
   </p:defaultTextStyle>
   <p:extLst>
     <p:ext uri="{EFAFB233-063F-42B5-8137-9DF3F51BA10A}">
-      <p15:sldGuideLst xmlns:p15="http://schemas.microsoft.com/office/powerpoint/2012/main" xmlns="">
+      <p15:sldGuideLst xmlns="" xmlns:p15="http://schemas.microsoft.com/office/powerpoint/2012/main">
         <p15:guide id="1" orient="horz" pos="2160">
           <p15:clr>
             <a:srgbClr val="A4A3A4"/>
@@ -233,7 +233,7 @@
             <a:fld id="{6153BB3E-9447-4512-867E-C40997E12B5B}" type="datetimeFigureOut">
               <a:rPr lang="en-US" smtClean="0"/>
               <a:pPr/>
-              <a:t>7/26/2017</a:t>
+              <a:t>1/5/2018</a:t>
             </a:fld>
             <a:endParaRPr lang="en-US"/>
           </a:p>
@@ -760,7 +760,7 @@
             <a:fld id="{090B515E-C25E-45EE-BA79-D334A31660AC}" type="datetimeFigureOut">
               <a:rPr lang="en-US" smtClean="0"/>
               <a:pPr/>
-              <a:t>7/26/2017</a:t>
+              <a:t>1/5/2018</a:t>
             </a:fld>
             <a:endParaRPr lang="en-US"/>
           </a:p>
@@ -925,7 +925,7 @@
             <a:fld id="{090B515E-C25E-45EE-BA79-D334A31660AC}" type="datetimeFigureOut">
               <a:rPr lang="en-US" smtClean="0"/>
               <a:pPr/>
-              <a:t>7/26/2017</a:t>
+              <a:t>1/5/2018</a:t>
             </a:fld>
             <a:endParaRPr lang="en-US"/>
           </a:p>
@@ -1100,7 +1100,7 @@
             <a:fld id="{090B515E-C25E-45EE-BA79-D334A31660AC}" type="datetimeFigureOut">
               <a:rPr lang="en-US" smtClean="0"/>
               <a:pPr/>
-              <a:t>7/26/2017</a:t>
+              <a:t>1/5/2018</a:t>
             </a:fld>
             <a:endParaRPr lang="en-US"/>
           </a:p>
@@ -1265,7 +1265,7 @@
             <a:fld id="{090B515E-C25E-45EE-BA79-D334A31660AC}" type="datetimeFigureOut">
               <a:rPr lang="en-US" smtClean="0"/>
               <a:pPr/>
-              <a:t>7/26/2017</a:t>
+              <a:t>1/5/2018</a:t>
             </a:fld>
             <a:endParaRPr lang="en-US"/>
           </a:p>
@@ -1507,7 +1507,7 @@
             <a:fld id="{090B515E-C25E-45EE-BA79-D334A31660AC}" type="datetimeFigureOut">
               <a:rPr lang="en-US" smtClean="0"/>
               <a:pPr/>
-              <a:t>7/26/2017</a:t>
+              <a:t>1/5/2018</a:t>
             </a:fld>
             <a:endParaRPr lang="en-US"/>
           </a:p>
@@ -1789,7 +1789,7 @@
             <a:fld id="{090B515E-C25E-45EE-BA79-D334A31660AC}" type="datetimeFigureOut">
               <a:rPr lang="en-US" smtClean="0"/>
               <a:pPr/>
-              <a:t>7/26/2017</a:t>
+              <a:t>1/5/2018</a:t>
             </a:fld>
             <a:endParaRPr lang="en-US"/>
           </a:p>
@@ -2205,7 +2205,7 @@
             <a:fld id="{090B515E-C25E-45EE-BA79-D334A31660AC}" type="datetimeFigureOut">
               <a:rPr lang="en-US" smtClean="0"/>
               <a:pPr/>
-              <a:t>7/26/2017</a:t>
+              <a:t>1/5/2018</a:t>
             </a:fld>
             <a:endParaRPr lang="en-US"/>
           </a:p>
@@ -2319,7 +2319,7 @@
             <a:fld id="{090B515E-C25E-45EE-BA79-D334A31660AC}" type="datetimeFigureOut">
               <a:rPr lang="en-US" smtClean="0"/>
               <a:pPr/>
-              <a:t>7/26/2017</a:t>
+              <a:t>1/5/2018</a:t>
             </a:fld>
             <a:endParaRPr lang="en-US"/>
           </a:p>
@@ -2411,7 +2411,7 @@
             <a:fld id="{090B515E-C25E-45EE-BA79-D334A31660AC}" type="datetimeFigureOut">
               <a:rPr lang="en-US" smtClean="0"/>
               <a:pPr/>
-              <a:t>7/26/2017</a:t>
+              <a:t>1/5/2018</a:t>
             </a:fld>
             <a:endParaRPr lang="en-US"/>
           </a:p>
@@ -2683,7 +2683,7 @@
             <a:fld id="{090B515E-C25E-45EE-BA79-D334A31660AC}" type="datetimeFigureOut">
               <a:rPr lang="en-US" smtClean="0"/>
               <a:pPr/>
-              <a:t>7/26/2017</a:t>
+              <a:t>1/5/2018</a:t>
             </a:fld>
             <a:endParaRPr lang="en-US"/>
           </a:p>
@@ -2932,7 +2932,7 @@
             <a:fld id="{090B515E-C25E-45EE-BA79-D334A31660AC}" type="datetimeFigureOut">
               <a:rPr lang="en-US" smtClean="0"/>
               <a:pPr/>
-              <a:t>7/26/2017</a:t>
+              <a:t>1/5/2018</a:t>
             </a:fld>
             <a:endParaRPr lang="en-US"/>
           </a:p>
@@ -3140,7 +3140,7 @@
             <a:fld id="{090B515E-C25E-45EE-BA79-D334A31660AC}" type="datetimeFigureOut">
               <a:rPr lang="en-US" smtClean="0"/>
               <a:pPr/>
-              <a:t>7/26/2017</a:t>
+              <a:t>1/5/2018</a:t>
             </a:fld>
             <a:endParaRPr lang="en-US"/>
           </a:p>
@@ -3978,7 +3978,7 @@
             <a:blip r:embed="rId2" cstate="print">
               <a:extLst>
                 <a:ext uri="{28A0092B-C50C-407E-A947-70E740481C1C}">
-                  <a14:useLocalDpi xmlns:a14="http://schemas.microsoft.com/office/drawing/2010/main" xmlns="" val="0"/>
+                  <a14:useLocalDpi xmlns="" xmlns:a14="http://schemas.microsoft.com/office/drawing/2010/main" val="0"/>
                 </a:ext>
               </a:extLst>
             </a:blip>
@@ -3998,7 +3998,7 @@
             <a:noFill/>
             <a:extLst>
               <a:ext uri="{909E8E84-426E-40DD-AFC4-6F175D3DCCD1}">
-                <a14:hiddenFill xmlns:a14="http://schemas.microsoft.com/office/drawing/2010/main" xmlns="">
+                <a14:hiddenFill xmlns="" xmlns:a14="http://schemas.microsoft.com/office/drawing/2010/main">
                   <a:solidFill>
                     <a:srgbClr val="FFFFFF"/>
                   </a:solidFill>
@@ -4081,7 +4081,7 @@
             <a:blip r:embed="rId3" cstate="print">
               <a:extLst>
                 <a:ext uri="{28A0092B-C50C-407E-A947-70E740481C1C}">
-                  <a14:useLocalDpi xmlns:a14="http://schemas.microsoft.com/office/drawing/2010/main" xmlns="" val="0"/>
+                  <a14:useLocalDpi xmlns="" xmlns:a14="http://schemas.microsoft.com/office/drawing/2010/main" val="0"/>
                 </a:ext>
               </a:extLst>
             </a:blip>
@@ -4101,7 +4101,7 @@
             <a:noFill/>
             <a:extLst>
               <a:ext uri="{909E8E84-426E-40DD-AFC4-6F175D3DCCD1}">
-                <a14:hiddenFill xmlns:a14="http://schemas.microsoft.com/office/drawing/2010/main" xmlns="">
+                <a14:hiddenFill xmlns="" xmlns:a14="http://schemas.microsoft.com/office/drawing/2010/main">
                   <a:solidFill>
                     <a:srgbClr val="FFFFFF"/>
                   </a:solidFill>
@@ -7059,7 +7059,7 @@
     </p:spTree>
     <p:extLst>
       <p:ext uri="{BB962C8B-B14F-4D97-AF65-F5344CB8AC3E}">
-        <p14:creationId xmlns:p14="http://schemas.microsoft.com/office/powerpoint/2010/main" xmlns="" val="1874106700"/>
+        <p14:creationId xmlns="" xmlns:p14="http://schemas.microsoft.com/office/powerpoint/2010/main" val="1874106700"/>
       </p:ext>
     </p:extLst>
   </p:cSld>
@@ -7712,7 +7712,7 @@
           <a:blip r:embed="rId2" cstate="print">
             <a:extLst>
               <a:ext uri="{28A0092B-C50C-407E-A947-70E740481C1C}">
-                <a14:useLocalDpi xmlns:a14="http://schemas.microsoft.com/office/drawing/2010/main" xmlns="" val="0"/>
+                <a14:useLocalDpi xmlns="" xmlns:a14="http://schemas.microsoft.com/office/drawing/2010/main" val="0"/>
               </a:ext>
             </a:extLst>
           </a:blip>
@@ -7741,14 +7741,14 @@
           </a:effectLst>
           <a:extLst>
             <a:ext uri="{909E8E84-426E-40DD-AFC4-6F175D3DCCD1}">
-              <a14:hiddenFill xmlns:a14="http://schemas.microsoft.com/office/drawing/2010/main" xmlns="">
+              <a14:hiddenFill xmlns="" xmlns:a14="http://schemas.microsoft.com/office/drawing/2010/main">
                 <a:solidFill>
                   <a:schemeClr val="accent1"/>
                 </a:solidFill>
               </a14:hiddenFill>
             </a:ext>
             <a:ext uri="{91240B29-F687-4F45-9708-019B960494DF}">
-              <a14:hiddenLine xmlns:a14="http://schemas.microsoft.com/office/drawing/2010/main" xmlns="" w="9525">
+              <a14:hiddenLine xmlns="" xmlns:a14="http://schemas.microsoft.com/office/drawing/2010/main" w="9525">
                 <a:solidFill>
                   <a:schemeClr val="tx1"/>
                 </a:solidFill>
@@ -7779,7 +7779,7 @@
             </a:duotone>
             <a:extLst>
               <a:ext uri="{28A0092B-C50C-407E-A947-70E740481C1C}">
-                <a14:useLocalDpi xmlns:a14="http://schemas.microsoft.com/office/drawing/2010/main" xmlns="" val="0"/>
+                <a14:useLocalDpi xmlns="" xmlns:a14="http://schemas.microsoft.com/office/drawing/2010/main" val="0"/>
               </a:ext>
             </a:extLst>
           </a:blip>
@@ -7808,14 +7808,14 @@
           </a:effectLst>
           <a:extLst>
             <a:ext uri="{909E8E84-426E-40DD-AFC4-6F175D3DCCD1}">
-              <a14:hiddenFill xmlns:a14="http://schemas.microsoft.com/office/drawing/2010/main" xmlns="">
+              <a14:hiddenFill xmlns="" xmlns:a14="http://schemas.microsoft.com/office/drawing/2010/main">
                 <a:solidFill>
                   <a:schemeClr val="accent1"/>
                 </a:solidFill>
               </a14:hiddenFill>
             </a:ext>
             <a:ext uri="{91240B29-F687-4F45-9708-019B960494DF}">
-              <a14:hiddenLine xmlns:a14="http://schemas.microsoft.com/office/drawing/2010/main" xmlns="" w="9525">
+              <a14:hiddenLine xmlns="" xmlns:a14="http://schemas.microsoft.com/office/drawing/2010/main" w="9525">
                 <a:solidFill>
                   <a:schemeClr val="tx1"/>
                 </a:solidFill>
@@ -20502,6 +20502,51 @@
           </p:txBody>
         </p:sp>
       </p:grpSp>
+      <p:sp>
+        <p:nvSpPr>
+          <p:cNvPr id="41" name="Rectangle 40"/>
+          <p:cNvSpPr/>
+          <p:nvPr/>
+        </p:nvSpPr>
+        <p:spPr>
+          <a:xfrm>
+            <a:off x="2667000" y="2667000"/>
+            <a:ext cx="457200" cy="419100"/>
+          </a:xfrm>
+          <a:prstGeom prst="rect">
+            <a:avLst/>
+          </a:prstGeom>
+          <a:solidFill>
+            <a:srgbClr val="CC3300"/>
+          </a:solidFill>
+          <a:ln>
+            <a:noFill/>
+          </a:ln>
+        </p:spPr>
+        <p:style>
+          <a:lnRef idx="2">
+            <a:schemeClr val="accent1">
+              <a:shade val="50000"/>
+            </a:schemeClr>
+          </a:lnRef>
+          <a:fillRef idx="1">
+            <a:schemeClr val="accent1"/>
+          </a:fillRef>
+          <a:effectRef idx="0">
+            <a:schemeClr val="accent1"/>
+          </a:effectRef>
+          <a:fontRef idx="minor">
+            <a:schemeClr val="lt1"/>
+          </a:fontRef>
+        </p:style>
+        <p:txBody>
+          <a:bodyPr rtlCol="0" anchor="ctr"/>
+          <a:lstStyle/>
+          <a:p>
+            <a:endParaRPr lang="en-US" dirty="0"/>
+          </a:p>
+        </p:txBody>
+      </p:sp>
     </p:spTree>
   </p:cSld>
   <p:clrMapOvr>
@@ -20743,7 +20788,7 @@
             <a:blip r:embed="rId4" cstate="print">
               <a:extLst>
                 <a:ext uri="{28A0092B-C50C-407E-A947-70E740481C1C}">
-                  <a14:useLocalDpi xmlns:a14="http://schemas.microsoft.com/office/drawing/2010/main" xmlns="" val="0"/>
+                  <a14:useLocalDpi xmlns="" xmlns:a14="http://schemas.microsoft.com/office/drawing/2010/main" val="0"/>
                 </a:ext>
               </a:extLst>
             </a:blip>
@@ -20763,7 +20808,7 @@
             <a:noFill/>
             <a:extLst>
               <a:ext uri="{909E8E84-426E-40DD-AFC4-6F175D3DCCD1}">
-                <a14:hiddenFill xmlns:a14="http://schemas.microsoft.com/office/drawing/2010/main" xmlns="">
+                <a14:hiddenFill xmlns="" xmlns:a14="http://schemas.microsoft.com/office/drawing/2010/main">
                   <a:solidFill>
                     <a:srgbClr val="FFFFFF"/>
                   </a:solidFill>
@@ -21205,7 +21250,7 @@
             <a:blip r:embed="rId6" cstate="print">
               <a:extLst>
                 <a:ext uri="{28A0092B-C50C-407E-A947-70E740481C1C}">
-                  <a14:useLocalDpi xmlns:a14="http://schemas.microsoft.com/office/drawing/2010/main" xmlns="" val="0"/>
+                  <a14:useLocalDpi xmlns="" xmlns:a14="http://schemas.microsoft.com/office/drawing/2010/main" val="0"/>
                 </a:ext>
               </a:extLst>
             </a:blip>
@@ -21225,7 +21270,7 @@
             <a:noFill/>
             <a:extLst>
               <a:ext uri="{909E8E84-426E-40DD-AFC4-6F175D3DCCD1}">
-                <a14:hiddenFill xmlns:a14="http://schemas.microsoft.com/office/drawing/2010/main" xmlns="">
+                <a14:hiddenFill xmlns="" xmlns:a14="http://schemas.microsoft.com/office/drawing/2010/main">
                   <a:solidFill>
                     <a:srgbClr val="FFFFFF"/>
                   </a:solidFill>
@@ -23406,7 +23451,7 @@
               <a:blip r:embed="rId6" cstate="print">
                 <a:extLst>
                   <a:ext uri="{28A0092B-C50C-407E-A947-70E740481C1C}">
-                    <a14:useLocalDpi xmlns:a14="http://schemas.microsoft.com/office/drawing/2010/main" xmlns="" val="0"/>
+                    <a14:useLocalDpi xmlns="" xmlns:a14="http://schemas.microsoft.com/office/drawing/2010/main" val="0"/>
                   </a:ext>
                 </a:extLst>
               </a:blip>
@@ -23426,7 +23471,7 @@
               <a:noFill/>
               <a:extLst>
                 <a:ext uri="{909E8E84-426E-40DD-AFC4-6F175D3DCCD1}">
-                  <a14:hiddenFill xmlns:a14="http://schemas.microsoft.com/office/drawing/2010/main" xmlns="">
+                  <a14:hiddenFill xmlns="" xmlns:a14="http://schemas.microsoft.com/office/drawing/2010/main">
                     <a:solidFill>
                       <a:srgbClr val="FFFFFF"/>
                     </a:solidFill>
@@ -24270,63 +24315,63 @@
                 <a:gridCol w="461767">
                   <a:extLst>
                     <a:ext uri="{9D8B030D-6E8A-4147-A177-3AD203B41FA5}">
-                      <a16:colId xmlns:a16="http://schemas.microsoft.com/office/drawing/2014/main" xmlns="" val="20000"/>
+                      <a16:colId xmlns="" xmlns:a16="http://schemas.microsoft.com/office/drawing/2014/main" val="20000"/>
                     </a:ext>
                   </a:extLst>
                 </a:gridCol>
                 <a:gridCol w="461767">
                   <a:extLst>
                     <a:ext uri="{9D8B030D-6E8A-4147-A177-3AD203B41FA5}">
-                      <a16:colId xmlns:a16="http://schemas.microsoft.com/office/drawing/2014/main" xmlns="" val="20001"/>
+                      <a16:colId xmlns="" xmlns:a16="http://schemas.microsoft.com/office/drawing/2014/main" val="20001"/>
                     </a:ext>
                   </a:extLst>
                 </a:gridCol>
                 <a:gridCol w="461767">
                   <a:extLst>
                     <a:ext uri="{9D8B030D-6E8A-4147-A177-3AD203B41FA5}">
-                      <a16:colId xmlns:a16="http://schemas.microsoft.com/office/drawing/2014/main" xmlns="" val="20002"/>
+                      <a16:colId xmlns="" xmlns:a16="http://schemas.microsoft.com/office/drawing/2014/main" val="20002"/>
                     </a:ext>
                   </a:extLst>
                 </a:gridCol>
                 <a:gridCol w="461767">
                   <a:extLst>
                     <a:ext uri="{9D8B030D-6E8A-4147-A177-3AD203B41FA5}">
-                      <a16:colId xmlns:a16="http://schemas.microsoft.com/office/drawing/2014/main" xmlns="" val="20003"/>
+                      <a16:colId xmlns="" xmlns:a16="http://schemas.microsoft.com/office/drawing/2014/main" val="20003"/>
                     </a:ext>
                   </a:extLst>
                 </a:gridCol>
                 <a:gridCol w="461767">
                   <a:extLst>
                     <a:ext uri="{9D8B030D-6E8A-4147-A177-3AD203B41FA5}">
-                      <a16:colId xmlns:a16="http://schemas.microsoft.com/office/drawing/2014/main" xmlns="" val="20004"/>
+                      <a16:colId xmlns="" xmlns:a16="http://schemas.microsoft.com/office/drawing/2014/main" val="20004"/>
                     </a:ext>
                   </a:extLst>
                 </a:gridCol>
                 <a:gridCol w="461767">
                   <a:extLst>
                     <a:ext uri="{9D8B030D-6E8A-4147-A177-3AD203B41FA5}">
-                      <a16:colId xmlns:a16="http://schemas.microsoft.com/office/drawing/2014/main" xmlns="" val="20005"/>
+                      <a16:colId xmlns="" xmlns:a16="http://schemas.microsoft.com/office/drawing/2014/main" val="20005"/>
                     </a:ext>
                   </a:extLst>
                 </a:gridCol>
                 <a:gridCol w="461767">
                   <a:extLst>
                     <a:ext uri="{9D8B030D-6E8A-4147-A177-3AD203B41FA5}">
-                      <a16:colId xmlns:a16="http://schemas.microsoft.com/office/drawing/2014/main" xmlns="" val="20006"/>
+                      <a16:colId xmlns="" xmlns:a16="http://schemas.microsoft.com/office/drawing/2014/main" val="20006"/>
                     </a:ext>
                   </a:extLst>
                 </a:gridCol>
                 <a:gridCol w="461767">
                   <a:extLst>
                     <a:ext uri="{9D8B030D-6E8A-4147-A177-3AD203B41FA5}">
-                      <a16:colId xmlns:a16="http://schemas.microsoft.com/office/drawing/2014/main" xmlns="" val="20007"/>
+                      <a16:colId xmlns="" xmlns:a16="http://schemas.microsoft.com/office/drawing/2014/main" val="20007"/>
                     </a:ext>
                   </a:extLst>
                 </a:gridCol>
                 <a:gridCol w="461767">
                   <a:extLst>
                     <a:ext uri="{9D8B030D-6E8A-4147-A177-3AD203B41FA5}">
-                      <a16:colId xmlns:a16="http://schemas.microsoft.com/office/drawing/2014/main" xmlns="" val="20008"/>
+                      <a16:colId xmlns="" xmlns:a16="http://schemas.microsoft.com/office/drawing/2014/main" val="20008"/>
                     </a:ext>
                   </a:extLst>
                 </a:gridCol>
@@ -24901,7 +24946,7 @@
                 </a:tc>
                 <a:extLst>
                   <a:ext uri="{0D108BD9-81ED-4DB2-BD59-A6C34878D82A}">
-                    <a16:rowId xmlns:a16="http://schemas.microsoft.com/office/drawing/2014/main" xmlns="" val="10000"/>
+                    <a16:rowId xmlns="" xmlns:a16="http://schemas.microsoft.com/office/drawing/2014/main" val="10000"/>
                   </a:ext>
                 </a:extLst>
               </a:tr>
@@ -25475,7 +25520,7 @@
                 </a:tc>
                 <a:extLst>
                   <a:ext uri="{0D108BD9-81ED-4DB2-BD59-A6C34878D82A}">
-                    <a16:rowId xmlns:a16="http://schemas.microsoft.com/office/drawing/2014/main" xmlns="" val="10001"/>
+                    <a16:rowId xmlns="" xmlns:a16="http://schemas.microsoft.com/office/drawing/2014/main" val="10001"/>
                   </a:ext>
                 </a:extLst>
               </a:tr>
@@ -26049,7 +26094,7 @@
                 </a:tc>
                 <a:extLst>
                   <a:ext uri="{0D108BD9-81ED-4DB2-BD59-A6C34878D82A}">
-                    <a16:rowId xmlns:a16="http://schemas.microsoft.com/office/drawing/2014/main" xmlns="" val="10002"/>
+                    <a16:rowId xmlns="" xmlns:a16="http://schemas.microsoft.com/office/drawing/2014/main" val="10002"/>
                   </a:ext>
                 </a:extLst>
               </a:tr>
@@ -26623,7 +26668,7 @@
                 </a:tc>
                 <a:extLst>
                   <a:ext uri="{0D108BD9-81ED-4DB2-BD59-A6C34878D82A}">
-                    <a16:rowId xmlns:a16="http://schemas.microsoft.com/office/drawing/2014/main" xmlns="" val="10003"/>
+                    <a16:rowId xmlns="" xmlns:a16="http://schemas.microsoft.com/office/drawing/2014/main" val="10003"/>
                   </a:ext>
                 </a:extLst>
               </a:tr>
@@ -26859,63 +26904,63 @@
                 <a:gridCol w="245533">
                   <a:extLst>
                     <a:ext uri="{9D8B030D-6E8A-4147-A177-3AD203B41FA5}">
-                      <a16:colId xmlns:a16="http://schemas.microsoft.com/office/drawing/2014/main" xmlns="" val="20000"/>
+                      <a16:colId xmlns="" xmlns:a16="http://schemas.microsoft.com/office/drawing/2014/main" val="20000"/>
                     </a:ext>
                   </a:extLst>
                 </a:gridCol>
                 <a:gridCol w="245533">
                   <a:extLst>
                     <a:ext uri="{9D8B030D-6E8A-4147-A177-3AD203B41FA5}">
-                      <a16:colId xmlns:a16="http://schemas.microsoft.com/office/drawing/2014/main" xmlns="" val="20001"/>
+                      <a16:colId xmlns="" xmlns:a16="http://schemas.microsoft.com/office/drawing/2014/main" val="20001"/>
                     </a:ext>
                   </a:extLst>
                 </a:gridCol>
                 <a:gridCol w="245533">
                   <a:extLst>
                     <a:ext uri="{9D8B030D-6E8A-4147-A177-3AD203B41FA5}">
-                      <a16:colId xmlns:a16="http://schemas.microsoft.com/office/drawing/2014/main" xmlns="" val="20002"/>
+                      <a16:colId xmlns="" xmlns:a16="http://schemas.microsoft.com/office/drawing/2014/main" val="20002"/>
                     </a:ext>
                   </a:extLst>
                 </a:gridCol>
                 <a:gridCol w="245533">
                   <a:extLst>
                     <a:ext uri="{9D8B030D-6E8A-4147-A177-3AD203B41FA5}">
-                      <a16:colId xmlns:a16="http://schemas.microsoft.com/office/drawing/2014/main" xmlns="" val="20003"/>
+                      <a16:colId xmlns="" xmlns:a16="http://schemas.microsoft.com/office/drawing/2014/main" val="20003"/>
                     </a:ext>
                   </a:extLst>
                 </a:gridCol>
                 <a:gridCol w="245533">
                   <a:extLst>
                     <a:ext uri="{9D8B030D-6E8A-4147-A177-3AD203B41FA5}">
-                      <a16:colId xmlns:a16="http://schemas.microsoft.com/office/drawing/2014/main" xmlns="" val="20004"/>
+                      <a16:colId xmlns="" xmlns:a16="http://schemas.microsoft.com/office/drawing/2014/main" val="20004"/>
                     </a:ext>
                   </a:extLst>
                 </a:gridCol>
                 <a:gridCol w="245533">
                   <a:extLst>
                     <a:ext uri="{9D8B030D-6E8A-4147-A177-3AD203B41FA5}">
-                      <a16:colId xmlns:a16="http://schemas.microsoft.com/office/drawing/2014/main" xmlns="" val="20005"/>
+                      <a16:colId xmlns="" xmlns:a16="http://schemas.microsoft.com/office/drawing/2014/main" val="20005"/>
                     </a:ext>
                   </a:extLst>
                 </a:gridCol>
                 <a:gridCol w="245533">
                   <a:extLst>
                     <a:ext uri="{9D8B030D-6E8A-4147-A177-3AD203B41FA5}">
-                      <a16:colId xmlns:a16="http://schemas.microsoft.com/office/drawing/2014/main" xmlns="" val="20006"/>
+                      <a16:colId xmlns="" xmlns:a16="http://schemas.microsoft.com/office/drawing/2014/main" val="20006"/>
                     </a:ext>
                   </a:extLst>
                 </a:gridCol>
                 <a:gridCol w="245533">
                   <a:extLst>
                     <a:ext uri="{9D8B030D-6E8A-4147-A177-3AD203B41FA5}">
-                      <a16:colId xmlns:a16="http://schemas.microsoft.com/office/drawing/2014/main" xmlns="" val="20007"/>
+                      <a16:colId xmlns="" xmlns:a16="http://schemas.microsoft.com/office/drawing/2014/main" val="20007"/>
                     </a:ext>
                   </a:extLst>
                 </a:gridCol>
                 <a:gridCol w="245533">
                   <a:extLst>
                     <a:ext uri="{9D8B030D-6E8A-4147-A177-3AD203B41FA5}">
-                      <a16:colId xmlns:a16="http://schemas.microsoft.com/office/drawing/2014/main" xmlns="" val="20008"/>
+                      <a16:colId xmlns="" xmlns:a16="http://schemas.microsoft.com/office/drawing/2014/main" val="20008"/>
                     </a:ext>
                   </a:extLst>
                 </a:gridCol>
@@ -27490,7 +27535,7 @@
                 </a:tc>
                 <a:extLst>
                   <a:ext uri="{0D108BD9-81ED-4DB2-BD59-A6C34878D82A}">
-                    <a16:rowId xmlns:a16="http://schemas.microsoft.com/office/drawing/2014/main" xmlns="" val="10000"/>
+                    <a16:rowId xmlns="" xmlns:a16="http://schemas.microsoft.com/office/drawing/2014/main" val="10000"/>
                   </a:ext>
                 </a:extLst>
               </a:tr>
@@ -28064,7 +28109,7 @@
                 </a:tc>
                 <a:extLst>
                   <a:ext uri="{0D108BD9-81ED-4DB2-BD59-A6C34878D82A}">
-                    <a16:rowId xmlns:a16="http://schemas.microsoft.com/office/drawing/2014/main" xmlns="" val="10001"/>
+                    <a16:rowId xmlns="" xmlns:a16="http://schemas.microsoft.com/office/drawing/2014/main" val="10001"/>
                   </a:ext>
                 </a:extLst>
               </a:tr>
@@ -28638,7 +28683,7 @@
                 </a:tc>
                 <a:extLst>
                   <a:ext uri="{0D108BD9-81ED-4DB2-BD59-A6C34878D82A}">
-                    <a16:rowId xmlns:a16="http://schemas.microsoft.com/office/drawing/2014/main" xmlns="" val="10002"/>
+                    <a16:rowId xmlns="" xmlns:a16="http://schemas.microsoft.com/office/drawing/2014/main" val="10002"/>
                   </a:ext>
                 </a:extLst>
               </a:tr>
@@ -29212,7 +29257,7 @@
                 </a:tc>
                 <a:extLst>
                   <a:ext uri="{0D108BD9-81ED-4DB2-BD59-A6C34878D82A}">
-                    <a16:rowId xmlns:a16="http://schemas.microsoft.com/office/drawing/2014/main" xmlns="" val="10003"/>
+                    <a16:rowId xmlns="" xmlns:a16="http://schemas.microsoft.com/office/drawing/2014/main" val="10003"/>
                   </a:ext>
                 </a:extLst>
               </a:tr>
@@ -30743,7 +30788,7 @@
               <a:blip r:embed="rId7" cstate="print">
                 <a:extLst>
                   <a:ext uri="{28A0092B-C50C-407E-A947-70E740481C1C}">
-                    <a14:useLocalDpi xmlns:a14="http://schemas.microsoft.com/office/drawing/2010/main" xmlns="" val="0"/>
+                    <a14:useLocalDpi xmlns="" xmlns:a14="http://schemas.microsoft.com/office/drawing/2010/main" val="0"/>
                   </a:ext>
                 </a:extLst>
               </a:blip>
@@ -30763,7 +30808,7 @@
               <a:noFill/>
               <a:extLst>
                 <a:ext uri="{909E8E84-426E-40DD-AFC4-6F175D3DCCD1}">
-                  <a14:hiddenFill xmlns:a14="http://schemas.microsoft.com/office/drawing/2010/main" xmlns="">
+                  <a14:hiddenFill xmlns="" xmlns:a14="http://schemas.microsoft.com/office/drawing/2010/main">
                     <a:solidFill>
                       <a:srgbClr val="FFFFFF"/>
                     </a:solidFill>
@@ -31227,7 +31272,7 @@
             <a:blip r:embed="rId7" cstate="print">
               <a:extLst>
                 <a:ext uri="{28A0092B-C50C-407E-A947-70E740481C1C}">
-                  <a14:useLocalDpi xmlns:a14="http://schemas.microsoft.com/office/drawing/2010/main" xmlns="" val="0"/>
+                  <a14:useLocalDpi xmlns="" xmlns:a14="http://schemas.microsoft.com/office/drawing/2010/main" val="0"/>
                 </a:ext>
               </a:extLst>
             </a:blip>
@@ -31247,7 +31292,7 @@
             <a:noFill/>
             <a:extLst>
               <a:ext uri="{909E8E84-426E-40DD-AFC4-6F175D3DCCD1}">
-                <a14:hiddenFill xmlns:a14="http://schemas.microsoft.com/office/drawing/2010/main" xmlns="">
+                <a14:hiddenFill xmlns="" xmlns:a14="http://schemas.microsoft.com/office/drawing/2010/main">
                   <a:solidFill>
                     <a:srgbClr val="FFFFFF"/>
                   </a:solidFill>
@@ -35755,7 +35800,7 @@
           <a:blip r:embed="rId2" cstate="print">
             <a:extLst>
               <a:ext uri="{28A0092B-C50C-407E-A947-70E740481C1C}">
-                <a14:useLocalDpi xmlns:a14="http://schemas.microsoft.com/office/drawing/2010/main" xmlns="" val="0"/>
+                <a14:useLocalDpi xmlns="" xmlns:a14="http://schemas.microsoft.com/office/drawing/2010/main" val="0"/>
               </a:ext>
             </a:extLst>
           </a:blip>
@@ -35784,14 +35829,14 @@
           </a:effectLst>
           <a:extLst>
             <a:ext uri="{909E8E84-426E-40DD-AFC4-6F175D3DCCD1}">
-              <a14:hiddenFill xmlns:a14="http://schemas.microsoft.com/office/drawing/2010/main" xmlns="">
+              <a14:hiddenFill xmlns="" xmlns:a14="http://schemas.microsoft.com/office/drawing/2010/main">
                 <a:solidFill>
                   <a:schemeClr val="accent1"/>
                 </a:solidFill>
               </a14:hiddenFill>
             </a:ext>
             <a:ext uri="{91240B29-F687-4F45-9708-019B960494DF}">
-              <a14:hiddenLine xmlns:a14="http://schemas.microsoft.com/office/drawing/2010/main" xmlns="" w="9525">
+              <a14:hiddenLine xmlns="" xmlns:a14="http://schemas.microsoft.com/office/drawing/2010/main" w="9525">
                 <a:solidFill>
                   <a:schemeClr val="tx1"/>
                 </a:solidFill>

</xml_diff>